<commit_message>
updated pdf and pptx to reflect updates to keynote
</commit_message>
<xml_diff>
--- a/codeland2018.pptx
+++ b/codeland2018.pptx
@@ -19,6 +19,12 @@
     <p:sldId id="264" r:id="rId16"/>
     <p:sldId id="265" r:id="rId17"/>
     <p:sldId id="266" r:id="rId18"/>
+    <p:sldId id="267" r:id="rId19"/>
+    <p:sldId id="268" r:id="rId20"/>
+    <p:sldId id="269" r:id="rId21"/>
+    <p:sldId id="270" r:id="rId22"/>
+    <p:sldId id="271" r:id="rId23"/>
+    <p:sldId id="272" r:id="rId24"/>
   </p:sldIdLst>
   <p:sldSz cx="13004800" cy="9753600"/>
   <p:notesSz cx="6858000" cy="9144000"/>
@@ -499,6 +505,503 @@
     </a:lvl9pPr>
   </p:notesStyle>
 </p:notesMaster>
+</file>
+
+<file path=ppt/notesSlides/notesSlide1.xml><?xml version="1.0" encoding="utf-8"?>
+<p:notes xmlns:a="http://schemas.openxmlformats.org/drawingml/2006/main" xmlns:r="http://schemas.openxmlformats.org/officeDocument/2006/relationships" xmlns:p="http://schemas.openxmlformats.org/presentationml/2006/main" showMasterSp="1" showMasterPhAnim="1">
+  <p:cSld>
+    <p:spTree>
+      <p:nvGrpSpPr>
+        <p:cNvPr id="1" name=""/>
+        <p:cNvGrpSpPr/>
+        <p:nvPr/>
+      </p:nvGrpSpPr>
+      <p:grpSpPr>
+        <a:xfrm>
+          <a:off x="0" y="0"/>
+          <a:ext cx="0" cy="0"/>
+          <a:chOff x="0" y="0"/>
+          <a:chExt cx="0" cy="0"/>
+        </a:xfrm>
+      </p:grpSpPr>
+      <p:sp>
+        <p:nvSpPr>
+          <p:cNvPr id="195" name="Shape 195"/>
+          <p:cNvSpPr/>
+          <p:nvPr>
+            <p:ph type="sldImg"/>
+          </p:nvPr>
+        </p:nvSpPr>
+        <p:spPr>
+          <a:prstGeom prst="rect">
+            <a:avLst/>
+          </a:prstGeom>
+        </p:spPr>
+        <p:txBody>
+          <a:bodyPr/>
+          <a:lstStyle/>
+          <a:p>
+            <a:pPr/>
+          </a:p>
+        </p:txBody>
+      </p:sp>
+      <p:sp>
+        <p:nvSpPr>
+          <p:cNvPr id="196" name="Shape 196"/>
+          <p:cNvSpPr/>
+          <p:nvPr>
+            <p:ph type="body" sz="quarter" idx="1"/>
+          </p:nvPr>
+        </p:nvSpPr>
+        <p:spPr>
+          <a:prstGeom prst="rect">
+            <a:avLst/>
+          </a:prstGeom>
+        </p:spPr>
+        <p:txBody>
+          <a:bodyPr/>
+          <a:lstStyle/>
+          <a:p>
+            <a:pPr/>
+            <a:r>
+              <a:t>Now that know what Jekyll is let’s pair up into groups of 3 and start installing software to run our Jekyll setup. </a:t>
+            </a:r>
+          </a:p>
+        </p:txBody>
+      </p:sp>
+    </p:spTree>
+  </p:cSld>
+  <p:clrMapOvr>
+    <a:masterClrMapping/>
+  </p:clrMapOvr>
+</p:notes>
+</file>
+
+<file path=ppt/notesSlides/notesSlide2.xml><?xml version="1.0" encoding="utf-8"?>
+<p:notes xmlns:a="http://schemas.openxmlformats.org/drawingml/2006/main" xmlns:r="http://schemas.openxmlformats.org/officeDocument/2006/relationships" xmlns:p="http://schemas.openxmlformats.org/presentationml/2006/main" showMasterSp="1" showMasterPhAnim="1">
+  <p:cSld>
+    <p:spTree>
+      <p:nvGrpSpPr>
+        <p:cNvPr id="1" name=""/>
+        <p:cNvGrpSpPr/>
+        <p:nvPr/>
+      </p:nvGrpSpPr>
+      <p:grpSpPr>
+        <a:xfrm>
+          <a:off x="0" y="0"/>
+          <a:ext cx="0" cy="0"/>
+          <a:chOff x="0" y="0"/>
+          <a:chExt cx="0" cy="0"/>
+        </a:xfrm>
+      </p:grpSpPr>
+      <p:sp>
+        <p:nvSpPr>
+          <p:cNvPr id="202" name="Shape 202"/>
+          <p:cNvSpPr/>
+          <p:nvPr>
+            <p:ph type="sldImg"/>
+          </p:nvPr>
+        </p:nvSpPr>
+        <p:spPr>
+          <a:prstGeom prst="rect">
+            <a:avLst/>
+          </a:prstGeom>
+        </p:spPr>
+        <p:txBody>
+          <a:bodyPr/>
+          <a:lstStyle/>
+          <a:p>
+            <a:pPr/>
+          </a:p>
+        </p:txBody>
+      </p:sp>
+      <p:sp>
+        <p:nvSpPr>
+          <p:cNvPr id="203" name="Shape 203"/>
+          <p:cNvSpPr/>
+          <p:nvPr>
+            <p:ph type="body" sz="quarter" idx="1"/>
+          </p:nvPr>
+        </p:nvSpPr>
+        <p:spPr>
+          <a:prstGeom prst="rect">
+            <a:avLst/>
+          </a:prstGeom>
+        </p:spPr>
+        <p:txBody>
+          <a:bodyPr/>
+          <a:lstStyle/>
+          <a:p>
+            <a:pPr/>
+            <a:r>
+              <a:t>First open the command line — ask someone if you don’t know where that is. </a:t>
+            </a:r>
+          </a:p>
+          <a:p>
+            <a:pPr/>
+          </a:p>
+          <a:p>
+            <a:pPr/>
+            <a:r>
+              <a:t>Then go to the git website to download git — git is a software for version controlling code. A lot of code that is shared open source is shared through services like github that are version control systems but also can function as social networks to share code. </a:t>
+            </a:r>
+          </a:p>
+          <a:p>
+            <a:pPr/>
+          </a:p>
+          <a:p>
+            <a:pPr/>
+            <a:r>
+              <a:t>We can confirm install by checking the git version. </a:t>
+            </a:r>
+          </a:p>
+        </p:txBody>
+      </p:sp>
+    </p:spTree>
+  </p:cSld>
+  <p:clrMapOvr>
+    <a:masterClrMapping/>
+  </p:clrMapOvr>
+</p:notes>
+</file>
+
+<file path=ppt/notesSlides/notesSlide3.xml><?xml version="1.0" encoding="utf-8"?>
+<p:notes xmlns:a="http://schemas.openxmlformats.org/drawingml/2006/main" xmlns:r="http://schemas.openxmlformats.org/officeDocument/2006/relationships" xmlns:p="http://schemas.openxmlformats.org/presentationml/2006/main" showMasterSp="1" showMasterPhAnim="1">
+  <p:cSld>
+    <p:spTree>
+      <p:nvGrpSpPr>
+        <p:cNvPr id="1" name=""/>
+        <p:cNvGrpSpPr/>
+        <p:nvPr/>
+      </p:nvGrpSpPr>
+      <p:grpSpPr>
+        <a:xfrm>
+          <a:off x="0" y="0"/>
+          <a:ext cx="0" cy="0"/>
+          <a:chOff x="0" y="0"/>
+          <a:chExt cx="0" cy="0"/>
+        </a:xfrm>
+      </p:grpSpPr>
+      <p:sp>
+        <p:nvSpPr>
+          <p:cNvPr id="209" name="Shape 209"/>
+          <p:cNvSpPr/>
+          <p:nvPr>
+            <p:ph type="sldImg"/>
+          </p:nvPr>
+        </p:nvSpPr>
+        <p:spPr>
+          <a:prstGeom prst="rect">
+            <a:avLst/>
+          </a:prstGeom>
+        </p:spPr>
+        <p:txBody>
+          <a:bodyPr/>
+          <a:lstStyle/>
+          <a:p>
+            <a:pPr/>
+          </a:p>
+        </p:txBody>
+      </p:sp>
+      <p:sp>
+        <p:nvSpPr>
+          <p:cNvPr id="210" name="Shape 210"/>
+          <p:cNvSpPr/>
+          <p:nvPr>
+            <p:ph type="body" sz="quarter" idx="1"/>
+          </p:nvPr>
+        </p:nvSpPr>
+        <p:spPr>
+          <a:prstGeom prst="rect">
+            <a:avLst/>
+          </a:prstGeom>
+        </p:spPr>
+        <p:txBody>
+          <a:bodyPr/>
+          <a:lstStyle/>
+          <a:p>
+            <a:pPr/>
+            <a:r>
+              <a:t>Next let’s set up git to configure the variables associated with any changes you make….</a:t>
+            </a:r>
+          </a:p>
+        </p:txBody>
+      </p:sp>
+    </p:spTree>
+  </p:cSld>
+  <p:clrMapOvr>
+    <a:masterClrMapping/>
+  </p:clrMapOvr>
+</p:notes>
+</file>
+
+<file path=ppt/notesSlides/notesSlide4.xml><?xml version="1.0" encoding="utf-8"?>
+<p:notes xmlns:a="http://schemas.openxmlformats.org/drawingml/2006/main" xmlns:r="http://schemas.openxmlformats.org/officeDocument/2006/relationships" xmlns:p="http://schemas.openxmlformats.org/presentationml/2006/main" showMasterSp="1" showMasterPhAnim="1">
+  <p:cSld>
+    <p:spTree>
+      <p:nvGrpSpPr>
+        <p:cNvPr id="1" name=""/>
+        <p:cNvGrpSpPr/>
+        <p:nvPr/>
+      </p:nvGrpSpPr>
+      <p:grpSpPr>
+        <a:xfrm>
+          <a:off x="0" y="0"/>
+          <a:ext cx="0" cy="0"/>
+          <a:chOff x="0" y="0"/>
+          <a:chExt cx="0" cy="0"/>
+        </a:xfrm>
+      </p:grpSpPr>
+      <p:sp>
+        <p:nvSpPr>
+          <p:cNvPr id="221" name="Shape 221"/>
+          <p:cNvSpPr/>
+          <p:nvPr>
+            <p:ph type="sldImg"/>
+          </p:nvPr>
+        </p:nvSpPr>
+        <p:spPr>
+          <a:prstGeom prst="rect">
+            <a:avLst/>
+          </a:prstGeom>
+        </p:spPr>
+        <p:txBody>
+          <a:bodyPr/>
+          <a:lstStyle/>
+          <a:p>
+            <a:pPr/>
+          </a:p>
+        </p:txBody>
+      </p:sp>
+      <p:sp>
+        <p:nvSpPr>
+          <p:cNvPr id="222" name="Shape 222"/>
+          <p:cNvSpPr/>
+          <p:nvPr>
+            <p:ph type="body" sz="quarter" idx="1"/>
+          </p:nvPr>
+        </p:nvSpPr>
+        <p:spPr>
+          <a:prstGeom prst="rect">
+            <a:avLst/>
+          </a:prstGeom>
+        </p:spPr>
+        <p:txBody>
+          <a:bodyPr/>
+          <a:lstStyle/>
+          <a:p>
+            <a:pPr/>
+            <a:r>
+              <a:t>Homebrew (OS X)</a:t>
+            </a:r>
+          </a:p>
+          <a:p>
+            <a:pPr/>
+            <a:r>
+              <a:t>On macOS (High) Sierra and OS X El Capitan, Ruby 2.0 is included.</a:t>
+            </a:r>
+          </a:p>
+          <a:p>
+            <a:pPr/>
+          </a:p>
+          <a:p>
+            <a:pPr/>
+            <a:r>
+              <a:t>Many people on OS X use Homebrew as a package manager. It is really easy to get a newer version of Ruby using Homebrew:</a:t>
+            </a:r>
+          </a:p>
+          <a:p>
+            <a:pPr/>
+          </a:p>
+          <a:p>
+            <a:pPr/>
+            <a:r>
+              <a:t>$ brew install ruby</a:t>
+            </a:r>
+          </a:p>
+          <a:p>
+            <a:pPr/>
+            <a:r>
+              <a:t>This should install the latest Ruby version.</a:t>
+            </a:r>
+          </a:p>
+          <a:p>
+            <a:pPr/>
+          </a:p>
+          <a:p>
+            <a:pPr/>
+            <a:r>
+              <a:t>RubyInstaller</a:t>
+            </a:r>
+          </a:p>
+          <a:p>
+            <a:pPr/>
+            <a:r>
+              <a:t>If you are on Windows, there is a great project to help you install Ruby: RubyInstaller. It gives you everything you need to set up a full Ruby development environment on Windows.</a:t>
+            </a:r>
+          </a:p>
+          <a:p>
+            <a:pPr/>
+          </a:p>
+          <a:p>
+            <a:pPr/>
+            <a:r>
+              <a:t>Just download it, run it, and you are done!</a:t>
+            </a:r>
+          </a:p>
+          <a:p>
+            <a:pPr/>
+          </a:p>
+        </p:txBody>
+      </p:sp>
+    </p:spTree>
+  </p:cSld>
+  <p:clrMapOvr>
+    <a:masterClrMapping/>
+  </p:clrMapOvr>
+</p:notes>
+</file>
+
+<file path=ppt/notesSlides/notesSlide5.xml><?xml version="1.0" encoding="utf-8"?>
+<p:notes xmlns:a="http://schemas.openxmlformats.org/drawingml/2006/main" xmlns:r="http://schemas.openxmlformats.org/officeDocument/2006/relationships" xmlns:p="http://schemas.openxmlformats.org/presentationml/2006/main" showMasterSp="1" showMasterPhAnim="1">
+  <p:cSld>
+    <p:spTree>
+      <p:nvGrpSpPr>
+        <p:cNvPr id="1" name=""/>
+        <p:cNvGrpSpPr/>
+        <p:nvPr/>
+      </p:nvGrpSpPr>
+      <p:grpSpPr>
+        <a:xfrm>
+          <a:off x="0" y="0"/>
+          <a:ext cx="0" cy="0"/>
+          <a:chOff x="0" y="0"/>
+          <a:chExt cx="0" cy="0"/>
+        </a:xfrm>
+      </p:grpSpPr>
+      <p:sp>
+        <p:nvSpPr>
+          <p:cNvPr id="240" name="Shape 240"/>
+          <p:cNvSpPr/>
+          <p:nvPr>
+            <p:ph type="sldImg"/>
+          </p:nvPr>
+        </p:nvSpPr>
+        <p:spPr>
+          <a:prstGeom prst="rect">
+            <a:avLst/>
+          </a:prstGeom>
+        </p:spPr>
+        <p:txBody>
+          <a:bodyPr/>
+          <a:lstStyle/>
+          <a:p>
+            <a:pPr/>
+          </a:p>
+        </p:txBody>
+      </p:sp>
+      <p:sp>
+        <p:nvSpPr>
+          <p:cNvPr id="241" name="Shape 241"/>
+          <p:cNvSpPr/>
+          <p:nvPr>
+            <p:ph type="body" sz="quarter" idx="1"/>
+          </p:nvPr>
+        </p:nvSpPr>
+        <p:spPr>
+          <a:prstGeom prst="rect">
+            <a:avLst/>
+          </a:prstGeom>
+        </p:spPr>
+        <p:txBody>
+          <a:bodyPr/>
+          <a:lstStyle/>
+          <a:p>
+            <a:pPr/>
+            <a:r>
+              <a:t>Front matter is used to tell Jekyll how a Markdown file should be processed.</a:t>
+            </a:r>
+          </a:p>
+          <a:p>
+            <a:pPr/>
+          </a:p>
+          <a:p>
+            <a:pPr/>
+            <a:r>
+              <a:t>This file will create a blog post with the post layout titled “YAML front matter in posts”. It will be tagged with jekyll, dactl and howto. It will have a hero image (specified in hero url above) and an orange overlay.</a:t>
+            </a:r>
+          </a:p>
+          <a:p>
+            <a:pPr/>
+          </a:p>
+          <a:p>
+            <a:pPr/>
+            <a:r>
+              <a:t>---</a:t>
+            </a:r>
+          </a:p>
+          <a:p>
+            <a:pPr/>
+            <a:r>
+              <a:t>layout: post</a:t>
+            </a:r>
+          </a:p>
+          <a:p>
+            <a:pPr/>
+            <a:r>
+              <a:t>title: YAML front matter in posts</a:t>
+            </a:r>
+          </a:p>
+          <a:p>
+            <a:pPr/>
+            <a:r>
+              <a:t>tags:</a:t>
+            </a:r>
+          </a:p>
+          <a:p>
+            <a:pPr/>
+            <a:r>
+              <a:t>  - jekyll</a:t>
+            </a:r>
+          </a:p>
+          <a:p>
+            <a:pPr/>
+            <a:r>
+              <a:t>  - dactl</a:t>
+            </a:r>
+          </a:p>
+          <a:p>
+            <a:pPr/>
+            <a:r>
+              <a:t>  - howto</a:t>
+            </a:r>
+          </a:p>
+          <a:p>
+            <a:pPr/>
+            <a:r>
+              <a:t>hero: https://source.unsplash.com/collection/345758/</a:t>
+            </a:r>
+          </a:p>
+          <a:p>
+            <a:pPr/>
+            <a:r>
+              <a:t>overlay: orange</a:t>
+            </a:r>
+          </a:p>
+          <a:p>
+            <a:pPr/>
+            <a:r>
+              <a:t>---</a:t>
+            </a:r>
+          </a:p>
+        </p:txBody>
+      </p:sp>
+    </p:spTree>
+  </p:cSld>
+  <p:clrMapOvr>
+    <a:masterClrMapping/>
+  </p:clrMapOvr>
+</p:notes>
 </file>
 
 <file path=ppt/slideLayouts/slideLayout1.xml><?xml version="1.0" encoding="utf-8"?>
@@ -4691,1328 +5194,9 @@
           <a:chExt cx="0" cy="0"/>
         </a:xfrm>
       </p:grpSpPr>
-      <p:sp>
-        <p:nvSpPr>
-          <p:cNvPr id="166" name="Shape 166"/>
-          <p:cNvSpPr/>
-          <p:nvPr>
-            <p:ph type="ctrTitle"/>
-          </p:nvPr>
-        </p:nvSpPr>
-        <p:spPr>
-          <a:prstGeom prst="rect">
-            <a:avLst/>
-          </a:prstGeom>
-        </p:spPr>
-        <p:txBody>
-          <a:bodyPr/>
-          <a:lstStyle>
-            <a:lvl1pPr defTabSz="368045">
-              <a:defRPr sz="10710"/>
-            </a:lvl1pPr>
-          </a:lstStyle>
-          <a:p>
-            <a:pPr/>
-            <a:r>
-              <a:t>CREATE A BLOG WITH JEKYLL</a:t>
-            </a:r>
-          </a:p>
-        </p:txBody>
-      </p:sp>
-      <p:sp>
-        <p:nvSpPr>
-          <p:cNvPr id="167" name="Shape 167"/>
-          <p:cNvSpPr/>
-          <p:nvPr>
-            <p:ph type="subTitle" sz="quarter" idx="1"/>
-          </p:nvPr>
-        </p:nvSpPr>
-        <p:spPr>
-          <a:prstGeom prst="rect">
-            <a:avLst/>
-          </a:prstGeom>
-        </p:spPr>
-        <p:txBody>
-          <a:bodyPr/>
-          <a:lstStyle/>
-          <a:p>
-            <a:pPr/>
-            <a:r>
-              <a:t>cOdeland 2018 | by monica powell</a:t>
-            </a:r>
-          </a:p>
-        </p:txBody>
-      </p:sp>
-    </p:spTree>
-  </p:cSld>
-  <p:clrMapOvr>
-    <a:masterClrMapping/>
-  </p:clrMapOvr>
-  <p:transition xmlns:p14="http://schemas.microsoft.com/office/powerpoint/2010/main" spd="med" advClick="1"/>
-</p:sld>
-</file>
-
-<file path=ppt/slides/slide10.xml><?xml version="1.0" encoding="utf-8"?>
-<p:sld xmlns:a="http://schemas.openxmlformats.org/drawingml/2006/main" xmlns:r="http://schemas.openxmlformats.org/officeDocument/2006/relationships" xmlns:p="http://schemas.openxmlformats.org/presentationml/2006/main" showMasterSp="1" showMasterPhAnim="1">
-  <p:cSld>
-    <p:bg>
-      <p:bgPr>
-        <a:solidFill>
-          <a:srgbClr val="EBEBEB"/>
-        </a:solidFill>
-      </p:bgPr>
-    </p:bg>
-    <p:spTree>
-      <p:nvGrpSpPr>
-        <p:cNvPr id="1" name=""/>
-        <p:cNvGrpSpPr/>
-        <p:nvPr/>
-      </p:nvGrpSpPr>
-      <p:grpSpPr>
-        <a:xfrm>
-          <a:off x="0" y="0"/>
-          <a:ext cx="0" cy="0"/>
-          <a:chOff x="0" y="0"/>
-          <a:chExt cx="0" cy="0"/>
-        </a:xfrm>
-      </p:grpSpPr>
-      <p:sp>
-        <p:nvSpPr>
-          <p:cNvPr id="204" name="Shape 204"/>
-          <p:cNvSpPr/>
-          <p:nvPr>
-            <p:ph type="body" idx="13"/>
-          </p:nvPr>
-        </p:nvSpPr>
-        <p:spPr>
-          <a:prstGeom prst="rect">
-            <a:avLst/>
-          </a:prstGeom>
-        </p:spPr>
-        <p:txBody>
-          <a:bodyPr/>
-          <a:lstStyle/>
-          <a:p>
-            <a:pPr/>
-            <a:r>
-              <a:t>Create a blog with jekyll</a:t>
-            </a:r>
-          </a:p>
-        </p:txBody>
-      </p:sp>
-      <p:sp>
-        <p:nvSpPr>
-          <p:cNvPr id="205" name="Shape 205"/>
-          <p:cNvSpPr/>
-          <p:nvPr>
-            <p:ph type="title"/>
-          </p:nvPr>
-        </p:nvSpPr>
-        <p:spPr>
-          <a:prstGeom prst="rect">
-            <a:avLst/>
-          </a:prstGeom>
-        </p:spPr>
-        <p:txBody>
-          <a:bodyPr/>
-          <a:lstStyle>
-            <a:lvl1pPr defTabSz="467359">
-              <a:spcBef>
-                <a:spcPts val="2200"/>
-              </a:spcBef>
-              <a:defRPr sz="4800"/>
-            </a:lvl1pPr>
-          </a:lstStyle>
-          <a:p>
-            <a:pPr/>
-            <a:r>
-              <a:t>Installation fest</a:t>
-            </a:r>
-          </a:p>
-        </p:txBody>
-      </p:sp>
-      <p:sp>
-        <p:nvSpPr>
-          <p:cNvPr id="206" name="Shape 206"/>
-          <p:cNvSpPr/>
-          <p:nvPr>
-            <p:ph type="body" idx="1"/>
-          </p:nvPr>
-        </p:nvSpPr>
-        <p:spPr>
-          <a:xfrm>
-            <a:off x="406400" y="2791177"/>
-            <a:ext cx="12192000" cy="6108701"/>
-          </a:xfrm>
-          <a:prstGeom prst="rect">
-            <a:avLst/>
-          </a:prstGeom>
-        </p:spPr>
-        <p:txBody>
-          <a:bodyPr/>
-          <a:lstStyle/>
-          <a:p>
-            <a:pPr>
-              <a:defRPr i="1"/>
-            </a:pPr>
-            <a:r>
-              <a:t>Configure git:</a:t>
-            </a:r>
-          </a:p>
-          <a:p>
-            <a:pPr lvl="1">
-              <a:defRPr i="1"/>
-            </a:pPr>
-            <a:r>
-              <a:t>`$ git config --global user.name "John Doe"</a:t>
-            </a:r>
-          </a:p>
-          <a:p>
-            <a:pPr lvl="1">
-              <a:defRPr i="1"/>
-            </a:pPr>
-            <a:r>
-              <a:t>$ git config --global user.email johndoe@example.com```</a:t>
-            </a:r>
-          </a:p>
-          <a:p>
-            <a:pPr lvl="1">
-              <a:defRPr i="1"/>
-            </a:pPr>
-          </a:p>
-          <a:p>
-            <a:pPr>
-              <a:defRPr i="1"/>
-            </a:pPr>
-            <a:r>
-              <a:t>Install Ruby</a:t>
-            </a:r>
-          </a:p>
-        </p:txBody>
-      </p:sp>
-      <p:sp>
-        <p:nvSpPr>
-          <p:cNvPr id="207" name="Shape 207"/>
-          <p:cNvSpPr/>
-          <p:nvPr>
-            <p:ph type="sldNum" sz="quarter" idx="4294967295"/>
-          </p:nvPr>
-        </p:nvSpPr>
-        <p:spPr>
-          <a:prstGeom prst="rect">
-            <a:avLst/>
-          </a:prstGeom>
-          <a:extLst>
-            <a:ext uri="{C572A759-6A51-4108-AA02-DFA0A04FC94B}">
-              <ma14:wrappingTextBoxFlag xmlns:ma14="http://schemas.microsoft.com/office/mac/drawingml/2011/main" val="1"/>
-            </a:ext>
-          </a:extLst>
-        </p:spPr>
-        <p:txBody>
-          <a:bodyPr/>
-          <a:lstStyle/>
-          <a:p>
-            <a:pPr/>
-            <a:fld id="{86CB4B4D-7CA3-9044-876B-883B54F8677D}" type="slidenum"/>
-          </a:p>
-        </p:txBody>
-      </p:sp>
-    </p:spTree>
-  </p:cSld>
-  <p:clrMapOvr>
-    <a:masterClrMapping/>
-  </p:clrMapOvr>
-  <p:transition xmlns:p14="http://schemas.microsoft.com/office/powerpoint/2010/main" spd="med" advClick="1" p14:dur="1000"/>
-</p:sld>
-</file>
-
-<file path=ppt/slides/slide11.xml><?xml version="1.0" encoding="utf-8"?>
-<p:sld xmlns:a="http://schemas.openxmlformats.org/drawingml/2006/main" xmlns:r="http://schemas.openxmlformats.org/officeDocument/2006/relationships" xmlns:p="http://schemas.openxmlformats.org/presentationml/2006/main" showMasterSp="1" showMasterPhAnim="1">
-  <p:cSld>
-    <p:bg>
-      <p:bgPr>
-        <a:solidFill>
-          <a:srgbClr val="EBEBEB"/>
-        </a:solidFill>
-      </p:bgPr>
-    </p:bg>
-    <p:spTree>
-      <p:nvGrpSpPr>
-        <p:cNvPr id="1" name=""/>
-        <p:cNvGrpSpPr/>
-        <p:nvPr/>
-      </p:nvGrpSpPr>
-      <p:grpSpPr>
-        <a:xfrm>
-          <a:off x="0" y="0"/>
-          <a:ext cx="0" cy="0"/>
-          <a:chOff x="0" y="0"/>
-          <a:chExt cx="0" cy="0"/>
-        </a:xfrm>
-      </p:grpSpPr>
-      <p:sp>
-        <p:nvSpPr>
-          <p:cNvPr id="209" name="Shape 209"/>
-          <p:cNvSpPr/>
-          <p:nvPr>
-            <p:ph type="body" idx="13"/>
-          </p:nvPr>
-        </p:nvSpPr>
-        <p:spPr>
-          <a:prstGeom prst="rect">
-            <a:avLst/>
-          </a:prstGeom>
-        </p:spPr>
-        <p:txBody>
-          <a:bodyPr/>
-          <a:lstStyle/>
-          <a:p>
-            <a:pPr/>
-            <a:r>
-              <a:t>Create a blog with jekyll</a:t>
-            </a:r>
-          </a:p>
-        </p:txBody>
-      </p:sp>
-      <p:sp>
-        <p:nvSpPr>
-          <p:cNvPr id="210" name="Shape 210"/>
-          <p:cNvSpPr/>
-          <p:nvPr>
-            <p:ph type="title"/>
-          </p:nvPr>
-        </p:nvSpPr>
-        <p:spPr>
-          <a:prstGeom prst="rect">
-            <a:avLst/>
-          </a:prstGeom>
-        </p:spPr>
-        <p:txBody>
-          <a:bodyPr/>
-          <a:lstStyle>
-            <a:lvl1pPr defTabSz="467359">
-              <a:spcBef>
-                <a:spcPts val="2200"/>
-              </a:spcBef>
-              <a:defRPr sz="4800"/>
-            </a:lvl1pPr>
-          </a:lstStyle>
-          <a:p>
-            <a:pPr/>
-            <a:r>
-              <a:t>Installation fest</a:t>
-            </a:r>
-          </a:p>
-        </p:txBody>
-      </p:sp>
-      <p:sp>
-        <p:nvSpPr>
-          <p:cNvPr id="211" name="Shape 211"/>
-          <p:cNvSpPr/>
-          <p:nvPr>
-            <p:ph type="body" idx="1"/>
-          </p:nvPr>
-        </p:nvSpPr>
-        <p:spPr>
-          <a:xfrm>
-            <a:off x="406400" y="2791177"/>
-            <a:ext cx="12192000" cy="6108701"/>
-          </a:xfrm>
-          <a:prstGeom prst="rect">
-            <a:avLst/>
-          </a:prstGeom>
-        </p:spPr>
-        <p:txBody>
-          <a:bodyPr/>
-          <a:lstStyle/>
-          <a:p>
-            <a:pPr>
-              <a:defRPr i="1"/>
-            </a:pPr>
-            <a:r>
-              <a:t>On </a:t>
-            </a:r>
-            <a:r>
-              <a:rPr u="sng">
-                <a:solidFill>
-                  <a:schemeClr val="accent1"/>
-                </a:solidFill>
-                <a:hlinkClick r:id="rId2" invalidUrl="" action="" tgtFrame="" tooltip="" history="1" highlightClick="0" endSnd="0"/>
-              </a:rPr>
-              <a:t>GitHub.com</a:t>
-            </a:r>
-            <a:r>
-              <a:t> fork this repository </a:t>
-            </a:r>
-            <a:r>
-              <a:rPr u="sng">
-                <a:solidFill>
-                  <a:schemeClr val="accent1"/>
-                </a:solidFill>
-                <a:hlinkClick r:id="rId3" invalidUrl="" action="" tgtFrame="" tooltip="" history="1" highlightClick="0" endSnd="0"/>
-              </a:rPr>
-              <a:t>https://github.com/M0nica/dactl</a:t>
-            </a:r>
-          </a:p>
-          <a:p>
-            <a:pPr>
-              <a:defRPr i="1"/>
-            </a:pPr>
-            <a:r>
-              <a:t>On command line:</a:t>
-            </a:r>
-          </a:p>
-          <a:p>
-            <a:pPr lvl="1">
-              <a:defRPr i="1"/>
-            </a:pPr>
-            <a:r>
-              <a:t>Git clone </a:t>
-            </a:r>
-            <a:r>
-              <a:rPr u="sng">
-                <a:solidFill>
-                  <a:schemeClr val="accent1"/>
-                </a:solidFill>
-                <a:hlinkClick r:id="rId4" invalidUrl="" action="" tgtFrame="" tooltip="" history="1" highlightClick="0" endSnd="0"/>
-              </a:rPr>
-              <a:t>https://github.com/YOUR_USERNAME/dactl</a:t>
-            </a:r>
-          </a:p>
-          <a:p>
-            <a:pPr>
-              <a:defRPr i="1"/>
-            </a:pPr>
-            <a:r>
-              <a:t> `cd dactl`</a:t>
-            </a:r>
-          </a:p>
-          <a:p>
-            <a:pPr>
-              <a:defRPr i="1"/>
-            </a:pPr>
-            <a:r>
-              <a:t>`bundle install` </a:t>
-            </a:r>
-          </a:p>
-          <a:p>
-            <a:pPr>
-              <a:defRPr i="1"/>
-            </a:pPr>
-            <a:r>
-              <a:t>`jekyll -s`</a:t>
-            </a:r>
-          </a:p>
-        </p:txBody>
-      </p:sp>
-      <p:sp>
-        <p:nvSpPr>
-          <p:cNvPr id="212" name="Shape 212"/>
-          <p:cNvSpPr/>
-          <p:nvPr>
-            <p:ph type="sldNum" sz="quarter" idx="4294967295"/>
-          </p:nvPr>
-        </p:nvSpPr>
-        <p:spPr>
-          <a:prstGeom prst="rect">
-            <a:avLst/>
-          </a:prstGeom>
-          <a:extLst>
-            <a:ext uri="{C572A759-6A51-4108-AA02-DFA0A04FC94B}">
-              <ma14:wrappingTextBoxFlag xmlns:ma14="http://schemas.microsoft.com/office/mac/drawingml/2011/main" val="1"/>
-            </a:ext>
-          </a:extLst>
-        </p:spPr>
-        <p:txBody>
-          <a:bodyPr/>
-          <a:lstStyle/>
-          <a:p>
-            <a:pPr/>
-            <a:fld id="{86CB4B4D-7CA3-9044-876B-883B54F8677D}" type="slidenum"/>
-          </a:p>
-        </p:txBody>
-      </p:sp>
-    </p:spTree>
-  </p:cSld>
-  <p:clrMapOvr>
-    <a:masterClrMapping/>
-  </p:clrMapOvr>
-  <p:transition xmlns:p14="http://schemas.microsoft.com/office/powerpoint/2010/main" spd="med" advClick="1" p14:dur="1000"/>
-</p:sld>
-</file>
-
-<file path=ppt/slides/slide2.xml><?xml version="1.0" encoding="utf-8"?>
-<p:sld xmlns:a="http://schemas.openxmlformats.org/drawingml/2006/main" xmlns:r="http://schemas.openxmlformats.org/officeDocument/2006/relationships" xmlns:p="http://schemas.openxmlformats.org/presentationml/2006/main" showMasterSp="1" showMasterPhAnim="1">
-  <p:cSld>
-    <p:bg>
-      <p:bgPr>
-        <a:solidFill>
-          <a:srgbClr val="EBEBEB"/>
-        </a:solidFill>
-      </p:bgPr>
-    </p:bg>
-    <p:spTree>
-      <p:nvGrpSpPr>
-        <p:cNvPr id="1" name=""/>
-        <p:cNvGrpSpPr/>
-        <p:nvPr/>
-      </p:nvGrpSpPr>
-      <p:grpSpPr>
-        <a:xfrm>
-          <a:off x="0" y="0"/>
-          <a:ext cx="0" cy="0"/>
-          <a:chOff x="0" y="0"/>
-          <a:chExt cx="0" cy="0"/>
-        </a:xfrm>
-      </p:grpSpPr>
-      <p:sp>
-        <p:nvSpPr>
-          <p:cNvPr id="169" name="Shape 169"/>
-          <p:cNvSpPr/>
-          <p:nvPr>
-            <p:ph type="body" idx="13"/>
-          </p:nvPr>
-        </p:nvSpPr>
-        <p:spPr>
-          <a:prstGeom prst="rect">
-            <a:avLst/>
-          </a:prstGeom>
-        </p:spPr>
-        <p:txBody>
-          <a:bodyPr/>
-          <a:lstStyle/>
-          <a:p>
-            <a:pPr/>
-            <a:r>
-              <a:t>Create a blog with jekyll</a:t>
-            </a:r>
-          </a:p>
-        </p:txBody>
-      </p:sp>
-      <p:sp>
-        <p:nvSpPr>
-          <p:cNvPr id="170" name="Shape 170"/>
-          <p:cNvSpPr/>
-          <p:nvPr>
-            <p:ph type="title"/>
-          </p:nvPr>
-        </p:nvSpPr>
-        <p:spPr>
-          <a:prstGeom prst="rect">
-            <a:avLst/>
-          </a:prstGeom>
-        </p:spPr>
-        <p:txBody>
-          <a:bodyPr/>
-          <a:lstStyle>
-            <a:lvl1pPr defTabSz="467359">
-              <a:spcBef>
-                <a:spcPts val="2200"/>
-              </a:spcBef>
-              <a:defRPr sz="4800"/>
-            </a:lvl1pPr>
-          </a:lstStyle>
-          <a:p>
-            <a:pPr/>
-            <a:r>
-              <a:t>Hello!</a:t>
-            </a:r>
-          </a:p>
-        </p:txBody>
-      </p:sp>
-      <p:sp>
-        <p:nvSpPr>
-          <p:cNvPr id="171" name="Shape 171"/>
-          <p:cNvSpPr/>
-          <p:nvPr>
-            <p:ph type="body" idx="1"/>
-          </p:nvPr>
-        </p:nvSpPr>
-        <p:spPr>
-          <a:xfrm>
-            <a:off x="406400" y="2749550"/>
-            <a:ext cx="12192000" cy="6108701"/>
-          </a:xfrm>
-          <a:prstGeom prst="rect">
-            <a:avLst/>
-          </a:prstGeom>
-        </p:spPr>
-        <p:txBody>
-          <a:bodyPr/>
-          <a:lstStyle/>
-          <a:p>
-            <a:pPr/>
-            <a:r>
-              <a:t>Monica Powell, Instructor</a:t>
-            </a:r>
-          </a:p>
-          <a:p>
-            <a:pPr lvl="1"/>
-            <a:r>
-              <a:t>Who am I?</a:t>
-            </a:r>
-          </a:p>
-          <a:p>
-            <a:pPr/>
-          </a:p>
-          <a:p>
-            <a:pPr/>
-            <a:r>
-              <a:t>Nia Murrell, TA</a:t>
-            </a:r>
-          </a:p>
-          <a:p>
-            <a:pPr lvl="1"/>
-            <a:r>
-              <a:t>Who is she?</a:t>
-            </a:r>
-          </a:p>
-        </p:txBody>
-      </p:sp>
-      <p:sp>
-        <p:nvSpPr>
-          <p:cNvPr id="172" name="Shape 172"/>
-          <p:cNvSpPr/>
-          <p:nvPr>
-            <p:ph type="sldNum" sz="quarter" idx="4294967295"/>
-          </p:nvPr>
-        </p:nvSpPr>
-        <p:spPr>
-          <a:xfrm>
-            <a:off x="12332920" y="431800"/>
-            <a:ext cx="260599" cy="457200"/>
-          </a:xfrm>
-          <a:prstGeom prst="rect">
-            <a:avLst/>
-          </a:prstGeom>
-          <a:extLst>
-            <a:ext uri="{C572A759-6A51-4108-AA02-DFA0A04FC94B}">
-              <ma14:wrappingTextBoxFlag xmlns:ma14="http://schemas.microsoft.com/office/mac/drawingml/2011/main" val="1"/>
-            </a:ext>
-          </a:extLst>
-        </p:spPr>
-        <p:txBody>
-          <a:bodyPr/>
-          <a:lstStyle/>
-          <a:p>
-            <a:pPr/>
-            <a:fld id="{86CB4B4D-7CA3-9044-876B-883B54F8677D}" type="slidenum"/>
-          </a:p>
-        </p:txBody>
-      </p:sp>
-    </p:spTree>
-  </p:cSld>
-  <p:clrMapOvr>
-    <a:masterClrMapping/>
-  </p:clrMapOvr>
-  <p:transition xmlns:p14="http://schemas.microsoft.com/office/powerpoint/2010/main" spd="med" advClick="1" p14:dur="1000"/>
-</p:sld>
-</file>
-
-<file path=ppt/slides/slide3.xml><?xml version="1.0" encoding="utf-8"?>
-<p:sld xmlns:a="http://schemas.openxmlformats.org/drawingml/2006/main" xmlns:r="http://schemas.openxmlformats.org/officeDocument/2006/relationships" xmlns:p="http://schemas.openxmlformats.org/presentationml/2006/main" showMasterSp="1" showMasterPhAnim="1">
-  <p:cSld>
-    <p:bg>
-      <p:bgPr>
-        <a:solidFill>
-          <a:srgbClr val="EBEBEB"/>
-        </a:solidFill>
-      </p:bgPr>
-    </p:bg>
-    <p:spTree>
-      <p:nvGrpSpPr>
-        <p:cNvPr id="1" name=""/>
-        <p:cNvGrpSpPr/>
-        <p:nvPr/>
-      </p:nvGrpSpPr>
-      <p:grpSpPr>
-        <a:xfrm>
-          <a:off x="0" y="0"/>
-          <a:ext cx="0" cy="0"/>
-          <a:chOff x="0" y="0"/>
-          <a:chExt cx="0" cy="0"/>
-        </a:xfrm>
-      </p:grpSpPr>
-      <p:sp>
-        <p:nvSpPr>
-          <p:cNvPr id="174" name="Shape 174"/>
-          <p:cNvSpPr/>
-          <p:nvPr>
-            <p:ph type="title"/>
-          </p:nvPr>
-        </p:nvSpPr>
-        <p:spPr>
-          <a:xfrm>
-            <a:off x="406400" y="2616200"/>
-            <a:ext cx="12192000" cy="4521200"/>
-          </a:xfrm>
-          <a:prstGeom prst="rect">
-            <a:avLst/>
-          </a:prstGeom>
-        </p:spPr>
-        <p:txBody>
-          <a:bodyPr/>
-          <a:lstStyle/>
-          <a:p>
-            <a:pPr defTabSz="338835">
-              <a:defRPr sz="9860"/>
-            </a:pPr>
-            <a:r>
-              <a:t>Today we will create a static blog using </a:t>
-            </a:r>
-            <a:r>
-              <a:rPr>
-                <a:solidFill>
-                  <a:srgbClr val="011993"/>
-                </a:solidFill>
-              </a:rPr>
-              <a:t>Jekyll</a:t>
-            </a:r>
-            <a:r>
-              <a:t> and host it on </a:t>
-            </a:r>
-            <a:r>
-              <a:rPr>
-                <a:solidFill>
-                  <a:srgbClr val="011993"/>
-                </a:solidFill>
-              </a:rPr>
-              <a:t>github pages</a:t>
-            </a:r>
-            <a:r>
-              <a:t>.</a:t>
-            </a:r>
-          </a:p>
-        </p:txBody>
-      </p:sp>
-    </p:spTree>
-  </p:cSld>
-  <p:clrMapOvr>
-    <a:masterClrMapping/>
-  </p:clrMapOvr>
-  <p:transition xmlns:p14="http://schemas.microsoft.com/office/powerpoint/2010/main" spd="med" advClick="1" p14:dur="1000"/>
-</p:sld>
-</file>
-
-<file path=ppt/slides/slide4.xml><?xml version="1.0" encoding="utf-8"?>
-<p:sld xmlns:a="http://schemas.openxmlformats.org/drawingml/2006/main" xmlns:r="http://schemas.openxmlformats.org/officeDocument/2006/relationships" xmlns:p="http://schemas.openxmlformats.org/presentationml/2006/main" showMasterSp="1" showMasterPhAnim="1">
-  <p:cSld>
-    <p:bg>
-      <p:bgPr>
-        <a:solidFill>
-          <a:srgbClr val="EBEBEB"/>
-        </a:solidFill>
-      </p:bgPr>
-    </p:bg>
-    <p:spTree>
-      <p:nvGrpSpPr>
-        <p:cNvPr id="1" name=""/>
-        <p:cNvGrpSpPr/>
-        <p:nvPr/>
-      </p:nvGrpSpPr>
-      <p:grpSpPr>
-        <a:xfrm>
-          <a:off x="0" y="0"/>
-          <a:ext cx="0" cy="0"/>
-          <a:chOff x="0" y="0"/>
-          <a:chExt cx="0" cy="0"/>
-        </a:xfrm>
-      </p:grpSpPr>
-      <p:sp>
-        <p:nvSpPr>
-          <p:cNvPr id="176" name="Shape 176"/>
-          <p:cNvSpPr/>
-          <p:nvPr>
-            <p:ph type="body" idx="13"/>
-          </p:nvPr>
-        </p:nvSpPr>
-        <p:spPr>
-          <a:prstGeom prst="rect">
-            <a:avLst/>
-          </a:prstGeom>
-        </p:spPr>
-        <p:txBody>
-          <a:bodyPr/>
-          <a:lstStyle/>
-          <a:p>
-            <a:pPr/>
-            <a:r>
-              <a:t>Create a blog with jekyll</a:t>
-            </a:r>
-          </a:p>
-        </p:txBody>
-      </p:sp>
-      <p:sp>
-        <p:nvSpPr>
-          <p:cNvPr id="177" name="Shape 177"/>
-          <p:cNvSpPr/>
-          <p:nvPr>
-            <p:ph type="title"/>
-          </p:nvPr>
-        </p:nvSpPr>
-        <p:spPr>
-          <a:prstGeom prst="rect">
-            <a:avLst/>
-          </a:prstGeom>
-        </p:spPr>
-        <p:txBody>
-          <a:bodyPr/>
-          <a:lstStyle>
-            <a:lvl1pPr defTabSz="467359">
-              <a:spcBef>
-                <a:spcPts val="2200"/>
-              </a:spcBef>
-              <a:defRPr sz="4800"/>
-            </a:lvl1pPr>
-          </a:lstStyle>
-          <a:p>
-            <a:pPr/>
-            <a:r>
-              <a:t>Static vs dynamic websites</a:t>
-            </a:r>
-          </a:p>
-        </p:txBody>
-      </p:sp>
-      <p:sp>
-        <p:nvSpPr>
-          <p:cNvPr id="178" name="Shape 178"/>
-          <p:cNvSpPr/>
-          <p:nvPr>
-            <p:ph type="body" idx="1"/>
-          </p:nvPr>
-        </p:nvSpPr>
-        <p:spPr>
-          <a:xfrm>
-            <a:off x="406400" y="2749550"/>
-            <a:ext cx="12192000" cy="6108700"/>
-          </a:xfrm>
-          <a:prstGeom prst="rect">
-            <a:avLst/>
-          </a:prstGeom>
-        </p:spPr>
-        <p:txBody>
-          <a:bodyPr numCol="2" spcCol="609600"/>
-          <a:lstStyle/>
-          <a:p>
-            <a:pPr/>
-            <a:r>
-              <a:t>Static websites unlike dynamic websites:</a:t>
-            </a:r>
-          </a:p>
-          <a:p>
-            <a:pPr/>
-            <a:r>
-              <a:t>Never have databases </a:t>
-            </a:r>
-          </a:p>
-          <a:p>
-            <a:pPr/>
-            <a:r>
-              <a:t>Display the same information for all readers</a:t>
-            </a:r>
-          </a:p>
-          <a:p>
-            <a:pPr/>
-          </a:p>
-          <a:p>
-            <a:pPr/>
-          </a:p>
-          <a:p>
-            <a:pPr/>
-            <a:r>
-              <a:t>Less expensive to host</a:t>
-            </a:r>
-          </a:p>
-          <a:p>
-            <a:pPr/>
-            <a:r>
-              <a:t>Load faster</a:t>
-            </a:r>
-          </a:p>
-          <a:p>
-            <a:pPr/>
-            <a:r>
-              <a:t>Less prone to hacking</a:t>
-            </a:r>
-          </a:p>
-          <a:p>
-            <a:pPr/>
-            <a:r>
-              <a:t>Usually don’t have CMS</a:t>
-            </a:r>
-          </a:p>
-        </p:txBody>
-      </p:sp>
-      <p:sp>
-        <p:nvSpPr>
-          <p:cNvPr id="179" name="Shape 179"/>
-          <p:cNvSpPr/>
-          <p:nvPr>
-            <p:ph type="sldNum" sz="quarter" idx="4294967295"/>
-          </p:nvPr>
-        </p:nvSpPr>
-        <p:spPr>
-          <a:xfrm>
-            <a:off x="12332920" y="431800"/>
-            <a:ext cx="260599" cy="457200"/>
-          </a:xfrm>
-          <a:prstGeom prst="rect">
-            <a:avLst/>
-          </a:prstGeom>
-          <a:extLst>
-            <a:ext uri="{C572A759-6A51-4108-AA02-DFA0A04FC94B}">
-              <ma14:wrappingTextBoxFlag xmlns:ma14="http://schemas.microsoft.com/office/mac/drawingml/2011/main" val="1"/>
-            </a:ext>
-          </a:extLst>
-        </p:spPr>
-        <p:txBody>
-          <a:bodyPr/>
-          <a:lstStyle/>
-          <a:p>
-            <a:pPr/>
-            <a:fld id="{86CB4B4D-7CA3-9044-876B-883B54F8677D}" type="slidenum"/>
-          </a:p>
-        </p:txBody>
-      </p:sp>
-    </p:spTree>
-  </p:cSld>
-  <p:clrMapOvr>
-    <a:masterClrMapping/>
-  </p:clrMapOvr>
-  <p:transition xmlns:p14="http://schemas.microsoft.com/office/powerpoint/2010/main" spd="med" advClick="1" p14:dur="1000"/>
-</p:sld>
-</file>
-
-<file path=ppt/slides/slide5.xml><?xml version="1.0" encoding="utf-8"?>
-<p:sld xmlns:a="http://schemas.openxmlformats.org/drawingml/2006/main" xmlns:r="http://schemas.openxmlformats.org/officeDocument/2006/relationships" xmlns:p="http://schemas.openxmlformats.org/presentationml/2006/main" showMasterSp="1" showMasterPhAnim="1">
-  <p:cSld>
-    <p:bg>
-      <p:bgPr>
-        <a:solidFill>
-          <a:srgbClr val="EBEBEB"/>
-        </a:solidFill>
-      </p:bgPr>
-    </p:bg>
-    <p:spTree>
-      <p:nvGrpSpPr>
-        <p:cNvPr id="1" name=""/>
-        <p:cNvGrpSpPr/>
-        <p:nvPr/>
-      </p:nvGrpSpPr>
-      <p:grpSpPr>
-        <a:xfrm>
-          <a:off x="0" y="0"/>
-          <a:ext cx="0" cy="0"/>
-          <a:chOff x="0" y="0"/>
-          <a:chExt cx="0" cy="0"/>
-        </a:xfrm>
-      </p:grpSpPr>
-      <p:sp>
-        <p:nvSpPr>
-          <p:cNvPr id="181" name="Shape 181"/>
-          <p:cNvSpPr/>
-          <p:nvPr>
-            <p:ph type="body" idx="13"/>
-          </p:nvPr>
-        </p:nvSpPr>
-        <p:spPr>
-          <a:xfrm>
-            <a:off x="889000" y="2908300"/>
-            <a:ext cx="11226800" cy="4546600"/>
-          </a:xfrm>
-          <a:prstGeom prst="rect">
-            <a:avLst/>
-          </a:prstGeom>
-        </p:spPr>
-        <p:txBody>
-          <a:bodyPr/>
-          <a:lstStyle>
-            <a:lvl1pPr marL="444500" indent="-444500">
-              <a:lnSpc>
-                <a:spcPct val="100000"/>
-              </a:lnSpc>
-              <a:spcBef>
-                <a:spcPts val="2800"/>
-              </a:spcBef>
-              <a:buClr>
-                <a:schemeClr val="accent1"/>
-              </a:buClr>
-              <a:buSzPct val="104999"/>
-              <a:buFont typeface="Avenir Next"/>
-              <a:buChar char="▸"/>
-              <a:defRPr cap="none" i="1" sz="3400">
-                <a:latin typeface="Avenir Next Medium"/>
-                <a:ea typeface="Avenir Next Medium"/>
-                <a:cs typeface="Avenir Next Medium"/>
-                <a:sym typeface="Avenir Next Medium"/>
-              </a:defRPr>
-            </a:lvl1pPr>
-          </a:lstStyle>
-          <a:p>
-            <a:pPr/>
-            <a:r>
-              <a:t>A “Jekyll website” is a “static (plain HTML) website that has been created using Jekyll. Jekyll is software that creates websites. Jekyll isn’t actually “running” the live website; rather, Jekyll is a “static site generator”: it helps you create the static site files, which you then host just as you would any other HTML website.</a:t>
-            </a:r>
-          </a:p>
-        </p:txBody>
-      </p:sp>
-      <p:sp>
-        <p:nvSpPr>
-          <p:cNvPr id="182" name="Shape 182"/>
-          <p:cNvSpPr/>
-          <p:nvPr>
-            <p:ph type="body" idx="14"/>
-          </p:nvPr>
-        </p:nvSpPr>
-        <p:spPr>
-          <a:prstGeom prst="rect">
-            <a:avLst/>
-          </a:prstGeom>
-        </p:spPr>
-        <p:txBody>
-          <a:bodyPr/>
-          <a:lstStyle>
-            <a:lvl1pPr>
-              <a:defRPr u="sng">
-                <a:solidFill>
-                  <a:schemeClr val="accent1"/>
-                </a:solidFill>
-                <a:hlinkClick r:id="rId2" invalidUrl="" action="" tgtFrame="" tooltip="" history="1" highlightClick="0" endSnd="0"/>
-              </a:defRPr>
-            </a:lvl1pPr>
-          </a:lstStyle>
-          <a:p>
-            <a:pPr>
-              <a:defRPr u="none">
-                <a:solidFill>
-                  <a:srgbClr val="838787"/>
-                </a:solidFill>
-              </a:defRPr>
-            </a:pPr>
-            <a:r>
-              <a:rPr u="sng">
-                <a:solidFill>
-                  <a:schemeClr val="accent1"/>
-                </a:solidFill>
-                <a:hlinkClick r:id="rId2" invalidUrl="" action="" tgtFrame="" tooltip="" history="1" highlightClick="0" endSnd="0"/>
-              </a:rPr>
-              <a:t>Programming Historian</a:t>
-            </a:r>
-          </a:p>
-        </p:txBody>
-      </p:sp>
-      <p:sp>
-        <p:nvSpPr>
-          <p:cNvPr id="183" name="Shape 183"/>
-          <p:cNvSpPr/>
-          <p:nvPr>
-            <p:ph type="body" idx="15"/>
-          </p:nvPr>
-        </p:nvSpPr>
-        <p:spPr>
-          <a:prstGeom prst="rect">
-            <a:avLst/>
-          </a:prstGeom>
-        </p:spPr>
-        <p:txBody>
-          <a:bodyPr/>
-          <a:lstStyle/>
-          <a:p>
-            <a:pPr/>
-            <a:r>
-              <a:t>Create a blog with jekyll</a:t>
-            </a:r>
-          </a:p>
-        </p:txBody>
-      </p:sp>
-      <p:sp>
-        <p:nvSpPr>
-          <p:cNvPr id="184" name="Shape 184"/>
-          <p:cNvSpPr/>
-          <p:nvPr>
-            <p:ph type="title" idx="4294967295"/>
-          </p:nvPr>
-        </p:nvSpPr>
-        <p:spPr>
-          <a:prstGeom prst="rect">
-            <a:avLst/>
-          </a:prstGeom>
-        </p:spPr>
-        <p:txBody>
-          <a:bodyPr/>
-          <a:lstStyle>
-            <a:lvl1pPr defTabSz="467359">
-              <a:spcBef>
-                <a:spcPts val="2200"/>
-              </a:spcBef>
-              <a:defRPr sz="4800"/>
-            </a:lvl1pPr>
-          </a:lstStyle>
-          <a:p>
-            <a:pPr/>
-            <a:r>
-              <a:t>What is jekyll?</a:t>
-            </a:r>
-          </a:p>
-        </p:txBody>
-      </p:sp>
-    </p:spTree>
-  </p:cSld>
-  <p:clrMapOvr>
-    <a:masterClrMapping/>
-  </p:clrMapOvr>
-  <p:transition xmlns:p14="http://schemas.microsoft.com/office/powerpoint/2010/main" spd="med" advClick="1" p14:dur="1000"/>
-</p:sld>
-</file>
-
-<file path=ppt/slides/slide6.xml><?xml version="1.0" encoding="utf-8"?>
-<p:sld xmlns:a="http://schemas.openxmlformats.org/drawingml/2006/main" xmlns:r="http://schemas.openxmlformats.org/officeDocument/2006/relationships" xmlns:p="http://schemas.openxmlformats.org/presentationml/2006/main" showMasterSp="1" showMasterPhAnim="1">
-  <p:cSld>
-    <p:bg>
-      <p:bgPr>
-        <a:solidFill>
-          <a:srgbClr val="EBEBEB"/>
-        </a:solidFill>
-      </p:bgPr>
-    </p:bg>
-    <p:spTree>
-      <p:nvGrpSpPr>
-        <p:cNvPr id="1" name=""/>
-        <p:cNvGrpSpPr/>
-        <p:nvPr/>
-      </p:nvGrpSpPr>
-      <p:grpSpPr>
-        <a:xfrm>
-          <a:off x="0" y="0"/>
-          <a:ext cx="0" cy="0"/>
-          <a:chOff x="0" y="0"/>
-          <a:chExt cx="0" cy="0"/>
-        </a:xfrm>
-      </p:grpSpPr>
-      <p:sp>
-        <p:nvSpPr>
-          <p:cNvPr id="186" name="Shape 186"/>
-          <p:cNvSpPr/>
-          <p:nvPr>
-            <p:ph type="body" idx="13"/>
-          </p:nvPr>
-        </p:nvSpPr>
-        <p:spPr>
-          <a:prstGeom prst="rect">
-            <a:avLst/>
-          </a:prstGeom>
-        </p:spPr>
-        <p:txBody>
-          <a:bodyPr/>
-          <a:lstStyle/>
-          <a:p>
-            <a:pPr/>
-            <a:r>
-              <a:t>Create a blog with jekyll</a:t>
-            </a:r>
-          </a:p>
-        </p:txBody>
-      </p:sp>
-      <p:sp>
-        <p:nvSpPr>
-          <p:cNvPr id="187" name="Shape 187"/>
-          <p:cNvSpPr/>
-          <p:nvPr>
-            <p:ph type="title"/>
-          </p:nvPr>
-        </p:nvSpPr>
-        <p:spPr>
-          <a:prstGeom prst="rect">
-            <a:avLst/>
-          </a:prstGeom>
-        </p:spPr>
-        <p:txBody>
-          <a:bodyPr/>
-          <a:lstStyle>
-            <a:lvl1pPr defTabSz="467359">
-              <a:spcBef>
-                <a:spcPts val="2200"/>
-              </a:spcBef>
-              <a:defRPr sz="4800"/>
-            </a:lvl1pPr>
-          </a:lstStyle>
-          <a:p>
-            <a:pPr/>
-            <a:r>
-              <a:t>Websites powered by jekyll</a:t>
-            </a:r>
-          </a:p>
-        </p:txBody>
-      </p:sp>
-      <p:sp>
-        <p:nvSpPr>
-          <p:cNvPr id="188" name="Shape 188"/>
-          <p:cNvSpPr/>
-          <p:nvPr>
-            <p:ph type="body" idx="1"/>
-          </p:nvPr>
-        </p:nvSpPr>
-        <p:spPr>
-          <a:xfrm>
-            <a:off x="406400" y="2791177"/>
-            <a:ext cx="12192000" cy="6108701"/>
-          </a:xfrm>
-          <a:prstGeom prst="rect">
-            <a:avLst/>
-          </a:prstGeom>
-        </p:spPr>
-        <p:txBody>
-          <a:bodyPr/>
-          <a:lstStyle/>
-          <a:p>
-            <a:pPr marL="422275" indent="-422275" defTabSz="554990">
-              <a:spcBef>
-                <a:spcPts val="2600"/>
-              </a:spcBef>
-              <a:defRPr i="1" sz="3230"/>
-            </a:pPr>
-          </a:p>
-          <a:p>
-            <a:pPr marL="422275" indent="-422275" defTabSz="554990">
-              <a:spcBef>
-                <a:spcPts val="2600"/>
-              </a:spcBef>
-              <a:defRPr i="1" sz="3230"/>
-            </a:pPr>
-            <a:r>
-              <a:t>Ruby documentation https://www.ruby-lang.org/en/</a:t>
-            </a:r>
-          </a:p>
-          <a:p>
-            <a:pPr marL="422275" indent="-422275" defTabSz="554990">
-              <a:spcBef>
-                <a:spcPts val="2600"/>
-              </a:spcBef>
-              <a:defRPr i="1" sz="3230"/>
-            </a:pPr>
-            <a:r>
-              <a:t>Bootstrap documentation https://getbootstrap.com/</a:t>
-            </a:r>
-          </a:p>
-          <a:p>
-            <a:pPr marL="422275" indent="-422275" defTabSz="554990">
-              <a:spcBef>
-                <a:spcPts val="2600"/>
-              </a:spcBef>
-              <a:defRPr i="1" sz="3230"/>
-            </a:pPr>
-            <a:r>
-              <a:t>Blog/Personal Website</a:t>
-            </a:r>
-          </a:p>
-          <a:p>
-            <a:pPr marL="422275" indent="-422275" defTabSz="554990">
-              <a:spcBef>
-                <a:spcPts val="2600"/>
-              </a:spcBef>
-              <a:defRPr i="1" sz="3230"/>
-            </a:pPr>
-            <a:r>
-              <a:t>https://zachholman.com</a:t>
-            </a:r>
-          </a:p>
-          <a:p>
-            <a:pPr marL="422275" indent="-422275" defTabSz="554990">
-              <a:spcBef>
-                <a:spcPts val="2600"/>
-              </a:spcBef>
-              <a:defRPr i="1" sz="3230"/>
-            </a:pPr>
-            <a:r>
-              <a:t>www.datalogues.com	</a:t>
-            </a:r>
-          </a:p>
-          <a:p>
-            <a:pPr marL="422275" indent="-422275" defTabSz="554990">
-              <a:spcBef>
-                <a:spcPts val="2600"/>
-              </a:spcBef>
-              <a:defRPr i="1" sz="3230"/>
-            </a:pPr>
-            <a:r>
-              <a:rPr u="sng">
-                <a:solidFill>
-                  <a:schemeClr val="accent1"/>
-                </a:solidFill>
-                <a:hlinkClick r:id="rId2" invalidUrl="" action="" tgtFrame="" tooltip="" history="1" highlightClick="0" endSnd="0"/>
-              </a:rPr>
-              <a:t>https://www.chenhuijing.com/#%F0%9F%8E%AE</a:t>
-            </a:r>
-          </a:p>
-        </p:txBody>
-      </p:sp>
-      <p:sp>
-        <p:nvSpPr>
-          <p:cNvPr id="189" name="Shape 189"/>
-          <p:cNvSpPr/>
-          <p:nvPr>
-            <p:ph type="sldNum" sz="quarter" idx="4294967295"/>
-          </p:nvPr>
-        </p:nvSpPr>
-        <p:spPr>
-          <a:xfrm>
-            <a:off x="12332920" y="431800"/>
-            <a:ext cx="260599" cy="457200"/>
-          </a:xfrm>
-          <a:prstGeom prst="rect">
-            <a:avLst/>
-          </a:prstGeom>
-          <a:extLst>
-            <a:ext uri="{C572A759-6A51-4108-AA02-DFA0A04FC94B}">
-              <ma14:wrappingTextBoxFlag xmlns:ma14="http://schemas.microsoft.com/office/mac/drawingml/2011/main" val="1"/>
-            </a:ext>
-          </a:extLst>
-        </p:spPr>
-        <p:txBody>
-          <a:bodyPr/>
-          <a:lstStyle/>
-          <a:p>
-            <a:pPr/>
-            <a:fld id="{86CB4B4D-7CA3-9044-876B-883B54F8677D}" type="slidenum"/>
-          </a:p>
-        </p:txBody>
-      </p:sp>
-    </p:spTree>
-  </p:cSld>
-  <p:clrMapOvr>
-    <a:masterClrMapping/>
-  </p:clrMapOvr>
-  <p:transition xmlns:p14="http://schemas.microsoft.com/office/powerpoint/2010/main" spd="med" advClick="1" p14:dur="1000"/>
-</p:sld>
-</file>
-
-<file path=ppt/slides/slide7.xml><?xml version="1.0" encoding="utf-8"?>
-<p:sld xmlns:a="http://schemas.openxmlformats.org/drawingml/2006/main" xmlns:r="http://schemas.openxmlformats.org/officeDocument/2006/relationships" xmlns:p="http://schemas.openxmlformats.org/presentationml/2006/main" showMasterSp="1" showMasterPhAnim="1">
-  <p:cSld>
-    <p:bg>
-      <p:bgPr>
-        <a:solidFill>
-          <a:srgbClr val="EBEBEB"/>
-        </a:solidFill>
-      </p:bgPr>
-    </p:bg>
-    <p:spTree>
-      <p:nvGrpSpPr>
-        <p:cNvPr id="1" name=""/>
-        <p:cNvGrpSpPr/>
-        <p:nvPr/>
-      </p:nvGrpSpPr>
-      <p:grpSpPr>
-        <a:xfrm>
-          <a:off x="0" y="0"/>
-          <a:ext cx="0" cy="0"/>
-          <a:chOff x="0" y="0"/>
-          <a:chExt cx="0" cy="0"/>
-        </a:xfrm>
-      </p:grpSpPr>
       <p:pic>
         <p:nvPicPr>
-          <p:cNvPr id="191" name="Confused The Simpsons GIF-original.mp4"/>
+          <p:cNvPr id="166" name="Writing Working GIF by pamelaespino-original.mp4"/>
           <p:cNvPicPr>
             <a:picLocks noChangeAspect="0"/>
           </p:cNvPicPr>
@@ -6035,8 +5219,8 @@
         </p:blipFill>
         <p:spPr>
           <a:xfrm>
-            <a:off x="-31929" y="-34709"/>
-            <a:ext cx="13004801" cy="9753601"/>
+            <a:off x="-1" y="-2161394"/>
+            <a:ext cx="13004801" cy="13004801"/>
           </a:xfrm>
           <a:prstGeom prst="rect">
             <a:avLst/>
@@ -6048,10 +5232,87 @@
       </p:pic>
       <p:sp>
         <p:nvSpPr>
-          <p:cNvPr id="192" name="Shape 192"/>
-          <p:cNvSpPr/>
-          <p:nvPr>
-            <p:ph type="title"/>
+          <p:cNvPr id="167" name="Shape 167"/>
+          <p:cNvSpPr/>
+          <p:nvPr/>
+        </p:nvSpPr>
+        <p:spPr>
+          <a:xfrm>
+            <a:off x="-28433" y="4900209"/>
+            <a:ext cx="13344574" cy="3499799"/>
+          </a:xfrm>
+          <a:prstGeom prst="rect">
+            <a:avLst/>
+          </a:prstGeom>
+          <a:solidFill>
+            <a:srgbClr val="FFFFFF"/>
+          </a:solidFill>
+          <a:ln w="12700">
+            <a:miter lim="400000"/>
+          </a:ln>
+        </p:spPr>
+        <p:txBody>
+          <a:bodyPr lIns="50800" tIns="50800" rIns="50800" bIns="50800" anchor="ctr"/>
+          <a:lstStyle/>
+          <a:p>
+            <a:pPr algn="ctr">
+              <a:lnSpc>
+                <a:spcPct val="80000"/>
+              </a:lnSpc>
+              <a:spcBef>
+                <a:spcPts val="0"/>
+              </a:spcBef>
+              <a:defRPr cap="all" sz="2800">
+                <a:solidFill>
+                  <a:srgbClr val="FFFFFF"/>
+                </a:solidFill>
+                <a:latin typeface="+mn-lt"/>
+                <a:ea typeface="+mn-ea"/>
+                <a:cs typeface="+mn-cs"/>
+                <a:sym typeface="DIN Condensed"/>
+              </a:defRPr>
+            </a:pPr>
+          </a:p>
+        </p:txBody>
+      </p:sp>
+      <p:sp>
+        <p:nvSpPr>
+          <p:cNvPr id="168" name="Shape 168"/>
+          <p:cNvSpPr/>
+          <p:nvPr>
+            <p:ph type="ctrTitle"/>
+          </p:nvPr>
+        </p:nvSpPr>
+        <p:spPr>
+          <a:prstGeom prst="rect">
+            <a:avLst/>
+          </a:prstGeom>
+        </p:spPr>
+        <p:txBody>
+          <a:bodyPr/>
+          <a:lstStyle>
+            <a:lvl1pPr defTabSz="368045">
+              <a:defRPr sz="10710">
+                <a:solidFill>
+                  <a:srgbClr val="34A5DB"/>
+                </a:solidFill>
+              </a:defRPr>
+            </a:lvl1pPr>
+          </a:lstStyle>
+          <a:p>
+            <a:pPr/>
+            <a:r>
+              <a:t>CREATE A BLOG WITH JEKYLL</a:t>
+            </a:r>
+          </a:p>
+        </p:txBody>
+      </p:sp>
+      <p:sp>
+        <p:nvSpPr>
+          <p:cNvPr id="169" name="Shape 169"/>
+          <p:cNvSpPr/>
+          <p:nvPr>
+            <p:ph type="subTitle" sz="quarter" idx="1"/>
           </p:nvPr>
         </p:nvSpPr>
         <p:spPr>
@@ -6065,7 +5326,7 @@
             <a:lvl1pPr>
               <a:defRPr>
                 <a:solidFill>
-                  <a:srgbClr val="FFFFFF"/>
+                  <a:srgbClr val="68BFB1"/>
                 </a:solidFill>
               </a:defRPr>
             </a:lvl1pPr>
@@ -6073,7 +5334,7 @@
           <a:p>
             <a:pPr/>
             <a:r>
-              <a:t>INSTALLATION FEST</a:t>
+              <a:t>cOdeland 2018 | by monica powell</a:t>
             </a:r>
           </a:p>
         </p:txBody>
@@ -6083,7 +5344,7 @@
   <p:clrMapOvr>
     <a:masterClrMapping/>
   </p:clrMapOvr>
-  <p:transition xmlns:p14="http://schemas.microsoft.com/office/powerpoint/2010/main" spd="med" advClick="1" p14:dur="1000"/>
+  <p:transition xmlns:p14="http://schemas.microsoft.com/office/powerpoint/2010/main" spd="med" advClick="1"/>
   <p:timing>
     <p:tnLst>
       <p:par>
@@ -6096,6 +5357,9 @@
                     <p:cTn id="3" fill="hold">
                       <p:stCondLst>
                         <p:cond delay="indefinite"/>
+                        <p:cond evt="onBegin">
+                          <p:tn val="2"/>
+                        </p:cond>
                       </p:stCondLst>
                       <p:childTnLst>
                         <p:par>
@@ -6105,16 +5369,16 @@
                             </p:stCondLst>
                             <p:childTnLst>
                               <p:par>
-                                <p:cTn id="5" presetClass="mediacall" nodeType="clickEffect" presetSubtype="0" presetID="1" grpId="1" fill="hold">
+                                <p:cTn id="5" presetClass="mediacall" nodeType="afterEffect" presetSubtype="0" presetID="1" grpId="1" fill="hold">
                                   <p:stCondLst>
                                     <p:cond delay="0"/>
                                   </p:stCondLst>
                                   <p:childTnLst>
                                     <p:cmd type="call" cmd="playFrom(0.0)">
                                       <p:cBhvr>
-                                        <p:cTn id="6" dur="500000" fill="hold"/>
+                                        <p:cTn id="6" dur="1919999" fill="hold"/>
                                         <p:tgtEl>
-                                          <p:spTgt spid="191"/>
+                                          <p:spTgt spid="166"/>
                                         </p:tgtEl>
                                       </p:cBhvr>
                                     </p:cmd>
@@ -6152,7 +5416,2593 @@
                   </p:stCondLst>
                 </p:cTn>
                 <p:tgtEl>
-                  <p:spTgt spid="191"/>
+                  <p:spTgt spid="166"/>
+                </p:tgtEl>
+              </p:cMediaNode>
+            </p:video>
+          </p:childTnLst>
+        </p:cTn>
+      </p:par>
+    </p:tnLst>
+  </p:timing>
+</p:sld>
+</file>
+
+<file path=ppt/slides/slide10.xml><?xml version="1.0" encoding="utf-8"?>
+<p:sld xmlns:a="http://schemas.openxmlformats.org/drawingml/2006/main" xmlns:r="http://schemas.openxmlformats.org/officeDocument/2006/relationships" xmlns:p="http://schemas.openxmlformats.org/presentationml/2006/main" showMasterSp="1" showMasterPhAnim="1">
+  <p:cSld>
+    <p:bg>
+      <p:bgPr>
+        <a:solidFill>
+          <a:srgbClr val="EBEBEB"/>
+        </a:solidFill>
+      </p:bgPr>
+    </p:bg>
+    <p:spTree>
+      <p:nvGrpSpPr>
+        <p:cNvPr id="1" name=""/>
+        <p:cNvGrpSpPr/>
+        <p:nvPr/>
+      </p:nvGrpSpPr>
+      <p:grpSpPr>
+        <a:xfrm>
+          <a:off x="0" y="0"/>
+          <a:ext cx="0" cy="0"/>
+          <a:chOff x="0" y="0"/>
+          <a:chExt cx="0" cy="0"/>
+        </a:xfrm>
+      </p:grpSpPr>
+      <p:sp>
+        <p:nvSpPr>
+          <p:cNvPr id="212" name="Shape 212"/>
+          <p:cNvSpPr/>
+          <p:nvPr>
+            <p:ph type="body" idx="13"/>
+          </p:nvPr>
+        </p:nvSpPr>
+        <p:spPr>
+          <a:prstGeom prst="rect">
+            <a:avLst/>
+          </a:prstGeom>
+        </p:spPr>
+        <p:txBody>
+          <a:bodyPr/>
+          <a:lstStyle/>
+          <a:p>
+            <a:pPr/>
+            <a:r>
+              <a:t>Create a blog with jekyll</a:t>
+            </a:r>
+          </a:p>
+        </p:txBody>
+      </p:sp>
+      <p:sp>
+        <p:nvSpPr>
+          <p:cNvPr id="213" name="Shape 213"/>
+          <p:cNvSpPr/>
+          <p:nvPr>
+            <p:ph type="title"/>
+          </p:nvPr>
+        </p:nvSpPr>
+        <p:spPr>
+          <a:prstGeom prst="rect">
+            <a:avLst/>
+          </a:prstGeom>
+        </p:spPr>
+        <p:txBody>
+          <a:bodyPr/>
+          <a:lstStyle>
+            <a:lvl1pPr defTabSz="467359">
+              <a:spcBef>
+                <a:spcPts val="2200"/>
+              </a:spcBef>
+              <a:defRPr sz="4800"/>
+            </a:lvl1pPr>
+          </a:lstStyle>
+          <a:p>
+            <a:pPr/>
+            <a:r>
+              <a:t>Installation fest</a:t>
+            </a:r>
+          </a:p>
+        </p:txBody>
+      </p:sp>
+      <p:sp>
+        <p:nvSpPr>
+          <p:cNvPr id="214" name="Shape 214"/>
+          <p:cNvSpPr/>
+          <p:nvPr>
+            <p:ph type="body" idx="1"/>
+          </p:nvPr>
+        </p:nvSpPr>
+        <p:spPr>
+          <a:xfrm>
+            <a:off x="406400" y="2791177"/>
+            <a:ext cx="12192000" cy="6108701"/>
+          </a:xfrm>
+          <a:prstGeom prst="rect">
+            <a:avLst/>
+          </a:prstGeom>
+        </p:spPr>
+        <p:txBody>
+          <a:bodyPr/>
+          <a:lstStyle/>
+          <a:p>
+            <a:pPr/>
+            <a:r>
+              <a:t>INSERT instructions for logging into github </a:t>
+            </a:r>
+          </a:p>
+        </p:txBody>
+      </p:sp>
+      <p:sp>
+        <p:nvSpPr>
+          <p:cNvPr id="215" name="Shape 215"/>
+          <p:cNvSpPr/>
+          <p:nvPr>
+            <p:ph type="sldNum" sz="quarter" idx="4294967295"/>
+          </p:nvPr>
+        </p:nvSpPr>
+        <p:spPr>
+          <a:prstGeom prst="rect">
+            <a:avLst/>
+          </a:prstGeom>
+          <a:extLst>
+            <a:ext uri="{C572A759-6A51-4108-AA02-DFA0A04FC94B}">
+              <ma14:wrappingTextBoxFlag xmlns:ma14="http://schemas.microsoft.com/office/mac/drawingml/2011/main" val="1"/>
+            </a:ext>
+          </a:extLst>
+        </p:spPr>
+        <p:txBody>
+          <a:bodyPr/>
+          <a:lstStyle/>
+          <a:p>
+            <a:pPr/>
+            <a:fld id="{86CB4B4D-7CA3-9044-876B-883B54F8677D}" type="slidenum"/>
+          </a:p>
+        </p:txBody>
+      </p:sp>
+    </p:spTree>
+  </p:cSld>
+  <p:clrMapOvr>
+    <a:masterClrMapping/>
+  </p:clrMapOvr>
+  <p:transition xmlns:p14="http://schemas.microsoft.com/office/powerpoint/2010/main" spd="med" advClick="1" p14:dur="1000"/>
+</p:sld>
+</file>
+
+<file path=ppt/slides/slide11.xml><?xml version="1.0" encoding="utf-8"?>
+<p:sld xmlns:a="http://schemas.openxmlformats.org/drawingml/2006/main" xmlns:r="http://schemas.openxmlformats.org/officeDocument/2006/relationships" xmlns:p="http://schemas.openxmlformats.org/presentationml/2006/main" showMasterSp="1" showMasterPhAnim="1">
+  <p:cSld>
+    <p:bg>
+      <p:bgPr>
+        <a:solidFill>
+          <a:srgbClr val="EBEBEB"/>
+        </a:solidFill>
+      </p:bgPr>
+    </p:bg>
+    <p:spTree>
+      <p:nvGrpSpPr>
+        <p:cNvPr id="1" name=""/>
+        <p:cNvGrpSpPr/>
+        <p:nvPr/>
+      </p:nvGrpSpPr>
+      <p:grpSpPr>
+        <a:xfrm>
+          <a:off x="0" y="0"/>
+          <a:ext cx="0" cy="0"/>
+          <a:chOff x="0" y="0"/>
+          <a:chExt cx="0" cy="0"/>
+        </a:xfrm>
+      </p:grpSpPr>
+      <p:sp>
+        <p:nvSpPr>
+          <p:cNvPr id="217" name="Shape 217"/>
+          <p:cNvSpPr/>
+          <p:nvPr>
+            <p:ph type="body" idx="13"/>
+          </p:nvPr>
+        </p:nvSpPr>
+        <p:spPr>
+          <a:prstGeom prst="rect">
+            <a:avLst/>
+          </a:prstGeom>
+        </p:spPr>
+        <p:txBody>
+          <a:bodyPr/>
+          <a:lstStyle/>
+          <a:p>
+            <a:pPr/>
+            <a:r>
+              <a:t>Create a blog with jekyll</a:t>
+            </a:r>
+          </a:p>
+        </p:txBody>
+      </p:sp>
+      <p:sp>
+        <p:nvSpPr>
+          <p:cNvPr id="218" name="Shape 218"/>
+          <p:cNvSpPr/>
+          <p:nvPr>
+            <p:ph type="title"/>
+          </p:nvPr>
+        </p:nvSpPr>
+        <p:spPr>
+          <a:prstGeom prst="rect">
+            <a:avLst/>
+          </a:prstGeom>
+        </p:spPr>
+        <p:txBody>
+          <a:bodyPr/>
+          <a:lstStyle>
+            <a:lvl1pPr defTabSz="467359">
+              <a:spcBef>
+                <a:spcPts val="2200"/>
+              </a:spcBef>
+              <a:defRPr sz="4800"/>
+            </a:lvl1pPr>
+          </a:lstStyle>
+          <a:p>
+            <a:pPr/>
+            <a:r>
+              <a:t>Installation fest</a:t>
+            </a:r>
+          </a:p>
+        </p:txBody>
+      </p:sp>
+      <p:sp>
+        <p:nvSpPr>
+          <p:cNvPr id="219" name="Shape 219"/>
+          <p:cNvSpPr/>
+          <p:nvPr>
+            <p:ph type="body" idx="1"/>
+          </p:nvPr>
+        </p:nvSpPr>
+        <p:spPr>
+          <a:xfrm>
+            <a:off x="406400" y="2791177"/>
+            <a:ext cx="12192000" cy="6108701"/>
+          </a:xfrm>
+          <a:prstGeom prst="rect">
+            <a:avLst/>
+          </a:prstGeom>
+        </p:spPr>
+        <p:txBody>
+          <a:bodyPr/>
+          <a:lstStyle/>
+          <a:p>
+            <a:pPr/>
+            <a:r>
+              <a:t>Install Ruby </a:t>
+            </a:r>
+          </a:p>
+          <a:p>
+            <a:pPr/>
+            <a:r>
+              <a:t>On Windows:</a:t>
+            </a:r>
+          </a:p>
+          <a:p>
+            <a:pPr lvl="1"/>
+            <a:r>
+              <a:t>Use </a:t>
+            </a:r>
+            <a:r>
+              <a:rPr u="sng">
+                <a:solidFill>
+                  <a:schemeClr val="accent1"/>
+                </a:solidFill>
+                <a:hlinkClick r:id="rId3" invalidUrl="" action="" tgtFrame="" tooltip="" history="1" highlightClick="0" endSnd="0"/>
+              </a:rPr>
+              <a:t>RubyInstaller</a:t>
+            </a:r>
+            <a:r>
+              <a:t> </a:t>
+            </a:r>
+          </a:p>
+          <a:p>
+            <a:pPr/>
+            <a:r>
+              <a:t>On Mac:</a:t>
+            </a:r>
+          </a:p>
+          <a:p>
+            <a:pPr lvl="1" marL="0" indent="228600" defTabSz="457200">
+              <a:spcBef>
+                <a:spcPts val="0"/>
+              </a:spcBef>
+              <a:buClrTx/>
+              <a:buSzTx/>
+              <a:buFontTx/>
+              <a:buNone/>
+              <a:defRPr sz="2800">
+                <a:solidFill>
+                  <a:srgbClr val="333344"/>
+                </a:solidFill>
+                <a:latin typeface="Monaco"/>
+                <a:ea typeface="Monaco"/>
+                <a:cs typeface="Monaco"/>
+                <a:sym typeface="Monaco"/>
+              </a:defRPr>
+            </a:pPr>
+            <a:r>
+              <a:t>$ brew install ruby</a:t>
+            </a:r>
+          </a:p>
+          <a:p>
+            <a:pPr marL="0" indent="0" defTabSz="457200">
+              <a:spcBef>
+                <a:spcPts val="0"/>
+              </a:spcBef>
+              <a:buClrTx/>
+              <a:buSzTx/>
+              <a:buFontTx/>
+              <a:buNone/>
+              <a:defRPr sz="2800">
+                <a:solidFill>
+                  <a:srgbClr val="333344"/>
+                </a:solidFill>
+                <a:latin typeface="Monaco"/>
+                <a:ea typeface="Monaco"/>
+                <a:cs typeface="Monaco"/>
+                <a:sym typeface="Monaco"/>
+              </a:defRPr>
+            </a:pPr>
+          </a:p>
+          <a:p>
+            <a:pPr marL="0" indent="0" defTabSz="457200">
+              <a:spcBef>
+                <a:spcPts val="0"/>
+              </a:spcBef>
+              <a:buClrTx/>
+              <a:buSzTx/>
+              <a:buFontTx/>
+              <a:buNone/>
+              <a:defRPr sz="2800">
+                <a:solidFill>
+                  <a:srgbClr val="333344"/>
+                </a:solidFill>
+                <a:latin typeface="Monaco"/>
+                <a:ea typeface="Monaco"/>
+                <a:cs typeface="Monaco"/>
+                <a:sym typeface="Monaco"/>
+              </a:defRPr>
+            </a:pPr>
+          </a:p>
+        </p:txBody>
+      </p:sp>
+      <p:sp>
+        <p:nvSpPr>
+          <p:cNvPr id="220" name="Shape 220"/>
+          <p:cNvSpPr/>
+          <p:nvPr>
+            <p:ph type="sldNum" sz="quarter" idx="4294967295"/>
+          </p:nvPr>
+        </p:nvSpPr>
+        <p:spPr>
+          <a:prstGeom prst="rect">
+            <a:avLst/>
+          </a:prstGeom>
+          <a:extLst>
+            <a:ext uri="{C572A759-6A51-4108-AA02-DFA0A04FC94B}">
+              <ma14:wrappingTextBoxFlag xmlns:ma14="http://schemas.microsoft.com/office/mac/drawingml/2011/main" val="1"/>
+            </a:ext>
+          </a:extLst>
+        </p:spPr>
+        <p:txBody>
+          <a:bodyPr/>
+          <a:lstStyle/>
+          <a:p>
+            <a:pPr/>
+            <a:fld id="{86CB4B4D-7CA3-9044-876B-883B54F8677D}" type="slidenum"/>
+          </a:p>
+        </p:txBody>
+      </p:sp>
+    </p:spTree>
+  </p:cSld>
+  <p:clrMapOvr>
+    <a:masterClrMapping/>
+  </p:clrMapOvr>
+  <p:transition xmlns:p14="http://schemas.microsoft.com/office/powerpoint/2010/main" spd="med" advClick="1" p14:dur="1000"/>
+</p:sld>
+</file>
+
+<file path=ppt/slides/slide12.xml><?xml version="1.0" encoding="utf-8"?>
+<p:sld xmlns:a="http://schemas.openxmlformats.org/drawingml/2006/main" xmlns:r="http://schemas.openxmlformats.org/officeDocument/2006/relationships" xmlns:p="http://schemas.openxmlformats.org/presentationml/2006/main" showMasterSp="1" showMasterPhAnim="1">
+  <p:cSld>
+    <p:bg>
+      <p:bgPr>
+        <a:solidFill>
+          <a:srgbClr val="EBEBEB"/>
+        </a:solidFill>
+      </p:bgPr>
+    </p:bg>
+    <p:spTree>
+      <p:nvGrpSpPr>
+        <p:cNvPr id="1" name=""/>
+        <p:cNvGrpSpPr/>
+        <p:nvPr/>
+      </p:nvGrpSpPr>
+      <p:grpSpPr>
+        <a:xfrm>
+          <a:off x="0" y="0"/>
+          <a:ext cx="0" cy="0"/>
+          <a:chOff x="0" y="0"/>
+          <a:chExt cx="0" cy="0"/>
+        </a:xfrm>
+      </p:grpSpPr>
+      <p:sp>
+        <p:nvSpPr>
+          <p:cNvPr id="224" name="Shape 224"/>
+          <p:cNvSpPr/>
+          <p:nvPr>
+            <p:ph type="body" idx="13"/>
+          </p:nvPr>
+        </p:nvSpPr>
+        <p:spPr>
+          <a:prstGeom prst="rect">
+            <a:avLst/>
+          </a:prstGeom>
+        </p:spPr>
+        <p:txBody>
+          <a:bodyPr/>
+          <a:lstStyle/>
+          <a:p>
+            <a:pPr/>
+            <a:r>
+              <a:t>Create a blog with jekyll</a:t>
+            </a:r>
+          </a:p>
+        </p:txBody>
+      </p:sp>
+      <p:sp>
+        <p:nvSpPr>
+          <p:cNvPr id="225" name="Shape 225"/>
+          <p:cNvSpPr/>
+          <p:nvPr>
+            <p:ph type="title"/>
+          </p:nvPr>
+        </p:nvSpPr>
+        <p:spPr>
+          <a:prstGeom prst="rect">
+            <a:avLst/>
+          </a:prstGeom>
+        </p:spPr>
+        <p:txBody>
+          <a:bodyPr/>
+          <a:lstStyle>
+            <a:lvl1pPr defTabSz="467359">
+              <a:spcBef>
+                <a:spcPts val="2200"/>
+              </a:spcBef>
+              <a:defRPr sz="4800"/>
+            </a:lvl1pPr>
+          </a:lstStyle>
+          <a:p>
+            <a:pPr/>
+            <a:r>
+              <a:t>Installation fest</a:t>
+            </a:r>
+          </a:p>
+        </p:txBody>
+      </p:sp>
+      <p:sp>
+        <p:nvSpPr>
+          <p:cNvPr id="226" name="Shape 226"/>
+          <p:cNvSpPr/>
+          <p:nvPr>
+            <p:ph type="body" idx="1"/>
+          </p:nvPr>
+        </p:nvSpPr>
+        <p:spPr>
+          <a:xfrm>
+            <a:off x="406400" y="2791177"/>
+            <a:ext cx="12192000" cy="6108701"/>
+          </a:xfrm>
+          <a:prstGeom prst="rect">
+            <a:avLst/>
+          </a:prstGeom>
+        </p:spPr>
+        <p:txBody>
+          <a:bodyPr/>
+          <a:lstStyle/>
+          <a:p>
+            <a:pPr/>
+            <a:r>
+              <a:t>On </a:t>
+            </a:r>
+            <a:r>
+              <a:rPr u="sng">
+                <a:solidFill>
+                  <a:schemeClr val="accent1"/>
+                </a:solidFill>
+                <a:hlinkClick r:id="rId2" invalidUrl="" action="" tgtFrame="" tooltip="" history="1" highlightClick="0" endSnd="0"/>
+              </a:rPr>
+              <a:t>GitHub.com</a:t>
+            </a:r>
+            <a:r>
+              <a:t> fork this repository </a:t>
+            </a:r>
+            <a:r>
+              <a:rPr u="sng">
+                <a:solidFill>
+                  <a:schemeClr val="accent1"/>
+                </a:solidFill>
+                <a:hlinkClick r:id="rId3" invalidUrl="" action="" tgtFrame="" tooltip="" history="1" highlightClick="0" endSnd="0"/>
+              </a:rPr>
+              <a:t>https://github.com/M0nica/dactl</a:t>
+            </a:r>
+          </a:p>
+          <a:p>
+            <a:pPr>
+              <a:defRPr i="1"/>
+            </a:pPr>
+            <a:r>
+              <a:t>On command line:</a:t>
+            </a:r>
+          </a:p>
+          <a:p>
+            <a:pPr lvl="1">
+              <a:defRPr i="1"/>
+            </a:pPr>
+            <a:r>
+              <a:t>Git clone </a:t>
+            </a:r>
+            <a:r>
+              <a:rPr u="sng">
+                <a:solidFill>
+                  <a:schemeClr val="accent1"/>
+                </a:solidFill>
+                <a:hlinkClick r:id="rId4" invalidUrl="" action="" tgtFrame="" tooltip="" history="1" highlightClick="0" endSnd="0"/>
+              </a:rPr>
+              <a:t>https://github.com/YOUR_USERNAME/dactl</a:t>
+            </a:r>
+          </a:p>
+        </p:txBody>
+      </p:sp>
+      <p:sp>
+        <p:nvSpPr>
+          <p:cNvPr id="227" name="Shape 227"/>
+          <p:cNvSpPr/>
+          <p:nvPr>
+            <p:ph type="sldNum" sz="quarter" idx="4294967295"/>
+          </p:nvPr>
+        </p:nvSpPr>
+        <p:spPr>
+          <a:prstGeom prst="rect">
+            <a:avLst/>
+          </a:prstGeom>
+          <a:extLst>
+            <a:ext uri="{C572A759-6A51-4108-AA02-DFA0A04FC94B}">
+              <ma14:wrappingTextBoxFlag xmlns:ma14="http://schemas.microsoft.com/office/mac/drawingml/2011/main" val="1"/>
+            </a:ext>
+          </a:extLst>
+        </p:spPr>
+        <p:txBody>
+          <a:bodyPr/>
+          <a:lstStyle/>
+          <a:p>
+            <a:pPr/>
+            <a:fld id="{86CB4B4D-7CA3-9044-876B-883B54F8677D}" type="slidenum"/>
+          </a:p>
+        </p:txBody>
+      </p:sp>
+    </p:spTree>
+  </p:cSld>
+  <p:clrMapOvr>
+    <a:masterClrMapping/>
+  </p:clrMapOvr>
+  <p:transition xmlns:p14="http://schemas.microsoft.com/office/powerpoint/2010/main" spd="med" advClick="1" p14:dur="1000"/>
+</p:sld>
+</file>
+
+<file path=ppt/slides/slide13.xml><?xml version="1.0" encoding="utf-8"?>
+<p:sld xmlns:a="http://schemas.openxmlformats.org/drawingml/2006/main" xmlns:r="http://schemas.openxmlformats.org/officeDocument/2006/relationships" xmlns:p="http://schemas.openxmlformats.org/presentationml/2006/main" showMasterSp="1" showMasterPhAnim="1">
+  <p:cSld>
+    <p:bg>
+      <p:bgPr>
+        <a:solidFill>
+          <a:srgbClr val="EBEBEB"/>
+        </a:solidFill>
+      </p:bgPr>
+    </p:bg>
+    <p:spTree>
+      <p:nvGrpSpPr>
+        <p:cNvPr id="1" name=""/>
+        <p:cNvGrpSpPr/>
+        <p:nvPr/>
+      </p:nvGrpSpPr>
+      <p:grpSpPr>
+        <a:xfrm>
+          <a:off x="0" y="0"/>
+          <a:ext cx="0" cy="0"/>
+          <a:chOff x="0" y="0"/>
+          <a:chExt cx="0" cy="0"/>
+        </a:xfrm>
+      </p:grpSpPr>
+      <p:sp>
+        <p:nvSpPr>
+          <p:cNvPr id="229" name="Shape 229"/>
+          <p:cNvSpPr/>
+          <p:nvPr>
+            <p:ph type="body" idx="13"/>
+          </p:nvPr>
+        </p:nvSpPr>
+        <p:spPr>
+          <a:prstGeom prst="rect">
+            <a:avLst/>
+          </a:prstGeom>
+        </p:spPr>
+        <p:txBody>
+          <a:bodyPr/>
+          <a:lstStyle/>
+          <a:p>
+            <a:pPr/>
+            <a:r>
+              <a:t>Create a blog with jekyll</a:t>
+            </a:r>
+          </a:p>
+        </p:txBody>
+      </p:sp>
+      <p:sp>
+        <p:nvSpPr>
+          <p:cNvPr id="230" name="Shape 230"/>
+          <p:cNvSpPr/>
+          <p:nvPr>
+            <p:ph type="title"/>
+          </p:nvPr>
+        </p:nvSpPr>
+        <p:spPr>
+          <a:prstGeom prst="rect">
+            <a:avLst/>
+          </a:prstGeom>
+        </p:spPr>
+        <p:txBody>
+          <a:bodyPr/>
+          <a:lstStyle>
+            <a:lvl1pPr defTabSz="467359">
+              <a:spcBef>
+                <a:spcPts val="2200"/>
+              </a:spcBef>
+              <a:defRPr sz="4800"/>
+            </a:lvl1pPr>
+          </a:lstStyle>
+          <a:p>
+            <a:pPr/>
+            <a:r>
+              <a:t>Installation fest</a:t>
+            </a:r>
+          </a:p>
+        </p:txBody>
+      </p:sp>
+      <p:sp>
+        <p:nvSpPr>
+          <p:cNvPr id="231" name="Shape 231"/>
+          <p:cNvSpPr/>
+          <p:nvPr>
+            <p:ph type="body" idx="1"/>
+          </p:nvPr>
+        </p:nvSpPr>
+        <p:spPr>
+          <a:xfrm>
+            <a:off x="406400" y="2791177"/>
+            <a:ext cx="12192000" cy="6108701"/>
+          </a:xfrm>
+          <a:prstGeom prst="rect">
+            <a:avLst/>
+          </a:prstGeom>
+        </p:spPr>
+        <p:txBody>
+          <a:bodyPr/>
+          <a:lstStyle/>
+          <a:p>
+            <a:pPr>
+              <a:defRPr i="1"/>
+            </a:pPr>
+          </a:p>
+          <a:p>
+            <a:pPr>
+              <a:defRPr i="1"/>
+            </a:pPr>
+            <a:r>
+              <a:t> `cd dactl`</a:t>
+            </a:r>
+          </a:p>
+          <a:p>
+            <a:pPr>
+              <a:defRPr i="1"/>
+            </a:pPr>
+            <a:r>
+              <a:t>`bundle install` </a:t>
+            </a:r>
+          </a:p>
+          <a:p>
+            <a:pPr>
+              <a:defRPr i="1"/>
+            </a:pPr>
+            <a:r>
+              <a:t>`jekyll -s`</a:t>
+            </a:r>
+          </a:p>
+        </p:txBody>
+      </p:sp>
+      <p:sp>
+        <p:nvSpPr>
+          <p:cNvPr id="232" name="Shape 232"/>
+          <p:cNvSpPr/>
+          <p:nvPr>
+            <p:ph type="sldNum" sz="quarter" idx="4294967295"/>
+          </p:nvPr>
+        </p:nvSpPr>
+        <p:spPr>
+          <a:prstGeom prst="rect">
+            <a:avLst/>
+          </a:prstGeom>
+          <a:extLst>
+            <a:ext uri="{C572A759-6A51-4108-AA02-DFA0A04FC94B}">
+              <ma14:wrappingTextBoxFlag xmlns:ma14="http://schemas.microsoft.com/office/mac/drawingml/2011/main" val="1"/>
+            </a:ext>
+          </a:extLst>
+        </p:spPr>
+        <p:txBody>
+          <a:bodyPr/>
+          <a:lstStyle/>
+          <a:p>
+            <a:pPr/>
+            <a:fld id="{86CB4B4D-7CA3-9044-876B-883B54F8677D}" type="slidenum"/>
+          </a:p>
+        </p:txBody>
+      </p:sp>
+    </p:spTree>
+  </p:cSld>
+  <p:clrMapOvr>
+    <a:masterClrMapping/>
+  </p:clrMapOvr>
+  <p:transition xmlns:p14="http://schemas.microsoft.com/office/powerpoint/2010/main" spd="med" advClick="1" p14:dur="1000"/>
+</p:sld>
+</file>
+
+<file path=ppt/slides/slide14.xml><?xml version="1.0" encoding="utf-8"?>
+<p:sld xmlns:a="http://schemas.openxmlformats.org/drawingml/2006/main" xmlns:r="http://schemas.openxmlformats.org/officeDocument/2006/relationships" xmlns:p="http://schemas.openxmlformats.org/presentationml/2006/main" showMasterSp="1" showMasterPhAnim="1">
+  <p:cSld>
+    <p:bg>
+      <p:bgPr>
+        <a:solidFill>
+          <a:srgbClr val="EBEBEB"/>
+        </a:solidFill>
+      </p:bgPr>
+    </p:bg>
+    <p:spTree>
+      <p:nvGrpSpPr>
+        <p:cNvPr id="1" name=""/>
+        <p:cNvGrpSpPr/>
+        <p:nvPr/>
+      </p:nvGrpSpPr>
+      <p:grpSpPr>
+        <a:xfrm>
+          <a:off x="0" y="0"/>
+          <a:ext cx="0" cy="0"/>
+          <a:chOff x="0" y="0"/>
+          <a:chExt cx="0" cy="0"/>
+        </a:xfrm>
+      </p:grpSpPr>
+      <p:sp>
+        <p:nvSpPr>
+          <p:cNvPr id="234" name="Shape 234"/>
+          <p:cNvSpPr/>
+          <p:nvPr>
+            <p:ph type="body" idx="13"/>
+          </p:nvPr>
+        </p:nvSpPr>
+        <p:spPr>
+          <a:prstGeom prst="rect">
+            <a:avLst/>
+          </a:prstGeom>
+        </p:spPr>
+        <p:txBody>
+          <a:bodyPr/>
+          <a:lstStyle/>
+          <a:p>
+            <a:pPr/>
+            <a:r>
+              <a:t>Create a blog with jekyll</a:t>
+            </a:r>
+          </a:p>
+        </p:txBody>
+      </p:sp>
+      <p:sp>
+        <p:nvSpPr>
+          <p:cNvPr id="235" name="Shape 235"/>
+          <p:cNvSpPr/>
+          <p:nvPr>
+            <p:ph type="title"/>
+          </p:nvPr>
+        </p:nvSpPr>
+        <p:spPr>
+          <a:prstGeom prst="rect">
+            <a:avLst/>
+          </a:prstGeom>
+        </p:spPr>
+        <p:txBody>
+          <a:bodyPr/>
+          <a:lstStyle>
+            <a:lvl1pPr defTabSz="467359">
+              <a:spcBef>
+                <a:spcPts val="2200"/>
+              </a:spcBef>
+              <a:defRPr sz="4800"/>
+            </a:lvl1pPr>
+          </a:lstStyle>
+          <a:p>
+            <a:pPr/>
+            <a:r>
+              <a:t>yamL Front Matter</a:t>
+            </a:r>
+          </a:p>
+        </p:txBody>
+      </p:sp>
+      <p:sp>
+        <p:nvSpPr>
+          <p:cNvPr id="236" name="Shape 236"/>
+          <p:cNvSpPr/>
+          <p:nvPr>
+            <p:ph type="body" idx="1"/>
+          </p:nvPr>
+        </p:nvSpPr>
+        <p:spPr>
+          <a:xfrm>
+            <a:off x="406400" y="2791177"/>
+            <a:ext cx="12192000" cy="6108701"/>
+          </a:xfrm>
+          <a:prstGeom prst="rect">
+            <a:avLst/>
+          </a:prstGeom>
+        </p:spPr>
+        <p:txBody>
+          <a:bodyPr/>
+          <a:lstStyle/>
+          <a:p>
+            <a:pPr>
+              <a:defRPr i="1"/>
+            </a:pPr>
+          </a:p>
+          <a:p>
+            <a:pPr>
+              <a:defRPr i="1"/>
+            </a:pPr>
+            <a:r>
+              <a:t> `cd dactl`</a:t>
+            </a:r>
+          </a:p>
+          <a:p>
+            <a:pPr>
+              <a:defRPr i="1"/>
+            </a:pPr>
+            <a:r>
+              <a:t>`bundle install` </a:t>
+            </a:r>
+          </a:p>
+          <a:p>
+            <a:pPr>
+              <a:defRPr i="1"/>
+            </a:pPr>
+            <a:r>
+              <a:t>`jekyll -s`</a:t>
+            </a:r>
+          </a:p>
+          <a:p>
+            <a:pPr>
+              <a:defRPr i="1"/>
+            </a:pPr>
+          </a:p>
+        </p:txBody>
+      </p:sp>
+      <p:sp>
+        <p:nvSpPr>
+          <p:cNvPr id="237" name="Shape 237"/>
+          <p:cNvSpPr/>
+          <p:nvPr>
+            <p:ph type="sldNum" sz="quarter" idx="4294967295"/>
+          </p:nvPr>
+        </p:nvSpPr>
+        <p:spPr>
+          <a:prstGeom prst="rect">
+            <a:avLst/>
+          </a:prstGeom>
+          <a:extLst>
+            <a:ext uri="{C572A759-6A51-4108-AA02-DFA0A04FC94B}">
+              <ma14:wrappingTextBoxFlag xmlns:ma14="http://schemas.microsoft.com/office/mac/drawingml/2011/main" val="1"/>
+            </a:ext>
+          </a:extLst>
+        </p:spPr>
+        <p:txBody>
+          <a:bodyPr/>
+          <a:lstStyle/>
+          <a:p>
+            <a:pPr/>
+            <a:fld id="{86CB4B4D-7CA3-9044-876B-883B54F8677D}" type="slidenum"/>
+          </a:p>
+        </p:txBody>
+      </p:sp>
+      <p:pic>
+        <p:nvPicPr>
+          <p:cNvPr id="238" name="carbon(1).png"/>
+          <p:cNvPicPr>
+            <a:picLocks noChangeAspect="1"/>
+          </p:cNvPicPr>
+          <p:nvPr/>
+        </p:nvPicPr>
+        <p:blipFill>
+          <a:blip r:embed="rId3">
+            <a:extLst/>
+          </a:blip>
+          <a:stretch>
+            <a:fillRect/>
+          </a:stretch>
+        </p:blipFill>
+        <p:spPr>
+          <a:xfrm>
+            <a:off x="0" y="2191260"/>
+            <a:ext cx="13004800" cy="8511369"/>
+          </a:xfrm>
+          <a:prstGeom prst="rect">
+            <a:avLst/>
+          </a:prstGeom>
+          <a:ln w="12700">
+            <a:miter lim="400000"/>
+          </a:ln>
+        </p:spPr>
+      </p:pic>
+      <p:sp>
+        <p:nvSpPr>
+          <p:cNvPr id="239" name="Shape 239"/>
+          <p:cNvSpPr/>
+          <p:nvPr/>
+        </p:nvSpPr>
+        <p:spPr>
+          <a:xfrm>
+            <a:off x="3818623" y="2230945"/>
+            <a:ext cx="4351554" cy="990601"/>
+          </a:xfrm>
+          <a:prstGeom prst="rect">
+            <a:avLst/>
+          </a:prstGeom>
+          <a:ln w="12700">
+            <a:miter lim="400000"/>
+          </a:ln>
+          <a:extLst>
+            <a:ext uri="{C572A759-6A51-4108-AA02-DFA0A04FC94B}">
+              <ma14:wrappingTextBoxFlag xmlns:ma14="http://schemas.microsoft.com/office/mac/drawingml/2011/main" val="1"/>
+            </a:ext>
+          </a:extLst>
+        </p:spPr>
+        <p:txBody>
+          <a:bodyPr wrap="none" lIns="50800" tIns="50800" rIns="50800" bIns="50800" anchor="ctr">
+            <a:spAutoFit/>
+          </a:bodyPr>
+          <a:lstStyle>
+            <a:lvl1pPr>
+              <a:defRPr sz="5100" u="sng">
+                <a:solidFill>
+                  <a:schemeClr val="accent1"/>
+                </a:solidFill>
+                <a:latin typeface="Avenir Next Demi Bold"/>
+                <a:ea typeface="Avenir Next Demi Bold"/>
+                <a:cs typeface="Avenir Next Demi Bold"/>
+                <a:sym typeface="Avenir Next Demi Bold"/>
+                <a:hlinkClick r:id="rId4" invalidUrl="" action="" tgtFrame="" tooltip="" history="1" highlightClick="0" endSnd="0"/>
+              </a:defRPr>
+            </a:lvl1pPr>
+          </a:lstStyle>
+          <a:p>
+            <a:pPr>
+              <a:defRPr u="none">
+                <a:solidFill>
+                  <a:srgbClr val="838787"/>
+                </a:solidFill>
+              </a:defRPr>
+            </a:pPr>
+            <a:r>
+              <a:rPr u="sng">
+                <a:solidFill>
+                  <a:schemeClr val="accent1"/>
+                </a:solidFill>
+                <a:hlinkClick r:id="rId4" invalidUrl="" action="" tgtFrame="" tooltip="" history="1" highlightClick="0" endSnd="0"/>
+              </a:rPr>
+              <a:t>View This Post</a:t>
+            </a:r>
+          </a:p>
+        </p:txBody>
+      </p:sp>
+    </p:spTree>
+  </p:cSld>
+  <p:clrMapOvr>
+    <a:masterClrMapping/>
+  </p:clrMapOvr>
+  <p:transition xmlns:p14="http://schemas.microsoft.com/office/powerpoint/2010/main" spd="med" advClick="1" p14:dur="1000"/>
+</p:sld>
+</file>
+
+<file path=ppt/slides/slide15.xml><?xml version="1.0" encoding="utf-8"?>
+<p:sld xmlns:a="http://schemas.openxmlformats.org/drawingml/2006/main" xmlns:r="http://schemas.openxmlformats.org/officeDocument/2006/relationships" xmlns:p="http://schemas.openxmlformats.org/presentationml/2006/main" showMasterSp="1" showMasterPhAnim="1">
+  <p:cSld>
+    <p:bg>
+      <p:bgPr>
+        <a:solidFill>
+          <a:srgbClr val="EBEBEB"/>
+        </a:solidFill>
+      </p:bgPr>
+    </p:bg>
+    <p:spTree>
+      <p:nvGrpSpPr>
+        <p:cNvPr id="1" name=""/>
+        <p:cNvGrpSpPr/>
+        <p:nvPr/>
+      </p:nvGrpSpPr>
+      <p:grpSpPr>
+        <a:xfrm>
+          <a:off x="0" y="0"/>
+          <a:ext cx="0" cy="0"/>
+          <a:chOff x="0" y="0"/>
+          <a:chExt cx="0" cy="0"/>
+        </a:xfrm>
+      </p:grpSpPr>
+      <p:pic>
+        <p:nvPicPr>
+          <p:cNvPr id="243" name="writing GIF-original.mp4"/>
+          <p:cNvPicPr>
+            <a:picLocks noChangeAspect="0"/>
+          </p:cNvPicPr>
+          <p:nvPr>
+            <a:videoFile r:link="rId2"/>
+            <p:extLst>
+              <p:ext uri="{DAA4B4D4-6D71-4841-9C94-3DE7FCFB9230}">
+                <p14:media xmlns:p14="http://schemas.microsoft.com/office/powerpoint/2010/main" r:embed="rId3"/>
+              </p:ext>
+            </p:extLst>
+          </p:nvPr>
+        </p:nvPicPr>
+        <p:blipFill>
+          <a:blip r:embed="rId4">
+            <a:extLst/>
+          </a:blip>
+          <a:stretch>
+            <a:fillRect/>
+          </a:stretch>
+        </p:blipFill>
+        <p:spPr>
+          <a:xfrm>
+            <a:off x="-1581340" y="-1"/>
+            <a:ext cx="17339733" cy="9753601"/>
+          </a:xfrm>
+          <a:prstGeom prst="rect">
+            <a:avLst/>
+          </a:prstGeom>
+          <a:ln w="12700">
+            <a:miter lim="400000"/>
+          </a:ln>
+        </p:spPr>
+      </p:pic>
+      <p:sp>
+        <p:nvSpPr>
+          <p:cNvPr id="244" name="Shape 244"/>
+          <p:cNvSpPr/>
+          <p:nvPr/>
+        </p:nvSpPr>
+        <p:spPr>
+          <a:xfrm>
+            <a:off x="-13803" y="-80305"/>
+            <a:ext cx="13032407" cy="13032407"/>
+          </a:xfrm>
+          <a:prstGeom prst="rect">
+            <a:avLst/>
+          </a:prstGeom>
+          <a:solidFill>
+            <a:srgbClr val="FFFFFF">
+              <a:alpha val="47396"/>
+            </a:srgbClr>
+          </a:solidFill>
+          <a:ln w="12700">
+            <a:miter lim="400000"/>
+          </a:ln>
+        </p:spPr>
+        <p:txBody>
+          <a:bodyPr lIns="50800" tIns="50800" rIns="50800" bIns="50800" anchor="ctr"/>
+          <a:lstStyle/>
+          <a:p>
+            <a:pPr algn="ctr">
+              <a:lnSpc>
+                <a:spcPct val="80000"/>
+              </a:lnSpc>
+              <a:spcBef>
+                <a:spcPts val="0"/>
+              </a:spcBef>
+              <a:defRPr cap="all" sz="2800">
+                <a:solidFill>
+                  <a:srgbClr val="FFFFFF"/>
+                </a:solidFill>
+                <a:latin typeface="+mn-lt"/>
+                <a:ea typeface="+mn-ea"/>
+                <a:cs typeface="+mn-cs"/>
+                <a:sym typeface="DIN Condensed"/>
+              </a:defRPr>
+            </a:pPr>
+          </a:p>
+        </p:txBody>
+      </p:sp>
+      <p:sp>
+        <p:nvSpPr>
+          <p:cNvPr id="245" name="Shape 245"/>
+          <p:cNvSpPr/>
+          <p:nvPr>
+            <p:ph type="title"/>
+          </p:nvPr>
+        </p:nvSpPr>
+        <p:spPr>
+          <a:prstGeom prst="rect">
+            <a:avLst/>
+          </a:prstGeom>
+        </p:spPr>
+        <p:txBody>
+          <a:bodyPr/>
+          <a:lstStyle>
+            <a:lvl1pPr>
+              <a:defRPr>
+                <a:solidFill>
+                  <a:srgbClr val="34A5DB"/>
+                </a:solidFill>
+              </a:defRPr>
+            </a:lvl1pPr>
+          </a:lstStyle>
+          <a:p>
+            <a:pPr/>
+            <a:r>
+              <a:t>Write first blog post</a:t>
+            </a:r>
+          </a:p>
+        </p:txBody>
+      </p:sp>
+    </p:spTree>
+  </p:cSld>
+  <p:clrMapOvr>
+    <a:masterClrMapping/>
+  </p:clrMapOvr>
+  <p:transition xmlns:p14="http://schemas.microsoft.com/office/powerpoint/2010/main" spd="med" advClick="1" p14:dur="1000"/>
+  <p:timing>
+    <p:tnLst>
+      <p:par>
+        <p:cTn id="1" nodeType="tmRoot" restart="never" dur="indefinite" fill="hold">
+          <p:childTnLst>
+            <p:seq concurrent="1" prevAc="none" nextAc="seek">
+              <p:cTn id="2" nodeType="mainSeq" dur="indefinite" fill="hold">
+                <p:childTnLst>
+                  <p:par>
+                    <p:cTn id="3" fill="hold">
+                      <p:stCondLst>
+                        <p:cond delay="indefinite"/>
+                        <p:cond evt="onBegin">
+                          <p:tn val="2"/>
+                        </p:cond>
+                      </p:stCondLst>
+                      <p:childTnLst>
+                        <p:par>
+                          <p:cTn id="4" fill="hold">
+                            <p:stCondLst>
+                              <p:cond delay="0"/>
+                            </p:stCondLst>
+                            <p:childTnLst>
+                              <p:par>
+                                <p:cTn id="5" presetClass="mediacall" nodeType="afterEffect" presetSubtype="0" presetID="1" grpId="1" fill="hold">
+                                  <p:stCondLst>
+                                    <p:cond delay="0"/>
+                                  </p:stCondLst>
+                                  <p:childTnLst>
+                                    <p:cmd type="call" cmd="playFrom(0.0)">
+                                      <p:cBhvr>
+                                        <p:cTn id="6" dur="2720000" fill="hold"/>
+                                        <p:tgtEl>
+                                          <p:spTgt spid="243"/>
+                                        </p:tgtEl>
+                                      </p:cBhvr>
+                                    </p:cmd>
+                                  </p:childTnLst>
+                                </p:cTn>
+                              </p:par>
+                            </p:childTnLst>
+                          </p:cTn>
+                        </p:par>
+                      </p:childTnLst>
+                    </p:cTn>
+                  </p:par>
+                </p:childTnLst>
+              </p:cTn>
+              <p:prevCondLst>
+                <p:cond evt="onPrev">
+                  <p:tgtEl>
+                    <p:sldTgt/>
+                  </p:tgtEl>
+                </p:cond>
+              </p:prevCondLst>
+              <p:nextCondLst>
+                <p:cond evt="onNext">
+                  <p:tgtEl>
+                    <p:sldTgt/>
+                  </p:tgtEl>
+                </p:cond>
+              </p:nextCondLst>
+            </p:seq>
+            <p:video fullScrn="0">
+              <p:cMediaNode mute="0" showWhenStopped="1" numSld="1" vol="100000">
+                <p:cTn id="7" fill="hold" display="0">
+                  <p:stCondLst>
+                    <p:cond delay="indefinite"/>
+                  </p:stCondLst>
+                </p:cTn>
+                <p:tgtEl>
+                  <p:spTgt spid="243"/>
+                </p:tgtEl>
+              </p:cMediaNode>
+            </p:video>
+          </p:childTnLst>
+        </p:cTn>
+      </p:par>
+    </p:tnLst>
+  </p:timing>
+</p:sld>
+</file>
+
+<file path=ppt/slides/slide16.xml><?xml version="1.0" encoding="utf-8"?>
+<p:sld xmlns:a="http://schemas.openxmlformats.org/drawingml/2006/main" xmlns:r="http://schemas.openxmlformats.org/officeDocument/2006/relationships" xmlns:p="http://schemas.openxmlformats.org/presentationml/2006/main" showMasterSp="1" showMasterPhAnim="1">
+  <p:cSld>
+    <p:bg>
+      <p:bgPr>
+        <a:solidFill>
+          <a:srgbClr val="EBEBEB"/>
+        </a:solidFill>
+      </p:bgPr>
+    </p:bg>
+    <p:spTree>
+      <p:nvGrpSpPr>
+        <p:cNvPr id="1" name=""/>
+        <p:cNvGrpSpPr/>
+        <p:nvPr/>
+      </p:nvGrpSpPr>
+      <p:grpSpPr>
+        <a:xfrm>
+          <a:off x="0" y="0"/>
+          <a:ext cx="0" cy="0"/>
+          <a:chOff x="0" y="0"/>
+          <a:chExt cx="0" cy="0"/>
+        </a:xfrm>
+      </p:grpSpPr>
+      <p:sp>
+        <p:nvSpPr>
+          <p:cNvPr id="247" name="Shape 247"/>
+          <p:cNvSpPr/>
+          <p:nvPr>
+            <p:ph type="body" idx="13"/>
+          </p:nvPr>
+        </p:nvSpPr>
+        <p:spPr>
+          <a:prstGeom prst="rect">
+            <a:avLst/>
+          </a:prstGeom>
+        </p:spPr>
+        <p:txBody>
+          <a:bodyPr/>
+          <a:lstStyle/>
+          <a:p>
+            <a:pPr/>
+            <a:r>
+              <a:t>Create a blog with jekyll</a:t>
+            </a:r>
+          </a:p>
+        </p:txBody>
+      </p:sp>
+      <p:sp>
+        <p:nvSpPr>
+          <p:cNvPr id="248" name="Shape 248"/>
+          <p:cNvSpPr/>
+          <p:nvPr>
+            <p:ph type="title"/>
+          </p:nvPr>
+        </p:nvSpPr>
+        <p:spPr>
+          <a:prstGeom prst="rect">
+            <a:avLst/>
+          </a:prstGeom>
+        </p:spPr>
+        <p:txBody>
+          <a:bodyPr/>
+          <a:lstStyle>
+            <a:lvl1pPr defTabSz="467359">
+              <a:spcBef>
+                <a:spcPts val="2200"/>
+              </a:spcBef>
+              <a:defRPr sz="4800"/>
+            </a:lvl1pPr>
+          </a:lstStyle>
+          <a:p>
+            <a:pPr/>
+            <a:r>
+              <a:t>Resources (VISUALS)</a:t>
+            </a:r>
+          </a:p>
+        </p:txBody>
+      </p:sp>
+      <p:sp>
+        <p:nvSpPr>
+          <p:cNvPr id="249" name="Shape 249"/>
+          <p:cNvSpPr/>
+          <p:nvPr>
+            <p:ph type="body" idx="1"/>
+          </p:nvPr>
+        </p:nvSpPr>
+        <p:spPr>
+          <a:xfrm>
+            <a:off x="406400" y="2749550"/>
+            <a:ext cx="12192000" cy="6108700"/>
+          </a:xfrm>
+          <a:prstGeom prst="rect">
+            <a:avLst/>
+          </a:prstGeom>
+        </p:spPr>
+        <p:txBody>
+          <a:bodyPr numCol="2" spcCol="609600"/>
+          <a:lstStyle/>
+          <a:p>
+            <a:pPr/>
+            <a:r>
+              <a:t>Giphy</a:t>
+            </a:r>
+          </a:p>
+          <a:p>
+            <a:pPr/>
+            <a:r>
+              <a:t>For code: </a:t>
+            </a:r>
+          </a:p>
+          <a:p>
+            <a:pPr/>
+            <a:r>
+              <a:rPr u="sng">
+                <a:solidFill>
+                  <a:schemeClr val="accent1"/>
+                </a:solidFill>
+                <a:hlinkClick r:id="rId2" invalidUrl="" action="" tgtFrame="" tooltip="" history="1" highlightClick="0" endSnd="0"/>
+              </a:rPr>
+              <a:t>Carbon.now.sh</a:t>
+            </a:r>
+          </a:p>
+          <a:p>
+            <a:pPr/>
+            <a:r>
+              <a:rPr u="sng">
+                <a:solidFill>
+                  <a:schemeClr val="accent1"/>
+                </a:solidFill>
+                <a:hlinkClick r:id="rId3" invalidUrl="" action="" tgtFrame="" tooltip="" history="1" highlightClick="0" endSnd="0"/>
+              </a:rPr>
+              <a:t>http://markup.su/highlighter/</a:t>
+            </a:r>
+          </a:p>
+        </p:txBody>
+      </p:sp>
+      <p:sp>
+        <p:nvSpPr>
+          <p:cNvPr id="250" name="Shape 250"/>
+          <p:cNvSpPr/>
+          <p:nvPr>
+            <p:ph type="sldNum" sz="quarter" idx="4294967295"/>
+          </p:nvPr>
+        </p:nvSpPr>
+        <p:spPr>
+          <a:prstGeom prst="rect">
+            <a:avLst/>
+          </a:prstGeom>
+          <a:extLst>
+            <a:ext uri="{C572A759-6A51-4108-AA02-DFA0A04FC94B}">
+              <ma14:wrappingTextBoxFlag xmlns:ma14="http://schemas.microsoft.com/office/mac/drawingml/2011/main" val="1"/>
+            </a:ext>
+          </a:extLst>
+        </p:spPr>
+        <p:txBody>
+          <a:bodyPr/>
+          <a:lstStyle/>
+          <a:p>
+            <a:pPr/>
+            <a:fld id="{86CB4B4D-7CA3-9044-876B-883B54F8677D}" type="slidenum"/>
+          </a:p>
+        </p:txBody>
+      </p:sp>
+    </p:spTree>
+  </p:cSld>
+  <p:clrMapOvr>
+    <a:masterClrMapping/>
+  </p:clrMapOvr>
+  <p:transition xmlns:p14="http://schemas.microsoft.com/office/powerpoint/2010/main" spd="med" advClick="1" p14:dur="1000"/>
+</p:sld>
+</file>
+
+<file path=ppt/slides/slide17.xml><?xml version="1.0" encoding="utf-8"?>
+<p:sld xmlns:a="http://schemas.openxmlformats.org/drawingml/2006/main" xmlns:r="http://schemas.openxmlformats.org/officeDocument/2006/relationships" xmlns:p="http://schemas.openxmlformats.org/presentationml/2006/main" showMasterSp="1" showMasterPhAnim="1">
+  <p:cSld>
+    <p:bg>
+      <p:bgPr>
+        <a:solidFill>
+          <a:srgbClr val="EBEBEB"/>
+        </a:solidFill>
+      </p:bgPr>
+    </p:bg>
+    <p:spTree>
+      <p:nvGrpSpPr>
+        <p:cNvPr id="1" name=""/>
+        <p:cNvGrpSpPr/>
+        <p:nvPr/>
+      </p:nvGrpSpPr>
+      <p:grpSpPr>
+        <a:xfrm>
+          <a:off x="0" y="0"/>
+          <a:ext cx="0" cy="0"/>
+          <a:chOff x="0" y="0"/>
+          <a:chExt cx="0" cy="0"/>
+        </a:xfrm>
+      </p:grpSpPr>
+      <p:sp>
+        <p:nvSpPr>
+          <p:cNvPr id="252" name="Shape 252"/>
+          <p:cNvSpPr/>
+          <p:nvPr>
+            <p:ph type="body" idx="13"/>
+          </p:nvPr>
+        </p:nvSpPr>
+        <p:spPr>
+          <a:prstGeom prst="rect">
+            <a:avLst/>
+          </a:prstGeom>
+        </p:spPr>
+        <p:txBody>
+          <a:bodyPr/>
+          <a:lstStyle/>
+          <a:p>
+            <a:pPr/>
+            <a:r>
+              <a:t>Create a blog with jekyll</a:t>
+            </a:r>
+          </a:p>
+        </p:txBody>
+      </p:sp>
+      <p:sp>
+        <p:nvSpPr>
+          <p:cNvPr id="253" name="Shape 253"/>
+          <p:cNvSpPr/>
+          <p:nvPr>
+            <p:ph type="title"/>
+          </p:nvPr>
+        </p:nvSpPr>
+        <p:spPr>
+          <a:prstGeom prst="rect">
+            <a:avLst/>
+          </a:prstGeom>
+        </p:spPr>
+        <p:txBody>
+          <a:bodyPr/>
+          <a:lstStyle>
+            <a:lvl1pPr defTabSz="467359">
+              <a:spcBef>
+                <a:spcPts val="2200"/>
+              </a:spcBef>
+              <a:defRPr sz="4800"/>
+            </a:lvl1pPr>
+          </a:lstStyle>
+          <a:p>
+            <a:pPr/>
+            <a:r>
+              <a:t>Resources (Content)</a:t>
+            </a:r>
+          </a:p>
+        </p:txBody>
+      </p:sp>
+      <p:sp>
+        <p:nvSpPr>
+          <p:cNvPr id="254" name="Shape 254"/>
+          <p:cNvSpPr/>
+          <p:nvPr>
+            <p:ph type="body" idx="1"/>
+          </p:nvPr>
+        </p:nvSpPr>
+        <p:spPr>
+          <a:xfrm>
+            <a:off x="406400" y="2749550"/>
+            <a:ext cx="12192000" cy="6108700"/>
+          </a:xfrm>
+          <a:prstGeom prst="rect">
+            <a:avLst/>
+          </a:prstGeom>
+        </p:spPr>
+        <p:txBody>
+          <a:bodyPr numCol="2" spcCol="609600"/>
+          <a:lstStyle/>
+          <a:p>
+            <a:pPr/>
+            <a:r>
+              <a:rPr u="sng">
+                <a:solidFill>
+                  <a:schemeClr val="accent1"/>
+                </a:solidFill>
+                <a:hlinkClick r:id="rId2" invalidUrl="" action="" tgtFrame="" tooltip="" history="1" highlightClick="0" endSnd="0"/>
+              </a:rPr>
+              <a:t>Programming Historian </a:t>
+            </a:r>
+          </a:p>
+          <a:p>
+            <a:pPr/>
+            <a:r>
+              <a:rPr u="sng">
+                <a:solidFill>
+                  <a:schemeClr val="accent1"/>
+                </a:solidFill>
+                <a:hlinkClick r:id="rId3" invalidUrl="" action="" tgtFrame="" tooltip="" history="1" highlightClick="0" endSnd="0"/>
+              </a:rPr>
+              <a:t>http://girldevelopit.github.io/gdi-featured-git-github/#/</a:t>
+            </a:r>
+          </a:p>
+          <a:p>
+            <a:pPr/>
+          </a:p>
+          <a:p>
+            <a:pPr/>
+            <a:r>
+              <a:t>Giphy</a:t>
+            </a:r>
+          </a:p>
+        </p:txBody>
+      </p:sp>
+      <p:sp>
+        <p:nvSpPr>
+          <p:cNvPr id="255" name="Shape 255"/>
+          <p:cNvSpPr/>
+          <p:nvPr>
+            <p:ph type="sldNum" sz="quarter" idx="4294967295"/>
+          </p:nvPr>
+        </p:nvSpPr>
+        <p:spPr>
+          <a:prstGeom prst="rect">
+            <a:avLst/>
+          </a:prstGeom>
+          <a:extLst>
+            <a:ext uri="{C572A759-6A51-4108-AA02-DFA0A04FC94B}">
+              <ma14:wrappingTextBoxFlag xmlns:ma14="http://schemas.microsoft.com/office/mac/drawingml/2011/main" val="1"/>
+            </a:ext>
+          </a:extLst>
+        </p:spPr>
+        <p:txBody>
+          <a:bodyPr/>
+          <a:lstStyle/>
+          <a:p>
+            <a:pPr/>
+            <a:fld id="{86CB4B4D-7CA3-9044-876B-883B54F8677D}" type="slidenum"/>
+          </a:p>
+        </p:txBody>
+      </p:sp>
+    </p:spTree>
+  </p:cSld>
+  <p:clrMapOvr>
+    <a:masterClrMapping/>
+  </p:clrMapOvr>
+  <p:transition xmlns:p14="http://schemas.microsoft.com/office/powerpoint/2010/main" spd="med" advClick="1" p14:dur="1000"/>
+</p:sld>
+</file>
+
+<file path=ppt/slides/slide2.xml><?xml version="1.0" encoding="utf-8"?>
+<p:sld xmlns:a="http://schemas.openxmlformats.org/drawingml/2006/main" xmlns:r="http://schemas.openxmlformats.org/officeDocument/2006/relationships" xmlns:p="http://schemas.openxmlformats.org/presentationml/2006/main" showMasterSp="1" showMasterPhAnim="1">
+  <p:cSld>
+    <p:bg>
+      <p:bgPr>
+        <a:solidFill>
+          <a:srgbClr val="EBEBEB"/>
+        </a:solidFill>
+      </p:bgPr>
+    </p:bg>
+    <p:spTree>
+      <p:nvGrpSpPr>
+        <p:cNvPr id="1" name=""/>
+        <p:cNvGrpSpPr/>
+        <p:nvPr/>
+      </p:nvGrpSpPr>
+      <p:grpSpPr>
+        <a:xfrm>
+          <a:off x="0" y="0"/>
+          <a:ext cx="0" cy="0"/>
+          <a:chOff x="0" y="0"/>
+          <a:chExt cx="0" cy="0"/>
+        </a:xfrm>
+      </p:grpSpPr>
+      <p:sp>
+        <p:nvSpPr>
+          <p:cNvPr id="171" name="Shape 171"/>
+          <p:cNvSpPr/>
+          <p:nvPr>
+            <p:ph type="body" idx="13"/>
+          </p:nvPr>
+        </p:nvSpPr>
+        <p:spPr>
+          <a:prstGeom prst="rect">
+            <a:avLst/>
+          </a:prstGeom>
+        </p:spPr>
+        <p:txBody>
+          <a:bodyPr/>
+          <a:lstStyle/>
+          <a:p>
+            <a:pPr/>
+            <a:r>
+              <a:t>Create a blog with jekyll</a:t>
+            </a:r>
+          </a:p>
+        </p:txBody>
+      </p:sp>
+      <p:sp>
+        <p:nvSpPr>
+          <p:cNvPr id="172" name="Shape 172"/>
+          <p:cNvSpPr/>
+          <p:nvPr>
+            <p:ph type="title"/>
+          </p:nvPr>
+        </p:nvSpPr>
+        <p:spPr>
+          <a:prstGeom prst="rect">
+            <a:avLst/>
+          </a:prstGeom>
+        </p:spPr>
+        <p:txBody>
+          <a:bodyPr/>
+          <a:lstStyle>
+            <a:lvl1pPr defTabSz="467359">
+              <a:spcBef>
+                <a:spcPts val="2200"/>
+              </a:spcBef>
+              <a:defRPr sz="4800"/>
+            </a:lvl1pPr>
+          </a:lstStyle>
+          <a:p>
+            <a:pPr/>
+            <a:r>
+              <a:t>Hello!</a:t>
+            </a:r>
+          </a:p>
+        </p:txBody>
+      </p:sp>
+      <p:sp>
+        <p:nvSpPr>
+          <p:cNvPr id="173" name="Shape 173"/>
+          <p:cNvSpPr/>
+          <p:nvPr>
+            <p:ph type="body" idx="1"/>
+          </p:nvPr>
+        </p:nvSpPr>
+        <p:spPr>
+          <a:xfrm>
+            <a:off x="406400" y="2749550"/>
+            <a:ext cx="12192000" cy="6108700"/>
+          </a:xfrm>
+          <a:prstGeom prst="rect">
+            <a:avLst/>
+          </a:prstGeom>
+        </p:spPr>
+        <p:txBody>
+          <a:bodyPr/>
+          <a:lstStyle/>
+          <a:p>
+            <a:pPr/>
+            <a:r>
+              <a:rPr>
+                <a:solidFill>
+                  <a:schemeClr val="accent1"/>
+                </a:solidFill>
+              </a:rPr>
+              <a:t>Monica Powell </a:t>
+            </a:r>
+            <a:r>
+              <a:t>is a long-time #CodeNewbie who currently leads e-mail marketing at Jopwell and periodically writes for FreeCodeCamp, Hacker Noon and Code Like A Girl.</a:t>
+            </a:r>
+          </a:p>
+          <a:p>
+            <a:pPr/>
+            <a:r>
+              <a:rPr>
+                <a:solidFill>
+                  <a:srgbClr val="34A5D8"/>
+                </a:solidFill>
+                <a:latin typeface="Avenir Next Demi Bold"/>
+                <a:ea typeface="Avenir Next Demi Bold"/>
+                <a:cs typeface="Avenir Next Demi Bold"/>
+                <a:sym typeface="Avenir Next Demi Bold"/>
+              </a:rPr>
+              <a:t>Nia Murrell </a:t>
+            </a:r>
+            <a:r>
+              <a:t> is a PLACEHOLDER TEXT.</a:t>
+            </a:r>
+          </a:p>
+        </p:txBody>
+      </p:sp>
+      <p:sp>
+        <p:nvSpPr>
+          <p:cNvPr id="174" name="Shape 174"/>
+          <p:cNvSpPr/>
+          <p:nvPr>
+            <p:ph type="sldNum" sz="quarter" idx="4294967295"/>
+          </p:nvPr>
+        </p:nvSpPr>
+        <p:spPr>
+          <a:xfrm>
+            <a:off x="12332920" y="431800"/>
+            <a:ext cx="260599" cy="457200"/>
+          </a:xfrm>
+          <a:prstGeom prst="rect">
+            <a:avLst/>
+          </a:prstGeom>
+          <a:extLst>
+            <a:ext uri="{C572A759-6A51-4108-AA02-DFA0A04FC94B}">
+              <ma14:wrappingTextBoxFlag xmlns:ma14="http://schemas.microsoft.com/office/mac/drawingml/2011/main" val="1"/>
+            </a:ext>
+          </a:extLst>
+        </p:spPr>
+        <p:txBody>
+          <a:bodyPr/>
+          <a:lstStyle/>
+          <a:p>
+            <a:pPr/>
+            <a:fld id="{86CB4B4D-7CA3-9044-876B-883B54F8677D}" type="slidenum"/>
+          </a:p>
+        </p:txBody>
+      </p:sp>
+    </p:spTree>
+  </p:cSld>
+  <p:clrMapOvr>
+    <a:masterClrMapping/>
+  </p:clrMapOvr>
+  <p:transition xmlns:p14="http://schemas.microsoft.com/office/powerpoint/2010/main" spd="med" advClick="1" p14:dur="1000"/>
+</p:sld>
+</file>
+
+<file path=ppt/slides/slide3.xml><?xml version="1.0" encoding="utf-8"?>
+<p:sld xmlns:a="http://schemas.openxmlformats.org/drawingml/2006/main" xmlns:r="http://schemas.openxmlformats.org/officeDocument/2006/relationships" xmlns:p="http://schemas.openxmlformats.org/presentationml/2006/main" showMasterSp="1" showMasterPhAnim="1">
+  <p:cSld>
+    <p:bg>
+      <p:bgPr>
+        <a:solidFill>
+          <a:srgbClr val="EBEBEB"/>
+        </a:solidFill>
+      </p:bgPr>
+    </p:bg>
+    <p:spTree>
+      <p:nvGrpSpPr>
+        <p:cNvPr id="1" name=""/>
+        <p:cNvGrpSpPr/>
+        <p:nvPr/>
+      </p:nvGrpSpPr>
+      <p:grpSpPr>
+        <a:xfrm>
+          <a:off x="0" y="0"/>
+          <a:ext cx="0" cy="0"/>
+          <a:chOff x="0" y="0"/>
+          <a:chExt cx="0" cy="0"/>
+        </a:xfrm>
+      </p:grpSpPr>
+      <p:sp>
+        <p:nvSpPr>
+          <p:cNvPr id="176" name="Shape 176"/>
+          <p:cNvSpPr/>
+          <p:nvPr>
+            <p:ph type="title"/>
+          </p:nvPr>
+        </p:nvSpPr>
+        <p:spPr>
+          <a:xfrm>
+            <a:off x="406400" y="2616200"/>
+            <a:ext cx="12192000" cy="4521200"/>
+          </a:xfrm>
+          <a:prstGeom prst="rect">
+            <a:avLst/>
+          </a:prstGeom>
+        </p:spPr>
+        <p:txBody>
+          <a:bodyPr/>
+          <a:lstStyle/>
+          <a:p>
+            <a:pPr defTabSz="397256">
+              <a:defRPr sz="11560"/>
+            </a:pPr>
+            <a:r>
+              <a:t>Today we will create a static blog using </a:t>
+            </a:r>
+            <a:r>
+              <a:rPr>
+                <a:solidFill>
+                  <a:srgbClr val="011993"/>
+                </a:solidFill>
+              </a:rPr>
+              <a:t>Jekyll</a:t>
+            </a:r>
+            <a:r>
+              <a:t>.</a:t>
+            </a:r>
+          </a:p>
+        </p:txBody>
+      </p:sp>
+    </p:spTree>
+  </p:cSld>
+  <p:clrMapOvr>
+    <a:masterClrMapping/>
+  </p:clrMapOvr>
+  <p:transition xmlns:p14="http://schemas.microsoft.com/office/powerpoint/2010/main" spd="med" advClick="1" p14:dur="1000"/>
+</p:sld>
+</file>
+
+<file path=ppt/slides/slide4.xml><?xml version="1.0" encoding="utf-8"?>
+<p:sld xmlns:a="http://schemas.openxmlformats.org/drawingml/2006/main" xmlns:r="http://schemas.openxmlformats.org/officeDocument/2006/relationships" xmlns:p="http://schemas.openxmlformats.org/presentationml/2006/main" showMasterSp="1" showMasterPhAnim="1">
+  <p:cSld>
+    <p:bg>
+      <p:bgPr>
+        <a:solidFill>
+          <a:srgbClr val="EBEBEB"/>
+        </a:solidFill>
+      </p:bgPr>
+    </p:bg>
+    <p:spTree>
+      <p:nvGrpSpPr>
+        <p:cNvPr id="1" name=""/>
+        <p:cNvGrpSpPr/>
+        <p:nvPr/>
+      </p:nvGrpSpPr>
+      <p:grpSpPr>
+        <a:xfrm>
+          <a:off x="0" y="0"/>
+          <a:ext cx="0" cy="0"/>
+          <a:chOff x="0" y="0"/>
+          <a:chExt cx="0" cy="0"/>
+        </a:xfrm>
+      </p:grpSpPr>
+      <p:sp>
+        <p:nvSpPr>
+          <p:cNvPr id="178" name="Shape 178"/>
+          <p:cNvSpPr/>
+          <p:nvPr>
+            <p:ph type="body" idx="13"/>
+          </p:nvPr>
+        </p:nvSpPr>
+        <p:spPr>
+          <a:prstGeom prst="rect">
+            <a:avLst/>
+          </a:prstGeom>
+        </p:spPr>
+        <p:txBody>
+          <a:bodyPr/>
+          <a:lstStyle/>
+          <a:p>
+            <a:pPr/>
+            <a:r>
+              <a:t>Create a blog with jekyll</a:t>
+            </a:r>
+          </a:p>
+        </p:txBody>
+      </p:sp>
+      <p:sp>
+        <p:nvSpPr>
+          <p:cNvPr id="179" name="Shape 179"/>
+          <p:cNvSpPr/>
+          <p:nvPr>
+            <p:ph type="title"/>
+          </p:nvPr>
+        </p:nvSpPr>
+        <p:spPr>
+          <a:prstGeom prst="rect">
+            <a:avLst/>
+          </a:prstGeom>
+        </p:spPr>
+        <p:txBody>
+          <a:bodyPr/>
+          <a:lstStyle>
+            <a:lvl1pPr defTabSz="467359">
+              <a:spcBef>
+                <a:spcPts val="2200"/>
+              </a:spcBef>
+              <a:defRPr sz="4800"/>
+            </a:lvl1pPr>
+          </a:lstStyle>
+          <a:p>
+            <a:pPr/>
+            <a:r>
+              <a:t>Static vs dynamic websites</a:t>
+            </a:r>
+          </a:p>
+        </p:txBody>
+      </p:sp>
+      <p:sp>
+        <p:nvSpPr>
+          <p:cNvPr id="180" name="Shape 180"/>
+          <p:cNvSpPr/>
+          <p:nvPr>
+            <p:ph type="body" idx="1"/>
+          </p:nvPr>
+        </p:nvSpPr>
+        <p:spPr>
+          <a:xfrm>
+            <a:off x="406400" y="2749550"/>
+            <a:ext cx="12192000" cy="6108700"/>
+          </a:xfrm>
+          <a:prstGeom prst="rect">
+            <a:avLst/>
+          </a:prstGeom>
+        </p:spPr>
+        <p:txBody>
+          <a:bodyPr numCol="2" spcCol="609600"/>
+          <a:lstStyle/>
+          <a:p>
+            <a:pPr/>
+            <a:r>
+              <a:t>Static websites unlike dynamic websites:</a:t>
+            </a:r>
+          </a:p>
+          <a:p>
+            <a:pPr/>
+            <a:r>
+              <a:t>Never have databases </a:t>
+            </a:r>
+          </a:p>
+          <a:p>
+            <a:pPr/>
+            <a:r>
+              <a:t>Display the same information for all readers</a:t>
+            </a:r>
+          </a:p>
+          <a:p>
+            <a:pPr/>
+          </a:p>
+          <a:p>
+            <a:pPr/>
+          </a:p>
+          <a:p>
+            <a:pPr/>
+            <a:r>
+              <a:t>Less expensive to host</a:t>
+            </a:r>
+          </a:p>
+          <a:p>
+            <a:pPr/>
+            <a:r>
+              <a:t>Load faster</a:t>
+            </a:r>
+          </a:p>
+          <a:p>
+            <a:pPr/>
+            <a:r>
+              <a:t>Less prone to hacking</a:t>
+            </a:r>
+          </a:p>
+          <a:p>
+            <a:pPr/>
+            <a:r>
+              <a:t>Usually don’t have CMS</a:t>
+            </a:r>
+          </a:p>
+        </p:txBody>
+      </p:sp>
+      <p:sp>
+        <p:nvSpPr>
+          <p:cNvPr id="181" name="Shape 181"/>
+          <p:cNvSpPr/>
+          <p:nvPr>
+            <p:ph type="sldNum" sz="quarter" idx="4294967295"/>
+          </p:nvPr>
+        </p:nvSpPr>
+        <p:spPr>
+          <a:xfrm>
+            <a:off x="12332920" y="431800"/>
+            <a:ext cx="260599" cy="457200"/>
+          </a:xfrm>
+          <a:prstGeom prst="rect">
+            <a:avLst/>
+          </a:prstGeom>
+          <a:extLst>
+            <a:ext uri="{C572A759-6A51-4108-AA02-DFA0A04FC94B}">
+              <ma14:wrappingTextBoxFlag xmlns:ma14="http://schemas.microsoft.com/office/mac/drawingml/2011/main" val="1"/>
+            </a:ext>
+          </a:extLst>
+        </p:spPr>
+        <p:txBody>
+          <a:bodyPr/>
+          <a:lstStyle/>
+          <a:p>
+            <a:pPr/>
+            <a:fld id="{86CB4B4D-7CA3-9044-876B-883B54F8677D}" type="slidenum"/>
+          </a:p>
+        </p:txBody>
+      </p:sp>
+    </p:spTree>
+  </p:cSld>
+  <p:clrMapOvr>
+    <a:masterClrMapping/>
+  </p:clrMapOvr>
+  <p:transition xmlns:p14="http://schemas.microsoft.com/office/powerpoint/2010/main" spd="med" advClick="1" p14:dur="1000"/>
+</p:sld>
+</file>
+
+<file path=ppt/slides/slide5.xml><?xml version="1.0" encoding="utf-8"?>
+<p:sld xmlns:a="http://schemas.openxmlformats.org/drawingml/2006/main" xmlns:r="http://schemas.openxmlformats.org/officeDocument/2006/relationships" xmlns:p="http://schemas.openxmlformats.org/presentationml/2006/main" showMasterSp="1" showMasterPhAnim="1">
+  <p:cSld>
+    <p:bg>
+      <p:bgPr>
+        <a:solidFill>
+          <a:srgbClr val="EBEBEB"/>
+        </a:solidFill>
+      </p:bgPr>
+    </p:bg>
+    <p:spTree>
+      <p:nvGrpSpPr>
+        <p:cNvPr id="1" name=""/>
+        <p:cNvGrpSpPr/>
+        <p:nvPr/>
+      </p:nvGrpSpPr>
+      <p:grpSpPr>
+        <a:xfrm>
+          <a:off x="0" y="0"/>
+          <a:ext cx="0" cy="0"/>
+          <a:chOff x="0" y="0"/>
+          <a:chExt cx="0" cy="0"/>
+        </a:xfrm>
+      </p:grpSpPr>
+      <p:sp>
+        <p:nvSpPr>
+          <p:cNvPr id="183" name="Shape 183"/>
+          <p:cNvSpPr/>
+          <p:nvPr>
+            <p:ph type="body" idx="13"/>
+          </p:nvPr>
+        </p:nvSpPr>
+        <p:spPr>
+          <a:xfrm>
+            <a:off x="889000" y="2908300"/>
+            <a:ext cx="11226800" cy="4546600"/>
+          </a:xfrm>
+          <a:prstGeom prst="rect">
+            <a:avLst/>
+          </a:prstGeom>
+        </p:spPr>
+        <p:txBody>
+          <a:bodyPr/>
+          <a:lstStyle>
+            <a:lvl1pPr marL="444500" indent="-444500">
+              <a:lnSpc>
+                <a:spcPct val="100000"/>
+              </a:lnSpc>
+              <a:spcBef>
+                <a:spcPts val="2800"/>
+              </a:spcBef>
+              <a:buClr>
+                <a:schemeClr val="accent1"/>
+              </a:buClr>
+              <a:buSzPct val="104999"/>
+              <a:buFont typeface="Avenir Next"/>
+              <a:buChar char="▸"/>
+              <a:defRPr cap="none" i="1" sz="3400">
+                <a:latin typeface="Avenir Next Medium"/>
+                <a:ea typeface="Avenir Next Medium"/>
+                <a:cs typeface="Avenir Next Medium"/>
+                <a:sym typeface="Avenir Next Medium"/>
+              </a:defRPr>
+            </a:lvl1pPr>
+          </a:lstStyle>
+          <a:p>
+            <a:pPr/>
+            <a:r>
+              <a:t>A “Jekyll website” is a “static (plain HTML) website that has been created using Jekyll. Jekyll is software that creates websites. Jekyll isn’t actually “running” the live website; rather, Jekyll is a “static site generator”: it helps you create the static site files, which you then host just as you would any other HTML website.</a:t>
+            </a:r>
+          </a:p>
+        </p:txBody>
+      </p:sp>
+      <p:sp>
+        <p:nvSpPr>
+          <p:cNvPr id="184" name="Shape 184"/>
+          <p:cNvSpPr/>
+          <p:nvPr>
+            <p:ph type="body" idx="14"/>
+          </p:nvPr>
+        </p:nvSpPr>
+        <p:spPr>
+          <a:prstGeom prst="rect">
+            <a:avLst/>
+          </a:prstGeom>
+        </p:spPr>
+        <p:txBody>
+          <a:bodyPr/>
+          <a:lstStyle>
+            <a:lvl1pPr>
+              <a:defRPr u="sng">
+                <a:solidFill>
+                  <a:schemeClr val="accent1"/>
+                </a:solidFill>
+                <a:hlinkClick r:id="rId2" invalidUrl="" action="" tgtFrame="" tooltip="" history="1" highlightClick="0" endSnd="0"/>
+              </a:defRPr>
+            </a:lvl1pPr>
+          </a:lstStyle>
+          <a:p>
+            <a:pPr>
+              <a:defRPr u="none">
+                <a:solidFill>
+                  <a:srgbClr val="838787"/>
+                </a:solidFill>
+              </a:defRPr>
+            </a:pPr>
+            <a:r>
+              <a:rPr u="sng">
+                <a:solidFill>
+                  <a:schemeClr val="accent1"/>
+                </a:solidFill>
+                <a:hlinkClick r:id="rId2" invalidUrl="" action="" tgtFrame="" tooltip="" history="1" highlightClick="0" endSnd="0"/>
+              </a:rPr>
+              <a:t>Programming Historian</a:t>
+            </a:r>
+          </a:p>
+        </p:txBody>
+      </p:sp>
+      <p:sp>
+        <p:nvSpPr>
+          <p:cNvPr id="185" name="Shape 185"/>
+          <p:cNvSpPr/>
+          <p:nvPr>
+            <p:ph type="body" idx="15"/>
+          </p:nvPr>
+        </p:nvSpPr>
+        <p:spPr>
+          <a:prstGeom prst="rect">
+            <a:avLst/>
+          </a:prstGeom>
+        </p:spPr>
+        <p:txBody>
+          <a:bodyPr/>
+          <a:lstStyle/>
+          <a:p>
+            <a:pPr/>
+            <a:r>
+              <a:t>Create a blog with jekyll</a:t>
+            </a:r>
+          </a:p>
+        </p:txBody>
+      </p:sp>
+      <p:sp>
+        <p:nvSpPr>
+          <p:cNvPr id="186" name="Shape 186"/>
+          <p:cNvSpPr/>
+          <p:nvPr>
+            <p:ph type="title" idx="4294967295"/>
+          </p:nvPr>
+        </p:nvSpPr>
+        <p:spPr>
+          <a:prstGeom prst="rect">
+            <a:avLst/>
+          </a:prstGeom>
+        </p:spPr>
+        <p:txBody>
+          <a:bodyPr/>
+          <a:lstStyle>
+            <a:lvl1pPr defTabSz="467359">
+              <a:spcBef>
+                <a:spcPts val="2200"/>
+              </a:spcBef>
+              <a:defRPr sz="4800"/>
+            </a:lvl1pPr>
+          </a:lstStyle>
+          <a:p>
+            <a:pPr/>
+            <a:r>
+              <a:t>What is jekyll?</a:t>
+            </a:r>
+          </a:p>
+        </p:txBody>
+      </p:sp>
+    </p:spTree>
+  </p:cSld>
+  <p:clrMapOvr>
+    <a:masterClrMapping/>
+  </p:clrMapOvr>
+  <p:transition xmlns:p14="http://schemas.microsoft.com/office/powerpoint/2010/main" spd="med" advClick="1" p14:dur="1000"/>
+</p:sld>
+</file>
+
+<file path=ppt/slides/slide6.xml><?xml version="1.0" encoding="utf-8"?>
+<p:sld xmlns:a="http://schemas.openxmlformats.org/drawingml/2006/main" xmlns:r="http://schemas.openxmlformats.org/officeDocument/2006/relationships" xmlns:p="http://schemas.openxmlformats.org/presentationml/2006/main" showMasterSp="1" showMasterPhAnim="1">
+  <p:cSld>
+    <p:bg>
+      <p:bgPr>
+        <a:solidFill>
+          <a:srgbClr val="EBEBEB"/>
+        </a:solidFill>
+      </p:bgPr>
+    </p:bg>
+    <p:spTree>
+      <p:nvGrpSpPr>
+        <p:cNvPr id="1" name=""/>
+        <p:cNvGrpSpPr/>
+        <p:nvPr/>
+      </p:nvGrpSpPr>
+      <p:grpSpPr>
+        <a:xfrm>
+          <a:off x="0" y="0"/>
+          <a:ext cx="0" cy="0"/>
+          <a:chOff x="0" y="0"/>
+          <a:chExt cx="0" cy="0"/>
+        </a:xfrm>
+      </p:grpSpPr>
+      <p:sp>
+        <p:nvSpPr>
+          <p:cNvPr id="188" name="Shape 188"/>
+          <p:cNvSpPr/>
+          <p:nvPr>
+            <p:ph type="body" idx="13"/>
+          </p:nvPr>
+        </p:nvSpPr>
+        <p:spPr>
+          <a:prstGeom prst="rect">
+            <a:avLst/>
+          </a:prstGeom>
+        </p:spPr>
+        <p:txBody>
+          <a:bodyPr/>
+          <a:lstStyle/>
+          <a:p>
+            <a:pPr/>
+            <a:r>
+              <a:t>Create a blog with jekyll</a:t>
+            </a:r>
+          </a:p>
+        </p:txBody>
+      </p:sp>
+      <p:sp>
+        <p:nvSpPr>
+          <p:cNvPr id="189" name="Shape 189"/>
+          <p:cNvSpPr/>
+          <p:nvPr>
+            <p:ph type="title"/>
+          </p:nvPr>
+        </p:nvSpPr>
+        <p:spPr>
+          <a:prstGeom prst="rect">
+            <a:avLst/>
+          </a:prstGeom>
+        </p:spPr>
+        <p:txBody>
+          <a:bodyPr/>
+          <a:lstStyle>
+            <a:lvl1pPr defTabSz="467359">
+              <a:spcBef>
+                <a:spcPts val="2200"/>
+              </a:spcBef>
+              <a:defRPr sz="4800"/>
+            </a:lvl1pPr>
+          </a:lstStyle>
+          <a:p>
+            <a:pPr/>
+            <a:r>
+              <a:t>Websites powered by jekyll</a:t>
+            </a:r>
+          </a:p>
+        </p:txBody>
+      </p:sp>
+      <p:sp>
+        <p:nvSpPr>
+          <p:cNvPr id="190" name="Shape 190"/>
+          <p:cNvSpPr/>
+          <p:nvPr>
+            <p:ph type="body" idx="1"/>
+          </p:nvPr>
+        </p:nvSpPr>
+        <p:spPr>
+          <a:xfrm>
+            <a:off x="406400" y="2791177"/>
+            <a:ext cx="12192000" cy="6108701"/>
+          </a:xfrm>
+          <a:prstGeom prst="rect">
+            <a:avLst/>
+          </a:prstGeom>
+        </p:spPr>
+        <p:txBody>
+          <a:bodyPr/>
+          <a:lstStyle/>
+          <a:p>
+            <a:pPr marL="422275" indent="-422275" defTabSz="554990">
+              <a:spcBef>
+                <a:spcPts val="2600"/>
+              </a:spcBef>
+              <a:defRPr i="1" sz="3230"/>
+            </a:pPr>
+          </a:p>
+          <a:p>
+            <a:pPr marL="422275" indent="-422275" defTabSz="554990">
+              <a:spcBef>
+                <a:spcPts val="2600"/>
+              </a:spcBef>
+              <a:defRPr i="1" sz="3230"/>
+            </a:pPr>
+            <a:r>
+              <a:t>Ruby documentation https://www.ruby-lang.org/en/</a:t>
+            </a:r>
+          </a:p>
+          <a:p>
+            <a:pPr marL="422275" indent="-422275" defTabSz="554990">
+              <a:spcBef>
+                <a:spcPts val="2600"/>
+              </a:spcBef>
+              <a:defRPr i="1" sz="3230"/>
+            </a:pPr>
+            <a:r>
+              <a:t>Bootstrap documentation https://getbootstrap.com/</a:t>
+            </a:r>
+          </a:p>
+          <a:p>
+            <a:pPr marL="422275" indent="-422275" defTabSz="554990">
+              <a:spcBef>
+                <a:spcPts val="2600"/>
+              </a:spcBef>
+              <a:defRPr i="1" sz="3230"/>
+            </a:pPr>
+            <a:r>
+              <a:t>Blog/Personal Website</a:t>
+            </a:r>
+          </a:p>
+          <a:p>
+            <a:pPr marL="422275" indent="-422275" defTabSz="554990">
+              <a:spcBef>
+                <a:spcPts val="2600"/>
+              </a:spcBef>
+              <a:defRPr i="1" sz="3230"/>
+            </a:pPr>
+            <a:r>
+              <a:t>https://zachholman.com</a:t>
+            </a:r>
+          </a:p>
+          <a:p>
+            <a:pPr marL="422275" indent="-422275" defTabSz="554990">
+              <a:spcBef>
+                <a:spcPts val="2600"/>
+              </a:spcBef>
+              <a:defRPr i="1" sz="3230"/>
+            </a:pPr>
+            <a:r>
+              <a:t>www.datalogues.com	</a:t>
+            </a:r>
+          </a:p>
+          <a:p>
+            <a:pPr marL="422275" indent="-422275" defTabSz="554990">
+              <a:spcBef>
+                <a:spcPts val="2600"/>
+              </a:spcBef>
+              <a:defRPr i="1" sz="3230"/>
+            </a:pPr>
+            <a:r>
+              <a:rPr u="sng">
+                <a:solidFill>
+                  <a:schemeClr val="accent1"/>
+                </a:solidFill>
+                <a:hlinkClick r:id="rId2" invalidUrl="" action="" tgtFrame="" tooltip="" history="1" highlightClick="0" endSnd="0"/>
+              </a:rPr>
+              <a:t>https://www.chenhuijing.com/#%F0%9F%8E%AE</a:t>
+            </a:r>
+          </a:p>
+        </p:txBody>
+      </p:sp>
+      <p:sp>
+        <p:nvSpPr>
+          <p:cNvPr id="191" name="Shape 191"/>
+          <p:cNvSpPr/>
+          <p:nvPr>
+            <p:ph type="sldNum" sz="quarter" idx="4294967295"/>
+          </p:nvPr>
+        </p:nvSpPr>
+        <p:spPr>
+          <a:xfrm>
+            <a:off x="12332920" y="431800"/>
+            <a:ext cx="260599" cy="457200"/>
+          </a:xfrm>
+          <a:prstGeom prst="rect">
+            <a:avLst/>
+          </a:prstGeom>
+          <a:extLst>
+            <a:ext uri="{C572A759-6A51-4108-AA02-DFA0A04FC94B}">
+              <ma14:wrappingTextBoxFlag xmlns:ma14="http://schemas.microsoft.com/office/mac/drawingml/2011/main" val="1"/>
+            </a:ext>
+          </a:extLst>
+        </p:spPr>
+        <p:txBody>
+          <a:bodyPr/>
+          <a:lstStyle/>
+          <a:p>
+            <a:pPr/>
+            <a:fld id="{86CB4B4D-7CA3-9044-876B-883B54F8677D}" type="slidenum"/>
+          </a:p>
+        </p:txBody>
+      </p:sp>
+    </p:spTree>
+  </p:cSld>
+  <p:clrMapOvr>
+    <a:masterClrMapping/>
+  </p:clrMapOvr>
+  <p:transition xmlns:p14="http://schemas.microsoft.com/office/powerpoint/2010/main" spd="med" advClick="1" p14:dur="1000"/>
+</p:sld>
+</file>
+
+<file path=ppt/slides/slide7.xml><?xml version="1.0" encoding="utf-8"?>
+<p:sld xmlns:a="http://schemas.openxmlformats.org/drawingml/2006/main" xmlns:r="http://schemas.openxmlformats.org/officeDocument/2006/relationships" xmlns:p="http://schemas.openxmlformats.org/presentationml/2006/main" showMasterSp="1" showMasterPhAnim="1">
+  <p:cSld>
+    <p:bg>
+      <p:bgPr>
+        <a:solidFill>
+          <a:srgbClr val="EBEBEB"/>
+        </a:solidFill>
+      </p:bgPr>
+    </p:bg>
+    <p:spTree>
+      <p:nvGrpSpPr>
+        <p:cNvPr id="1" name=""/>
+        <p:cNvGrpSpPr/>
+        <p:nvPr/>
+      </p:nvGrpSpPr>
+      <p:grpSpPr>
+        <a:xfrm>
+          <a:off x="0" y="0"/>
+          <a:ext cx="0" cy="0"/>
+          <a:chOff x="0" y="0"/>
+          <a:chExt cx="0" cy="0"/>
+        </a:xfrm>
+      </p:grpSpPr>
+      <p:pic>
+        <p:nvPicPr>
+          <p:cNvPr id="193" name="Confused The Simpsons GIF-original.mp4"/>
+          <p:cNvPicPr>
+            <a:picLocks noChangeAspect="0"/>
+          </p:cNvPicPr>
+          <p:nvPr>
+            <a:videoFile r:link="rId3"/>
+            <p:extLst>
+              <p:ext uri="{DAA4B4D4-6D71-4841-9C94-3DE7FCFB9230}">
+                <p14:media xmlns:p14="http://schemas.microsoft.com/office/powerpoint/2010/main" r:embed="rId4"/>
+              </p:ext>
+            </p:extLst>
+          </p:nvPr>
+        </p:nvPicPr>
+        <p:blipFill>
+          <a:blip r:embed="rId5">
+            <a:extLst/>
+          </a:blip>
+          <a:stretch>
+            <a:fillRect/>
+          </a:stretch>
+        </p:blipFill>
+        <p:spPr>
+          <a:xfrm>
+            <a:off x="-31929" y="-34709"/>
+            <a:ext cx="13004801" cy="9753601"/>
+          </a:xfrm>
+          <a:prstGeom prst="rect">
+            <a:avLst/>
+          </a:prstGeom>
+          <a:ln w="12700">
+            <a:miter lim="400000"/>
+          </a:ln>
+        </p:spPr>
+      </p:pic>
+      <p:sp>
+        <p:nvSpPr>
+          <p:cNvPr id="194" name="Shape 194"/>
+          <p:cNvSpPr/>
+          <p:nvPr>
+            <p:ph type="title"/>
+          </p:nvPr>
+        </p:nvSpPr>
+        <p:spPr>
+          <a:prstGeom prst="rect">
+            <a:avLst/>
+          </a:prstGeom>
+        </p:spPr>
+        <p:txBody>
+          <a:bodyPr/>
+          <a:lstStyle>
+            <a:lvl1pPr>
+              <a:defRPr>
+                <a:solidFill>
+                  <a:srgbClr val="FFFFFF"/>
+                </a:solidFill>
+              </a:defRPr>
+            </a:lvl1pPr>
+          </a:lstStyle>
+          <a:p>
+            <a:pPr/>
+            <a:r>
+              <a:t>INSTALLATION FEST</a:t>
+            </a:r>
+          </a:p>
+        </p:txBody>
+      </p:sp>
+    </p:spTree>
+  </p:cSld>
+  <p:clrMapOvr>
+    <a:masterClrMapping/>
+  </p:clrMapOvr>
+  <p:transition xmlns:p14="http://schemas.microsoft.com/office/powerpoint/2010/main" spd="med" advClick="1" p14:dur="1000"/>
+  <p:timing>
+    <p:tnLst>
+      <p:par>
+        <p:cTn id="1" nodeType="tmRoot" restart="never" dur="indefinite" fill="hold">
+          <p:childTnLst>
+            <p:seq concurrent="1" prevAc="none" nextAc="seek">
+              <p:cTn id="2" nodeType="mainSeq" dur="indefinite" fill="hold">
+                <p:childTnLst>
+                  <p:par>
+                    <p:cTn id="3" fill="hold">
+                      <p:stCondLst>
+                        <p:cond delay="indefinite"/>
+                        <p:cond evt="onBegin">
+                          <p:tn val="2"/>
+                        </p:cond>
+                      </p:stCondLst>
+                      <p:childTnLst>
+                        <p:par>
+                          <p:cTn id="4" fill="hold">
+                            <p:stCondLst>
+                              <p:cond delay="0"/>
+                            </p:stCondLst>
+                            <p:childTnLst>
+                              <p:par>
+                                <p:cTn id="5" presetClass="mediacall" nodeType="afterEffect" presetSubtype="0" presetID="1" grpId="1" fill="hold">
+                                  <p:stCondLst>
+                                    <p:cond delay="0"/>
+                                  </p:stCondLst>
+                                  <p:childTnLst>
+                                    <p:cmd type="call" cmd="playFrom(0.0)">
+                                      <p:cBhvr>
+                                        <p:cTn id="6" dur="500000" fill="hold"/>
+                                        <p:tgtEl>
+                                          <p:spTgt spid="193"/>
+                                        </p:tgtEl>
+                                      </p:cBhvr>
+                                    </p:cmd>
+                                  </p:childTnLst>
+                                </p:cTn>
+                              </p:par>
+                            </p:childTnLst>
+                          </p:cTn>
+                        </p:par>
+                      </p:childTnLst>
+                    </p:cTn>
+                  </p:par>
+                </p:childTnLst>
+              </p:cTn>
+              <p:prevCondLst>
+                <p:cond evt="onPrev">
+                  <p:tgtEl>
+                    <p:sldTgt/>
+                  </p:tgtEl>
+                </p:cond>
+              </p:prevCondLst>
+              <p:nextCondLst>
+                <p:cond evt="onNext">
+                  <p:tgtEl>
+                    <p:sldTgt/>
+                  </p:tgtEl>
+                </p:cond>
+              </p:nextCondLst>
+            </p:seq>
+            <p:video fullScrn="0">
+              <p:cMediaNode mute="0" showWhenStopped="1" numSld="1" vol="100000">
+                <p:cTn id="7" fill="hold" display="0">
+                  <p:stCondLst>
+                    <p:cond delay="indefinite"/>
+                  </p:stCondLst>
+                </p:cTn>
+                <p:tgtEl>
+                  <p:spTgt spid="193"/>
                 </p:tgtEl>
               </p:cMediaNode>
             </p:video>
@@ -6190,7 +8040,7 @@
       </p:grpSpPr>
       <p:sp>
         <p:nvSpPr>
-          <p:cNvPr id="194" name="Shape 194"/>
+          <p:cNvPr id="198" name="Shape 198"/>
           <p:cNvSpPr/>
           <p:nvPr>
             <p:ph type="body" idx="13"/>
@@ -6214,7 +8064,7 @@
       </p:sp>
       <p:sp>
         <p:nvSpPr>
-          <p:cNvPr id="195" name="Shape 195"/>
+          <p:cNvPr id="199" name="Shape 199"/>
           <p:cNvSpPr/>
           <p:nvPr>
             <p:ph type="title"/>
@@ -6245,7 +8095,7 @@
       </p:sp>
       <p:sp>
         <p:nvSpPr>
-          <p:cNvPr id="196" name="Shape 196"/>
+          <p:cNvPr id="200" name="Shape 200"/>
           <p:cNvSpPr/>
           <p:nvPr>
             <p:ph type="body" idx="1"/>
@@ -6262,22 +8112,84 @@
         </p:spPr>
         <p:txBody>
           <a:bodyPr/>
-          <a:lstStyle>
-            <a:lvl1pPr>
+          <a:lstStyle/>
+          <a:p>
+            <a:pPr marL="660400" indent="-660400">
+              <a:buClrTx/>
+              <a:buSzPct val="100000"/>
+              <a:buFontTx/>
+              <a:buAutoNum type="arabicPeriod" startAt="1"/>
+            </a:pPr>
+            <a:r>
+              <a:t>Open Command Line</a:t>
+            </a:r>
+          </a:p>
+          <a:p>
+            <a:pPr marL="660400" indent="-660400">
+              <a:buClrTx/>
+              <a:buSzPct val="100000"/>
+              <a:buFontTx/>
+              <a:buAutoNum type="arabicPeriod" startAt="1"/>
+            </a:pPr>
+            <a:r>
+              <a:t>Install git from </a:t>
+            </a:r>
+            <a:r>
+              <a:rPr u="sng">
+                <a:solidFill>
+                  <a:schemeClr val="accent1"/>
+                </a:solidFill>
+                <a:hlinkClick r:id="rId3" invalidUrl="" action="" tgtFrame="" tooltip="" history="1" highlightClick="0" endSnd="0"/>
+              </a:rPr>
+              <a:t>https://git-scm.com/downloads</a:t>
+            </a:r>
+          </a:p>
+          <a:p>
+            <a:pPr marL="660400" indent="-660400">
+              <a:buClrTx/>
+              <a:buSzPct val="100000"/>
+              <a:buFontTx/>
+              <a:buAutoNum type="arabicPeriod" startAt="1"/>
               <a:defRPr i="1"/>
-            </a:lvl1pPr>
-          </a:lstStyle>
-          <a:p>
-            <a:pPr/>
-            <a:r>
-              <a:t>Let’s pair up in groups of 3!</a:t>
-            </a:r>
-          </a:p>
-        </p:txBody>
-      </p:sp>
-      <p:sp>
-        <p:nvSpPr>
-          <p:cNvPr id="197" name="Shape 197"/>
+            </a:pPr>
+            <a:r>
+              <a:rPr i="0"/>
+              <a:t>Confirm installation by running: </a:t>
+            </a:r>
+          </a:p>
+          <a:p>
+            <a:pPr marL="405279" indent="-405279" defTabSz="457200">
+              <a:spcBef>
+                <a:spcPts val="0"/>
+              </a:spcBef>
+              <a:buChar char="‣"/>
+              <a:defRPr sz="2800">
+                <a:solidFill>
+                  <a:srgbClr val="333344"/>
+                </a:solidFill>
+                <a:latin typeface="Monaco"/>
+                <a:ea typeface="Monaco"/>
+                <a:cs typeface="Monaco"/>
+                <a:sym typeface="Monaco"/>
+              </a:defRPr>
+            </a:pPr>
+            <a:r>
+              <a:t>$ git —</a:t>
+            </a:r>
+            <a:r>
+              <a:rPr>
+                <a:solidFill>
+                  <a:srgbClr val="3B5BB5"/>
+                </a:solidFill>
+              </a:rPr>
+              <a:t>version</a:t>
+            </a:r>
+          </a:p>
+        </p:txBody>
+      </p:sp>
+      <p:sp>
+        <p:nvSpPr>
+          <p:cNvPr id="201" name="Shape 201"/>
           <p:cNvSpPr/>
           <p:nvPr>
             <p:ph type="sldNum" sz="quarter" idx="4294967295"/>
@@ -6341,7 +8253,7 @@
       </p:grpSpPr>
       <p:sp>
         <p:nvSpPr>
-          <p:cNvPr id="199" name="Shape 199"/>
+          <p:cNvPr id="205" name="Shape 205"/>
           <p:cNvSpPr/>
           <p:nvPr>
             <p:ph type="body" idx="13"/>
@@ -6365,7 +8277,7 @@
       </p:sp>
       <p:sp>
         <p:nvSpPr>
-          <p:cNvPr id="200" name="Shape 200"/>
+          <p:cNvPr id="206" name="Shape 206"/>
           <p:cNvSpPr/>
           <p:nvPr>
             <p:ph type="title"/>
@@ -6396,7 +8308,7 @@
       </p:sp>
       <p:sp>
         <p:nvSpPr>
-          <p:cNvPr id="201" name="Shape 201"/>
+          <p:cNvPr id="207" name="Shape 207"/>
           <p:cNvSpPr/>
           <p:nvPr>
             <p:ph type="body" idx="1"/>
@@ -6415,59 +8327,120 @@
           <a:bodyPr/>
           <a:lstStyle/>
           <a:p>
-            <a:pPr>
-              <a:defRPr i="1"/>
+            <a:pPr/>
+            <a:r>
+              <a:t>Configure git with </a:t>
+            </a:r>
+            <a:r>
+              <a:rPr>
+                <a:solidFill>
+                  <a:schemeClr val="accent1">
+                    <a:hueOff val="262910"/>
+                    <a:satOff val="3867"/>
+                    <a:lumOff val="-18039"/>
+                  </a:schemeClr>
+                </a:solidFill>
+                <a:latin typeface="Avenir Next Demi Bold"/>
+                <a:ea typeface="Avenir Next Demi Bold"/>
+                <a:cs typeface="Avenir Next Demi Bold"/>
+                <a:sym typeface="Avenir Next Demi Bold"/>
+              </a:rPr>
+              <a:t>your</a:t>
+            </a:r>
+            <a:r>
+              <a:rPr>
+                <a:latin typeface="Avenir Next Demi Bold"/>
+                <a:ea typeface="Avenir Next Demi Bold"/>
+                <a:cs typeface="Avenir Next Demi Bold"/>
+                <a:sym typeface="Avenir Next Demi Bold"/>
+              </a:rPr>
+              <a:t> </a:t>
+            </a:r>
+            <a:r>
+              <a:t>name and e-mail address.</a:t>
+            </a:r>
+          </a:p>
+          <a:p>
+            <a:pPr marL="0" indent="0" defTabSz="457200">
+              <a:spcBef>
+                <a:spcPts val="0"/>
+              </a:spcBef>
+              <a:buClrTx/>
+              <a:buSzTx/>
+              <a:buFontTx/>
+              <a:buNone/>
+              <a:defRPr sz="2800">
+                <a:solidFill>
+                  <a:srgbClr val="8C868F"/>
+                </a:solidFill>
+                <a:latin typeface="Monaco"/>
+                <a:ea typeface="Monaco"/>
+                <a:cs typeface="Monaco"/>
+                <a:sym typeface="Monaco"/>
+              </a:defRPr>
             </a:pPr>
             <a:r>
-              <a:t>Open Command Line</a:t>
-            </a:r>
-          </a:p>
-          <a:p>
-            <a:pPr>
-              <a:defRPr i="1"/>
+              <a:rPr>
+                <a:solidFill>
+                  <a:srgbClr val="333344"/>
+                </a:solidFill>
+              </a:rPr>
+              <a:t>$ git config </a:t>
+            </a:r>
+            <a:r>
+              <a:t>--global user.name "John Doe"</a:t>
+            </a:r>
+            <a:endParaRPr>
+              <a:solidFill>
+                <a:srgbClr val="333344"/>
+              </a:solidFill>
+            </a:endParaRPr>
+          </a:p>
+          <a:p>
+            <a:pPr marL="0" indent="0" defTabSz="457200">
+              <a:spcBef>
+                <a:spcPts val="0"/>
+              </a:spcBef>
+              <a:buClrTx/>
+              <a:buSzTx/>
+              <a:buFontTx/>
+              <a:buNone/>
+              <a:defRPr sz="2800">
+                <a:solidFill>
+                  <a:srgbClr val="8C868F"/>
+                </a:solidFill>
+                <a:latin typeface="Monaco"/>
+                <a:ea typeface="Monaco"/>
+                <a:cs typeface="Monaco"/>
+                <a:sym typeface="Monaco"/>
+              </a:defRPr>
             </a:pPr>
             <a:r>
-              <a:t>Install git from </a:t>
+              <a:rPr>
+                <a:solidFill>
+                  <a:srgbClr val="333344"/>
+                </a:solidFill>
+              </a:rPr>
+              <a:t>$ git config </a:t>
+            </a:r>
+            <a:r>
+              <a:t>--global user.email </a:t>
             </a:r>
             <a:r>
               <a:rPr u="sng">
                 <a:solidFill>
                   <a:schemeClr val="accent1"/>
                 </a:solidFill>
-                <a:hlinkClick r:id="rId2" invalidUrl="" action="" tgtFrame="" tooltip="" history="1" highlightClick="0" endSnd="0"/>
+                <a:hlinkClick r:id="rId3" invalidUrl="" action="" tgtFrame="" tooltip="" history="1" highlightClick="0" endSnd="0"/>
               </a:rPr>
-              <a:t>https://git-scm.com/downloads</a:t>
-            </a:r>
-          </a:p>
-          <a:p>
-            <a:pPr>
-              <a:defRPr i="1"/>
-            </a:pPr>
-            <a:r>
-              <a:t>Confirm installation by running `$ git --version`</a:t>
-            </a:r>
-          </a:p>
-          <a:p>
-            <a:pPr>
-              <a:defRPr i="1"/>
-            </a:pPr>
-            <a:r>
-              <a:t>`$ git config --global user.name "John Doe"</a:t>
-            </a:r>
-          </a:p>
-          <a:p>
-            <a:pPr>
-              <a:defRPr i="1"/>
-            </a:pPr>
-            <a:r>
-              <a:t>$ git config --global user.email johndoe@example.com```</a:t>
-            </a:r>
-          </a:p>
-        </p:txBody>
-      </p:sp>
-      <p:sp>
-        <p:nvSpPr>
-          <p:cNvPr id="202" name="Shape 202"/>
+              <a:t>johndoe@example.com</a:t>
+            </a:r>
+          </a:p>
+        </p:txBody>
+      </p:sp>
+      <p:sp>
+        <p:nvSpPr>
+          <p:cNvPr id="208" name="Shape 208"/>
           <p:cNvSpPr/>
           <p:nvPr>
             <p:ph type="sldNum" sz="quarter" idx="4294967295"/>

</xml_diff>

<commit_message>
added contact info to footer of slides
</commit_message>
<xml_diff>
--- a/codeland2018.pptx
+++ b/codeland2018.pptx
@@ -403,7 +403,7 @@
       </p:grpSpPr>
       <p:sp>
         <p:nvSpPr>
-          <p:cNvPr id="163" name="Shape 163"/>
+          <p:cNvPr id="165" name="Shape 165"/>
           <p:cNvSpPr/>
           <p:nvPr>
             <p:ph type="sldImg"/>
@@ -428,7 +428,7 @@
       </p:sp>
       <p:sp>
         <p:nvSpPr>
-          <p:cNvPr id="164" name="Shape 164"/>
+          <p:cNvPr id="166" name="Shape 166"/>
           <p:cNvSpPr/>
           <p:nvPr>
             <p:ph type="body" sz="quarter" idx="1"/>
@@ -577,7 +577,7 @@
       </p:grpSpPr>
       <p:sp>
         <p:nvSpPr>
-          <p:cNvPr id="193" name="Shape 193"/>
+          <p:cNvPr id="195" name="Shape 195"/>
           <p:cNvSpPr/>
           <p:nvPr>
             <p:ph type="sldImg"/>
@@ -598,7 +598,7 @@
       </p:sp>
       <p:sp>
         <p:nvSpPr>
-          <p:cNvPr id="194" name="Shape 194"/>
+          <p:cNvPr id="196" name="Shape 196"/>
           <p:cNvSpPr/>
           <p:nvPr>
             <p:ph type="body" sz="quarter" idx="1"/>
@@ -656,7 +656,7 @@
       </p:grpSpPr>
       <p:sp>
         <p:nvSpPr>
-          <p:cNvPr id="330" name="Shape 330"/>
+          <p:cNvPr id="332" name="Shape 332"/>
           <p:cNvSpPr/>
           <p:nvPr>
             <p:ph type="sldImg"/>
@@ -677,7 +677,7 @@
       </p:sp>
       <p:sp>
         <p:nvSpPr>
-          <p:cNvPr id="331" name="Shape 331"/>
+          <p:cNvPr id="333" name="Shape 333"/>
           <p:cNvSpPr/>
           <p:nvPr>
             <p:ph type="body" sz="quarter" idx="1"/>
@@ -732,7 +732,7 @@
       </p:grpSpPr>
       <p:sp>
         <p:nvSpPr>
-          <p:cNvPr id="338" name="Shape 338"/>
+          <p:cNvPr id="340" name="Shape 340"/>
           <p:cNvSpPr/>
           <p:nvPr>
             <p:ph type="sldImg"/>
@@ -753,7 +753,7 @@
       </p:sp>
       <p:sp>
         <p:nvSpPr>
-          <p:cNvPr id="339" name="Shape 339"/>
+          <p:cNvPr id="341" name="Shape 341"/>
           <p:cNvSpPr/>
           <p:nvPr>
             <p:ph type="body" sz="quarter" idx="1"/>
@@ -808,7 +808,7 @@
       </p:grpSpPr>
       <p:sp>
         <p:nvSpPr>
-          <p:cNvPr id="346" name="Shape 346"/>
+          <p:cNvPr id="348" name="Shape 348"/>
           <p:cNvSpPr/>
           <p:nvPr>
             <p:ph type="sldImg"/>
@@ -829,7 +829,7 @@
       </p:sp>
       <p:sp>
         <p:nvSpPr>
-          <p:cNvPr id="347" name="Shape 347"/>
+          <p:cNvPr id="349" name="Shape 349"/>
           <p:cNvSpPr/>
           <p:nvPr>
             <p:ph type="body" sz="quarter" idx="1"/>
@@ -884,7 +884,7 @@
       </p:grpSpPr>
       <p:sp>
         <p:nvSpPr>
-          <p:cNvPr id="354" name="Shape 354"/>
+          <p:cNvPr id="356" name="Shape 356"/>
           <p:cNvSpPr/>
           <p:nvPr>
             <p:ph type="sldImg"/>
@@ -905,7 +905,7 @@
       </p:sp>
       <p:sp>
         <p:nvSpPr>
-          <p:cNvPr id="355" name="Shape 355"/>
+          <p:cNvPr id="357" name="Shape 357"/>
           <p:cNvSpPr/>
           <p:nvPr>
             <p:ph type="body" sz="quarter" idx="1"/>
@@ -960,7 +960,7 @@
       </p:grpSpPr>
       <p:sp>
         <p:nvSpPr>
-          <p:cNvPr id="362" name="Shape 362"/>
+          <p:cNvPr id="364" name="Shape 364"/>
           <p:cNvSpPr/>
           <p:nvPr>
             <p:ph type="sldImg"/>
@@ -981,7 +981,7 @@
       </p:sp>
       <p:sp>
         <p:nvSpPr>
-          <p:cNvPr id="363" name="Shape 363"/>
+          <p:cNvPr id="365" name="Shape 365"/>
           <p:cNvSpPr/>
           <p:nvPr>
             <p:ph type="body" sz="quarter" idx="1"/>
@@ -1036,7 +1036,7 @@
       </p:grpSpPr>
       <p:sp>
         <p:nvSpPr>
-          <p:cNvPr id="370" name="Shape 370"/>
+          <p:cNvPr id="372" name="Shape 372"/>
           <p:cNvSpPr/>
           <p:nvPr>
             <p:ph type="sldImg"/>
@@ -1057,7 +1057,7 @@
       </p:sp>
       <p:sp>
         <p:nvSpPr>
-          <p:cNvPr id="371" name="Shape 371"/>
+          <p:cNvPr id="373" name="Shape 373"/>
           <p:cNvSpPr/>
           <p:nvPr>
             <p:ph type="body" sz="quarter" idx="1"/>
@@ -1112,7 +1112,7 @@
       </p:grpSpPr>
       <p:sp>
         <p:nvSpPr>
-          <p:cNvPr id="382" name="Shape 382"/>
+          <p:cNvPr id="384" name="Shape 384"/>
           <p:cNvSpPr/>
           <p:nvPr>
             <p:ph type="sldImg"/>
@@ -1133,7 +1133,7 @@
       </p:sp>
       <p:sp>
         <p:nvSpPr>
-          <p:cNvPr id="383" name="Shape 383"/>
+          <p:cNvPr id="385" name="Shape 385"/>
           <p:cNvSpPr/>
           <p:nvPr>
             <p:ph type="body" sz="quarter" idx="1"/>
@@ -1188,7 +1188,7 @@
       </p:grpSpPr>
       <p:sp>
         <p:nvSpPr>
-          <p:cNvPr id="389" name="Shape 389"/>
+          <p:cNvPr id="391" name="Shape 391"/>
           <p:cNvSpPr/>
           <p:nvPr>
             <p:ph type="sldImg"/>
@@ -1209,7 +1209,7 @@
       </p:sp>
       <p:sp>
         <p:nvSpPr>
-          <p:cNvPr id="390" name="Shape 390"/>
+          <p:cNvPr id="392" name="Shape 392"/>
           <p:cNvSpPr/>
           <p:nvPr>
             <p:ph type="body" sz="quarter" idx="1"/>
@@ -1350,7 +1350,7 @@
       </p:grpSpPr>
       <p:sp>
         <p:nvSpPr>
-          <p:cNvPr id="398" name="Shape 398"/>
+          <p:cNvPr id="400" name="Shape 400"/>
           <p:cNvSpPr/>
           <p:nvPr>
             <p:ph type="sldImg"/>
@@ -1371,7 +1371,7 @@
       </p:sp>
       <p:sp>
         <p:nvSpPr>
-          <p:cNvPr id="399" name="Shape 399"/>
+          <p:cNvPr id="401" name="Shape 401"/>
           <p:cNvSpPr/>
           <p:nvPr>
             <p:ph type="body" sz="quarter" idx="1"/>
@@ -1492,7 +1492,7 @@
       </p:grpSpPr>
       <p:sp>
         <p:nvSpPr>
-          <p:cNvPr id="405" name="Shape 405"/>
+          <p:cNvPr id="407" name="Shape 407"/>
           <p:cNvSpPr/>
           <p:nvPr>
             <p:ph type="sldImg"/>
@@ -1513,7 +1513,7 @@
       </p:sp>
       <p:sp>
         <p:nvSpPr>
-          <p:cNvPr id="406" name="Shape 406"/>
+          <p:cNvPr id="408" name="Shape 408"/>
           <p:cNvSpPr/>
           <p:nvPr>
             <p:ph type="body" sz="quarter" idx="1"/>
@@ -1568,7 +1568,7 @@
       </p:grpSpPr>
       <p:sp>
         <p:nvSpPr>
-          <p:cNvPr id="238" name="Shape 238"/>
+          <p:cNvPr id="240" name="Shape 240"/>
           <p:cNvSpPr/>
           <p:nvPr>
             <p:ph type="sldImg"/>
@@ -1589,7 +1589,7 @@
       </p:sp>
       <p:sp>
         <p:nvSpPr>
-          <p:cNvPr id="239" name="Shape 239"/>
+          <p:cNvPr id="241" name="Shape 241"/>
           <p:cNvSpPr/>
           <p:nvPr>
             <p:ph type="body" sz="quarter" idx="1"/>
@@ -1638,7 +1638,7 @@
       </p:grpSpPr>
       <p:sp>
         <p:nvSpPr>
-          <p:cNvPr id="413" name="Shape 413"/>
+          <p:cNvPr id="415" name="Shape 415"/>
           <p:cNvSpPr/>
           <p:nvPr>
             <p:ph type="sldImg"/>
@@ -1659,7 +1659,7 @@
       </p:sp>
       <p:sp>
         <p:nvSpPr>
-          <p:cNvPr id="414" name="Shape 414"/>
+          <p:cNvPr id="416" name="Shape 416"/>
           <p:cNvSpPr/>
           <p:nvPr>
             <p:ph type="body" sz="quarter" idx="1"/>
@@ -1714,7 +1714,7 @@
       </p:grpSpPr>
       <p:sp>
         <p:nvSpPr>
-          <p:cNvPr id="420" name="Shape 420"/>
+          <p:cNvPr id="422" name="Shape 422"/>
           <p:cNvSpPr/>
           <p:nvPr>
             <p:ph type="sldImg"/>
@@ -1735,7 +1735,7 @@
       </p:sp>
       <p:sp>
         <p:nvSpPr>
-          <p:cNvPr id="421" name="Shape 421"/>
+          <p:cNvPr id="423" name="Shape 423"/>
           <p:cNvSpPr/>
           <p:nvPr>
             <p:ph type="body" sz="quarter" idx="1"/>
@@ -1790,7 +1790,7 @@
       </p:grpSpPr>
       <p:sp>
         <p:nvSpPr>
-          <p:cNvPr id="427" name="Shape 427"/>
+          <p:cNvPr id="429" name="Shape 429"/>
           <p:cNvSpPr/>
           <p:nvPr>
             <p:ph type="sldImg"/>
@@ -1811,7 +1811,7 @@
       </p:sp>
       <p:sp>
         <p:nvSpPr>
-          <p:cNvPr id="428" name="Shape 428"/>
+          <p:cNvPr id="430" name="Shape 430"/>
           <p:cNvSpPr/>
           <p:nvPr>
             <p:ph type="body" sz="quarter" idx="1"/>
@@ -1860,7 +1860,7 @@
       </p:grpSpPr>
       <p:sp>
         <p:nvSpPr>
-          <p:cNvPr id="436" name="Shape 436"/>
+          <p:cNvPr id="438" name="Shape 438"/>
           <p:cNvSpPr/>
           <p:nvPr>
             <p:ph type="sldImg"/>
@@ -1881,7 +1881,7 @@
       </p:sp>
       <p:sp>
         <p:nvSpPr>
-          <p:cNvPr id="437" name="Shape 437"/>
+          <p:cNvPr id="439" name="Shape 439"/>
           <p:cNvSpPr/>
           <p:nvPr>
             <p:ph type="body" sz="quarter" idx="1"/>
@@ -1936,7 +1936,7 @@
       </p:grpSpPr>
       <p:sp>
         <p:nvSpPr>
-          <p:cNvPr id="443" name="Shape 443"/>
+          <p:cNvPr id="445" name="Shape 445"/>
           <p:cNvSpPr/>
           <p:nvPr>
             <p:ph type="sldImg"/>
@@ -1957,7 +1957,7 @@
       </p:sp>
       <p:sp>
         <p:nvSpPr>
-          <p:cNvPr id="444" name="Shape 444"/>
+          <p:cNvPr id="446" name="Shape 446"/>
           <p:cNvSpPr/>
           <p:nvPr>
             <p:ph type="body" sz="quarter" idx="1"/>
@@ -2012,7 +2012,7 @@
       </p:grpSpPr>
       <p:sp>
         <p:nvSpPr>
-          <p:cNvPr id="450" name="Shape 450"/>
+          <p:cNvPr id="452" name="Shape 452"/>
           <p:cNvSpPr/>
           <p:nvPr>
             <p:ph type="sldImg"/>
@@ -2033,7 +2033,7 @@
       </p:sp>
       <p:sp>
         <p:nvSpPr>
-          <p:cNvPr id="451" name="Shape 451"/>
+          <p:cNvPr id="453" name="Shape 453"/>
           <p:cNvSpPr/>
           <p:nvPr>
             <p:ph type="body" sz="quarter" idx="1"/>
@@ -2088,7 +2088,7 @@
       </p:grpSpPr>
       <p:sp>
         <p:nvSpPr>
-          <p:cNvPr id="459" name="Shape 459"/>
+          <p:cNvPr id="461" name="Shape 461"/>
           <p:cNvSpPr/>
           <p:nvPr>
             <p:ph type="sldImg"/>
@@ -2109,7 +2109,7 @@
       </p:sp>
       <p:sp>
         <p:nvSpPr>
-          <p:cNvPr id="460" name="Shape 460"/>
+          <p:cNvPr id="462" name="Shape 462"/>
           <p:cNvSpPr/>
           <p:nvPr>
             <p:ph type="body" sz="quarter" idx="1"/>
@@ -2164,7 +2164,7 @@
       </p:grpSpPr>
       <p:sp>
         <p:nvSpPr>
-          <p:cNvPr id="467" name="Shape 467"/>
+          <p:cNvPr id="469" name="Shape 469"/>
           <p:cNvSpPr/>
           <p:nvPr>
             <p:ph type="sldImg"/>
@@ -2185,7 +2185,7 @@
       </p:sp>
       <p:sp>
         <p:nvSpPr>
-          <p:cNvPr id="468" name="Shape 468"/>
+          <p:cNvPr id="470" name="Shape 470"/>
           <p:cNvSpPr/>
           <p:nvPr>
             <p:ph type="body" sz="quarter" idx="1"/>
@@ -2240,7 +2240,7 @@
       </p:grpSpPr>
       <p:sp>
         <p:nvSpPr>
-          <p:cNvPr id="475" name="Shape 475"/>
+          <p:cNvPr id="478" name="Shape 478"/>
           <p:cNvSpPr/>
           <p:nvPr>
             <p:ph type="sldImg"/>
@@ -2261,7 +2261,7 @@
       </p:sp>
       <p:sp>
         <p:nvSpPr>
-          <p:cNvPr id="476" name="Shape 476"/>
+          <p:cNvPr id="479" name="Shape 479"/>
           <p:cNvSpPr/>
           <p:nvPr>
             <p:ph type="body" sz="quarter" idx="1"/>
@@ -2310,7 +2310,7 @@
       </p:grpSpPr>
       <p:sp>
         <p:nvSpPr>
-          <p:cNvPr id="482" name="Shape 482"/>
+          <p:cNvPr id="485" name="Shape 485"/>
           <p:cNvSpPr/>
           <p:nvPr>
             <p:ph type="sldImg"/>
@@ -2331,7 +2331,7 @@
       </p:sp>
       <p:sp>
         <p:nvSpPr>
-          <p:cNvPr id="483" name="Shape 483"/>
+          <p:cNvPr id="486" name="Shape 486"/>
           <p:cNvSpPr/>
           <p:nvPr>
             <p:ph type="body" sz="quarter" idx="1"/>
@@ -2386,7 +2386,7 @@
       </p:grpSpPr>
       <p:sp>
         <p:nvSpPr>
-          <p:cNvPr id="245" name="Shape 245"/>
+          <p:cNvPr id="247" name="Shape 247"/>
           <p:cNvSpPr/>
           <p:nvPr>
             <p:ph type="sldImg"/>
@@ -2407,7 +2407,7 @@
       </p:sp>
       <p:sp>
         <p:nvSpPr>
-          <p:cNvPr id="246" name="Shape 246"/>
+          <p:cNvPr id="248" name="Shape 248"/>
           <p:cNvSpPr/>
           <p:nvPr>
             <p:ph type="body" sz="quarter" idx="1"/>
@@ -2474,7 +2474,7 @@
       </p:grpSpPr>
       <p:sp>
         <p:nvSpPr>
-          <p:cNvPr id="489" name="Shape 489"/>
+          <p:cNvPr id="492" name="Shape 492"/>
           <p:cNvSpPr/>
           <p:nvPr>
             <p:ph type="sldImg"/>
@@ -2495,7 +2495,7 @@
       </p:sp>
       <p:sp>
         <p:nvSpPr>
-          <p:cNvPr id="490" name="Shape 490"/>
+          <p:cNvPr id="493" name="Shape 493"/>
           <p:cNvSpPr/>
           <p:nvPr>
             <p:ph type="body" sz="quarter" idx="1"/>
@@ -2550,7 +2550,7 @@
       </p:grpSpPr>
       <p:sp>
         <p:nvSpPr>
-          <p:cNvPr id="497" name="Shape 497"/>
+          <p:cNvPr id="500" name="Shape 500"/>
           <p:cNvSpPr/>
           <p:nvPr>
             <p:ph type="sldImg"/>
@@ -2571,7 +2571,7 @@
       </p:sp>
       <p:sp>
         <p:nvSpPr>
-          <p:cNvPr id="498" name="Shape 498"/>
+          <p:cNvPr id="501" name="Shape 501"/>
           <p:cNvSpPr/>
           <p:nvPr>
             <p:ph type="body" sz="quarter" idx="1"/>
@@ -2626,7 +2626,7 @@
       </p:grpSpPr>
       <p:sp>
         <p:nvSpPr>
-          <p:cNvPr id="504" name="Shape 504"/>
+          <p:cNvPr id="507" name="Shape 507"/>
           <p:cNvSpPr/>
           <p:nvPr>
             <p:ph type="sldImg"/>
@@ -2647,7 +2647,7 @@
       </p:sp>
       <p:sp>
         <p:nvSpPr>
-          <p:cNvPr id="505" name="Shape 505"/>
+          <p:cNvPr id="508" name="Shape 508"/>
           <p:cNvSpPr/>
           <p:nvPr>
             <p:ph type="body" sz="quarter" idx="1"/>
@@ -2702,7 +2702,7 @@
       </p:grpSpPr>
       <p:sp>
         <p:nvSpPr>
-          <p:cNvPr id="512" name="Shape 512"/>
+          <p:cNvPr id="515" name="Shape 515"/>
           <p:cNvSpPr/>
           <p:nvPr>
             <p:ph type="sldImg"/>
@@ -2723,7 +2723,7 @@
       </p:sp>
       <p:sp>
         <p:nvSpPr>
-          <p:cNvPr id="513" name="Shape 513"/>
+          <p:cNvPr id="516" name="Shape 516"/>
           <p:cNvSpPr/>
           <p:nvPr>
             <p:ph type="body" sz="quarter" idx="1"/>
@@ -2778,7 +2778,7 @@
       </p:grpSpPr>
       <p:sp>
         <p:nvSpPr>
-          <p:cNvPr id="519" name="Shape 519"/>
+          <p:cNvPr id="522" name="Shape 522"/>
           <p:cNvSpPr/>
           <p:nvPr>
             <p:ph type="sldImg"/>
@@ -2799,7 +2799,7 @@
       </p:sp>
       <p:sp>
         <p:nvSpPr>
-          <p:cNvPr id="520" name="Shape 520"/>
+          <p:cNvPr id="523" name="Shape 523"/>
           <p:cNvSpPr/>
           <p:nvPr>
             <p:ph type="body" sz="quarter" idx="1"/>
@@ -2854,7 +2854,7 @@
       </p:grpSpPr>
       <p:sp>
         <p:nvSpPr>
-          <p:cNvPr id="527" name="Shape 527"/>
+          <p:cNvPr id="530" name="Shape 530"/>
           <p:cNvSpPr/>
           <p:nvPr>
             <p:ph type="sldImg"/>
@@ -2875,7 +2875,7 @@
       </p:sp>
       <p:sp>
         <p:nvSpPr>
-          <p:cNvPr id="528" name="Shape 528"/>
+          <p:cNvPr id="531" name="Shape 531"/>
           <p:cNvSpPr/>
           <p:nvPr>
             <p:ph type="body" sz="quarter" idx="1"/>
@@ -2930,7 +2930,7 @@
       </p:grpSpPr>
       <p:sp>
         <p:nvSpPr>
-          <p:cNvPr id="535" name="Shape 535"/>
+          <p:cNvPr id="538" name="Shape 538"/>
           <p:cNvSpPr/>
           <p:nvPr>
             <p:ph type="sldImg"/>
@@ -2951,7 +2951,7 @@
       </p:sp>
       <p:sp>
         <p:nvSpPr>
-          <p:cNvPr id="536" name="Shape 536"/>
+          <p:cNvPr id="539" name="Shape 539"/>
           <p:cNvSpPr/>
           <p:nvPr>
             <p:ph type="body" sz="quarter" idx="1"/>
@@ -3006,7 +3006,7 @@
       </p:grpSpPr>
       <p:sp>
         <p:nvSpPr>
-          <p:cNvPr id="542" name="Shape 542"/>
+          <p:cNvPr id="545" name="Shape 545"/>
           <p:cNvSpPr/>
           <p:nvPr>
             <p:ph type="sldImg"/>
@@ -3027,7 +3027,7 @@
       </p:sp>
       <p:sp>
         <p:nvSpPr>
-          <p:cNvPr id="543" name="Shape 543"/>
+          <p:cNvPr id="546" name="Shape 546"/>
           <p:cNvSpPr/>
           <p:nvPr>
             <p:ph type="body" sz="quarter" idx="1"/>
@@ -3082,7 +3082,7 @@
       </p:grpSpPr>
       <p:sp>
         <p:nvSpPr>
-          <p:cNvPr id="550" name="Shape 550"/>
+          <p:cNvPr id="553" name="Shape 553"/>
           <p:cNvSpPr/>
           <p:nvPr>
             <p:ph type="sldImg"/>
@@ -3103,7 +3103,7 @@
       </p:sp>
       <p:sp>
         <p:nvSpPr>
-          <p:cNvPr id="551" name="Shape 551"/>
+          <p:cNvPr id="554" name="Shape 554"/>
           <p:cNvSpPr/>
           <p:nvPr>
             <p:ph type="body" sz="quarter" idx="1"/>
@@ -3158,7 +3158,7 @@
       </p:grpSpPr>
       <p:sp>
         <p:nvSpPr>
-          <p:cNvPr id="558" name="Shape 558"/>
+          <p:cNvPr id="561" name="Shape 561"/>
           <p:cNvSpPr/>
           <p:nvPr>
             <p:ph type="sldImg"/>
@@ -3179,7 +3179,7 @@
       </p:sp>
       <p:sp>
         <p:nvSpPr>
-          <p:cNvPr id="559" name="Shape 559"/>
+          <p:cNvPr id="562" name="Shape 562"/>
           <p:cNvSpPr/>
           <p:nvPr>
             <p:ph type="body" sz="quarter" idx="1"/>
@@ -3234,7 +3234,7 @@
       </p:grpSpPr>
       <p:sp>
         <p:nvSpPr>
-          <p:cNvPr id="252" name="Shape 252"/>
+          <p:cNvPr id="254" name="Shape 254"/>
           <p:cNvSpPr/>
           <p:nvPr>
             <p:ph type="sldImg"/>
@@ -3255,7 +3255,7 @@
       </p:sp>
       <p:sp>
         <p:nvSpPr>
-          <p:cNvPr id="253" name="Shape 253"/>
+          <p:cNvPr id="255" name="Shape 255"/>
           <p:cNvSpPr/>
           <p:nvPr>
             <p:ph type="body" sz="quarter" idx="1"/>
@@ -3304,7 +3304,7 @@
       </p:grpSpPr>
       <p:sp>
         <p:nvSpPr>
-          <p:cNvPr id="566" name="Shape 566"/>
+          <p:cNvPr id="569" name="Shape 569"/>
           <p:cNvSpPr/>
           <p:nvPr>
             <p:ph type="sldImg"/>
@@ -3325,7 +3325,7 @@
       </p:sp>
       <p:sp>
         <p:nvSpPr>
-          <p:cNvPr id="567" name="Shape 567"/>
+          <p:cNvPr id="570" name="Shape 570"/>
           <p:cNvSpPr/>
           <p:nvPr>
             <p:ph type="body" sz="quarter" idx="1"/>
@@ -3380,7 +3380,7 @@
       </p:grpSpPr>
       <p:sp>
         <p:nvSpPr>
-          <p:cNvPr id="573" name="Shape 573"/>
+          <p:cNvPr id="576" name="Shape 576"/>
           <p:cNvSpPr/>
           <p:nvPr>
             <p:ph type="sldImg"/>
@@ -3401,7 +3401,7 @@
       </p:sp>
       <p:sp>
         <p:nvSpPr>
-          <p:cNvPr id="574" name="Shape 574"/>
+          <p:cNvPr id="577" name="Shape 577"/>
           <p:cNvSpPr/>
           <p:nvPr>
             <p:ph type="body" sz="quarter" idx="1"/>
@@ -3456,7 +3456,7 @@
       </p:grpSpPr>
       <p:sp>
         <p:nvSpPr>
-          <p:cNvPr id="580" name="Shape 580"/>
+          <p:cNvPr id="583" name="Shape 583"/>
           <p:cNvSpPr/>
           <p:nvPr>
             <p:ph type="sldImg"/>
@@ -3477,7 +3477,7 @@
       </p:sp>
       <p:sp>
         <p:nvSpPr>
-          <p:cNvPr id="581" name="Shape 581"/>
+          <p:cNvPr id="584" name="Shape 584"/>
           <p:cNvSpPr/>
           <p:nvPr>
             <p:ph type="body" sz="quarter" idx="1"/>
@@ -3532,7 +3532,7 @@
       </p:grpSpPr>
       <p:sp>
         <p:nvSpPr>
-          <p:cNvPr id="587" name="Shape 587"/>
+          <p:cNvPr id="590" name="Shape 590"/>
           <p:cNvSpPr/>
           <p:nvPr>
             <p:ph type="sldImg"/>
@@ -3553,7 +3553,7 @@
       </p:sp>
       <p:sp>
         <p:nvSpPr>
-          <p:cNvPr id="588" name="Shape 588"/>
+          <p:cNvPr id="591" name="Shape 591"/>
           <p:cNvSpPr/>
           <p:nvPr>
             <p:ph type="body" sz="quarter" idx="1"/>
@@ -3608,7 +3608,7 @@
       </p:grpSpPr>
       <p:sp>
         <p:nvSpPr>
-          <p:cNvPr id="595" name="Shape 595"/>
+          <p:cNvPr id="598" name="Shape 598"/>
           <p:cNvSpPr/>
           <p:nvPr>
             <p:ph type="sldImg"/>
@@ -3629,7 +3629,7 @@
       </p:sp>
       <p:sp>
         <p:nvSpPr>
-          <p:cNvPr id="596" name="Shape 596"/>
+          <p:cNvPr id="599" name="Shape 599"/>
           <p:cNvSpPr/>
           <p:nvPr>
             <p:ph type="body" sz="quarter" idx="1"/>
@@ -3684,7 +3684,7 @@
       </p:grpSpPr>
       <p:sp>
         <p:nvSpPr>
-          <p:cNvPr id="604" name="Shape 604"/>
+          <p:cNvPr id="607" name="Shape 607"/>
           <p:cNvSpPr/>
           <p:nvPr>
             <p:ph type="sldImg"/>
@@ -3705,7 +3705,7 @@
       </p:sp>
       <p:sp>
         <p:nvSpPr>
-          <p:cNvPr id="605" name="Shape 605"/>
+          <p:cNvPr id="608" name="Shape 608"/>
           <p:cNvSpPr/>
           <p:nvPr>
             <p:ph type="body" sz="quarter" idx="1"/>
@@ -3760,7 +3760,7 @@
       </p:grpSpPr>
       <p:sp>
         <p:nvSpPr>
-          <p:cNvPr id="611" name="Shape 611"/>
+          <p:cNvPr id="614" name="Shape 614"/>
           <p:cNvSpPr/>
           <p:nvPr>
             <p:ph type="sldImg"/>
@@ -3781,7 +3781,7 @@
       </p:sp>
       <p:sp>
         <p:nvSpPr>
-          <p:cNvPr id="612" name="Shape 612"/>
+          <p:cNvPr id="615" name="Shape 615"/>
           <p:cNvSpPr/>
           <p:nvPr>
             <p:ph type="body" sz="quarter" idx="1"/>
@@ -3836,7 +3836,7 @@
       </p:grpSpPr>
       <p:sp>
         <p:nvSpPr>
-          <p:cNvPr id="620" name="Shape 620"/>
+          <p:cNvPr id="623" name="Shape 623"/>
           <p:cNvSpPr/>
           <p:nvPr>
             <p:ph type="sldImg"/>
@@ -3857,7 +3857,7 @@
       </p:sp>
       <p:sp>
         <p:nvSpPr>
-          <p:cNvPr id="621" name="Shape 621"/>
+          <p:cNvPr id="624" name="Shape 624"/>
           <p:cNvSpPr/>
           <p:nvPr>
             <p:ph type="body" sz="quarter" idx="1"/>
@@ -3912,7 +3912,7 @@
       </p:grpSpPr>
       <p:sp>
         <p:nvSpPr>
-          <p:cNvPr id="628" name="Shape 628"/>
+          <p:cNvPr id="631" name="Shape 631"/>
           <p:cNvSpPr/>
           <p:nvPr>
             <p:ph type="sldImg"/>
@@ -3933,7 +3933,7 @@
       </p:sp>
       <p:sp>
         <p:nvSpPr>
-          <p:cNvPr id="629" name="Shape 629"/>
+          <p:cNvPr id="632" name="Shape 632"/>
           <p:cNvSpPr/>
           <p:nvPr>
             <p:ph type="body" sz="quarter" idx="1"/>
@@ -3988,7 +3988,7 @@
       </p:grpSpPr>
       <p:sp>
         <p:nvSpPr>
-          <p:cNvPr id="636" name="Shape 636"/>
+          <p:cNvPr id="639" name="Shape 639"/>
           <p:cNvSpPr/>
           <p:nvPr>
             <p:ph type="sldImg"/>
@@ -4009,7 +4009,7 @@
       </p:sp>
       <p:sp>
         <p:nvSpPr>
-          <p:cNvPr id="637" name="Shape 637"/>
+          <p:cNvPr id="640" name="Shape 640"/>
           <p:cNvSpPr/>
           <p:nvPr>
             <p:ph type="body" sz="quarter" idx="1"/>
@@ -4064,7 +4064,7 @@
       </p:grpSpPr>
       <p:sp>
         <p:nvSpPr>
-          <p:cNvPr id="259" name="Shape 259"/>
+          <p:cNvPr id="261" name="Shape 261"/>
           <p:cNvSpPr/>
           <p:nvPr>
             <p:ph type="sldImg"/>
@@ -4085,7 +4085,7 @@
       </p:sp>
       <p:sp>
         <p:nvSpPr>
-          <p:cNvPr id="260" name="Shape 260"/>
+          <p:cNvPr id="262" name="Shape 262"/>
           <p:cNvSpPr/>
           <p:nvPr>
             <p:ph type="body" sz="quarter" idx="1"/>
@@ -4191,7 +4191,7 @@
       </p:grpSpPr>
       <p:sp>
         <p:nvSpPr>
-          <p:cNvPr id="301" name="Shape 301"/>
+          <p:cNvPr id="303" name="Shape 303"/>
           <p:cNvSpPr/>
           <p:nvPr>
             <p:ph type="sldImg"/>
@@ -4212,7 +4212,7 @@
       </p:sp>
       <p:sp>
         <p:nvSpPr>
-          <p:cNvPr id="302" name="Shape 302"/>
+          <p:cNvPr id="304" name="Shape 304"/>
           <p:cNvSpPr/>
           <p:nvPr>
             <p:ph type="body" sz="quarter" idx="1"/>
@@ -4353,7 +4353,7 @@
       </p:grpSpPr>
       <p:sp>
         <p:nvSpPr>
-          <p:cNvPr id="308" name="Shape 308"/>
+          <p:cNvPr id="310" name="Shape 310"/>
           <p:cNvSpPr/>
           <p:nvPr>
             <p:ph type="sldImg"/>
@@ -4374,7 +4374,7 @@
       </p:sp>
       <p:sp>
         <p:nvSpPr>
-          <p:cNvPr id="309" name="Shape 309"/>
+          <p:cNvPr id="311" name="Shape 311"/>
           <p:cNvSpPr/>
           <p:nvPr>
             <p:ph type="body" sz="quarter" idx="1"/>
@@ -4515,7 +4515,7 @@
       </p:grpSpPr>
       <p:sp>
         <p:nvSpPr>
-          <p:cNvPr id="315" name="Shape 315"/>
+          <p:cNvPr id="317" name="Shape 317"/>
           <p:cNvSpPr/>
           <p:nvPr>
             <p:ph type="sldImg"/>
@@ -4536,7 +4536,7 @@
       </p:sp>
       <p:sp>
         <p:nvSpPr>
-          <p:cNvPr id="316" name="Shape 316"/>
+          <p:cNvPr id="318" name="Shape 318"/>
           <p:cNvSpPr/>
           <p:nvPr>
             <p:ph type="body" sz="quarter" idx="1"/>
@@ -4668,7 +4668,7 @@
       </p:grpSpPr>
       <p:sp>
         <p:nvSpPr>
-          <p:cNvPr id="322" name="Shape 322"/>
+          <p:cNvPr id="324" name="Shape 324"/>
           <p:cNvSpPr/>
           <p:nvPr>
             <p:ph type="sldImg"/>
@@ -4689,7 +4689,7 @@
       </p:sp>
       <p:sp>
         <p:nvSpPr>
-          <p:cNvPr id="323" name="Shape 323"/>
+          <p:cNvPr id="325" name="Shape 325"/>
           <p:cNvSpPr/>
           <p:nvPr>
             <p:ph type="body" sz="quarter" idx="1"/>
@@ -5122,7 +5122,7 @@
       </p:grpSpPr>
       <p:sp>
         <p:nvSpPr>
-          <p:cNvPr id="102" name="Shape 102"/>
+          <p:cNvPr id="104" name="Shape 104"/>
           <p:cNvSpPr/>
           <p:nvPr>
             <p:ph type="body" sz="quarter" idx="13"/>
@@ -5171,7 +5171,7 @@
       </p:sp>
       <p:sp>
         <p:nvSpPr>
-          <p:cNvPr id="103" name="Shape 103"/>
+          <p:cNvPr id="105" name="Shape 105"/>
           <p:cNvSpPr/>
           <p:nvPr>
             <p:ph type="body" idx="1"/>
@@ -5250,7 +5250,7 @@
       </p:sp>
       <p:sp>
         <p:nvSpPr>
-          <p:cNvPr id="104" name="Shape 104"/>
+          <p:cNvPr id="106" name="Shape 106"/>
           <p:cNvSpPr/>
           <p:nvPr>
             <p:ph type="sldNum" sz="quarter" idx="2"/>
@@ -5305,7 +5305,7 @@
       </p:grpSpPr>
       <p:sp>
         <p:nvSpPr>
-          <p:cNvPr id="111" name="Shape 111"/>
+          <p:cNvPr id="113" name="Shape 113"/>
           <p:cNvSpPr/>
           <p:nvPr>
             <p:ph type="pic" sz="half" idx="13"/>
@@ -5332,7 +5332,7 @@
       </p:sp>
       <p:sp>
         <p:nvSpPr>
-          <p:cNvPr id="112" name="Shape 112"/>
+          <p:cNvPr id="114" name="Shape 114"/>
           <p:cNvSpPr/>
           <p:nvPr>
             <p:ph type="pic" sz="half" idx="14"/>
@@ -5359,7 +5359,7 @@
       </p:sp>
       <p:sp>
         <p:nvSpPr>
-          <p:cNvPr id="113" name="Shape 113"/>
+          <p:cNvPr id="115" name="Shape 115"/>
           <p:cNvSpPr/>
           <p:nvPr>
             <p:ph type="pic" idx="15"/>
@@ -5386,7 +5386,7 @@
       </p:sp>
       <p:sp>
         <p:nvSpPr>
-          <p:cNvPr id="114" name="Shape 114"/>
+          <p:cNvPr id="116" name="Shape 116"/>
           <p:cNvSpPr/>
           <p:nvPr>
             <p:ph type="sldNum" sz="quarter" idx="2"/>
@@ -5441,7 +5441,7 @@
       </p:grpSpPr>
       <p:sp>
         <p:nvSpPr>
-          <p:cNvPr id="121" name="Shape 121"/>
+          <p:cNvPr id="123" name="Shape 123"/>
           <p:cNvSpPr/>
           <p:nvPr/>
         </p:nvSpPr>
@@ -5552,7 +5552,7 @@
       </p:sp>
       <p:sp>
         <p:nvSpPr>
-          <p:cNvPr id="122" name="Shape 122"/>
+          <p:cNvPr id="124" name="Shape 124"/>
           <p:cNvSpPr/>
           <p:nvPr>
             <p:ph type="body" sz="quarter" idx="13"/>
@@ -5604,7 +5604,7 @@
       </p:sp>
       <p:sp>
         <p:nvSpPr>
-          <p:cNvPr id="123" name="Shape 123"/>
+          <p:cNvPr id="125" name="Shape 125"/>
           <p:cNvSpPr/>
           <p:nvPr>
             <p:ph type="body" sz="quarter" idx="14"/>
@@ -5653,7 +5653,7 @@
       </p:sp>
       <p:sp>
         <p:nvSpPr>
-          <p:cNvPr id="124" name="Shape 124"/>
+          <p:cNvPr id="126" name="Shape 126"/>
           <p:cNvSpPr/>
           <p:nvPr>
             <p:ph type="body" sz="quarter" idx="15"/>
@@ -5702,7 +5702,7 @@
       </p:sp>
       <p:sp>
         <p:nvSpPr>
-          <p:cNvPr id="125" name="Shape 125"/>
+          <p:cNvPr id="127" name="Shape 127"/>
           <p:cNvSpPr/>
           <p:nvPr>
             <p:ph type="sldNum" sz="quarter" idx="2"/>
@@ -5757,7 +5757,7 @@
       </p:grpSpPr>
       <p:sp>
         <p:nvSpPr>
-          <p:cNvPr id="132" name="Shape 132"/>
+          <p:cNvPr id="134" name="Shape 134"/>
           <p:cNvSpPr/>
           <p:nvPr>
             <p:ph type="body" sz="quarter" idx="13"/>
@@ -5809,7 +5809,7 @@
       </p:sp>
       <p:sp>
         <p:nvSpPr>
-          <p:cNvPr id="133" name="Shape 133"/>
+          <p:cNvPr id="135" name="Shape 135"/>
           <p:cNvSpPr/>
           <p:nvPr>
             <p:ph type="pic" idx="14"/>
@@ -5836,7 +5836,7 @@
       </p:sp>
       <p:sp>
         <p:nvSpPr>
-          <p:cNvPr id="134" name="Shape 134"/>
+          <p:cNvPr id="136" name="Shape 136"/>
           <p:cNvSpPr/>
           <p:nvPr>
             <p:ph type="body" sz="quarter" idx="15"/>
@@ -5885,7 +5885,7 @@
       </p:sp>
       <p:sp>
         <p:nvSpPr>
-          <p:cNvPr id="135" name="Shape 135"/>
+          <p:cNvPr id="137" name="Shape 137"/>
           <p:cNvSpPr/>
           <p:nvPr>
             <p:ph type="sldNum" sz="quarter" idx="2"/>
@@ -5940,7 +5940,7 @@
       </p:grpSpPr>
       <p:sp>
         <p:nvSpPr>
-          <p:cNvPr id="142" name="Shape 142"/>
+          <p:cNvPr id="144" name="Shape 144"/>
           <p:cNvSpPr/>
           <p:nvPr>
             <p:ph type="pic" idx="13"/>
@@ -5967,7 +5967,7 @@
       </p:sp>
       <p:sp>
         <p:nvSpPr>
-          <p:cNvPr id="143" name="Shape 143"/>
+          <p:cNvPr id="145" name="Shape 145"/>
           <p:cNvSpPr/>
           <p:nvPr>
             <p:ph type="sldNum" sz="quarter" idx="2"/>
@@ -6022,7 +6022,7 @@
       </p:grpSpPr>
       <p:sp>
         <p:nvSpPr>
-          <p:cNvPr id="150" name="Shape 150"/>
+          <p:cNvPr id="152" name="Shape 152"/>
           <p:cNvSpPr/>
           <p:nvPr>
             <p:ph type="sldNum" sz="quarter" idx="2"/>
@@ -6070,7 +6070,7 @@
       </p:grpSpPr>
       <p:sp>
         <p:nvSpPr>
-          <p:cNvPr id="157" name="Shape 157"/>
+          <p:cNvPr id="159" name="Shape 159"/>
           <p:cNvSpPr/>
           <p:nvPr>
             <p:ph type="sldNum" sz="quarter" idx="2"/>
@@ -7630,6 +7630,101 @@
         <p:nvSpPr>
           <p:cNvPr id="84" name="Shape 84"/>
           <p:cNvSpPr/>
+          <p:nvPr/>
+        </p:nvSpPr>
+        <p:spPr>
+          <a:xfrm>
+            <a:off x="69137" y="9309100"/>
+            <a:ext cx="12866526" cy="444501"/>
+          </a:xfrm>
+          <a:prstGeom prst="rect">
+            <a:avLst/>
+          </a:prstGeom>
+          <a:ln w="12700">
+            <a:miter lim="400000"/>
+          </a:ln>
+          <a:extLst>
+            <a:ext uri="{C572A759-6A51-4108-AA02-DFA0A04FC94B}">
+              <ma14:wrappingTextBoxFlag xmlns:ma14="http://schemas.microsoft.com/office/mac/drawingml/2011/main" val="1"/>
+            </a:ext>
+          </a:extLst>
+        </p:spPr>
+        <p:txBody>
+          <a:bodyPr lIns="50800" tIns="50800" rIns="50800" bIns="50800" anchor="ctr">
+            <a:spAutoFit/>
+          </a:bodyPr>
+          <a:lstStyle/>
+          <a:p>
+            <a:pPr algn="ctr"/>
+            <a:r>
+              <a:t>Monica Powell •  Codeland 2018                                 </a:t>
+            </a:r>
+            <a:r>
+              <a:rPr u="sng">
+                <a:solidFill>
+                  <a:schemeClr val="accent1"/>
+                </a:solidFill>
+                <a:hlinkClick r:id="rId2" invalidUrl="" action="" tgtFrame="" tooltip="" history="1" highlightClick="0" endSnd="0"/>
+              </a:rPr>
+              <a:t>@waterproofheart</a:t>
+            </a:r>
+            <a:r>
+              <a:t> •  </a:t>
+            </a:r>
+            <a:r>
+              <a:rPr u="sng">
+                <a:solidFill>
+                  <a:schemeClr val="accent1"/>
+                </a:solidFill>
+                <a:hlinkClick r:id="rId3" invalidUrl="" action="" tgtFrame="" tooltip="" history="1" highlightClick="0" endSnd="0"/>
+              </a:rPr>
+              <a:t>www.aboutmonica.com</a:t>
+            </a:r>
+            <a:r>
+              <a:rPr u="sng">
+                <a:solidFill>
+                  <a:schemeClr val="accent1"/>
+                </a:solidFill>
+                <a:hlinkClick r:id="rId3" invalidUrl="" action="" tgtFrame="" tooltip="" history="1" highlightClick="0" endSnd="0"/>
+              </a:rPr>
+              <a:t> </a:t>
+            </a:r>
+          </a:p>
+        </p:txBody>
+      </p:sp>
+      <p:pic>
+        <p:nvPicPr>
+          <p:cNvPr id="85" name="twitter_icon.png"/>
+          <p:cNvPicPr>
+            <a:picLocks noChangeAspect="1"/>
+          </p:cNvPicPr>
+          <p:nvPr/>
+        </p:nvPicPr>
+        <p:blipFill>
+          <a:blip r:embed="rId4">
+            <a:extLst/>
+          </a:blip>
+          <a:stretch>
+            <a:fillRect/>
+          </a:stretch>
+        </p:blipFill>
+        <p:spPr>
+          <a:xfrm>
+            <a:off x="6402387" y="9302750"/>
+            <a:ext cx="457201" cy="457201"/>
+          </a:xfrm>
+          <a:prstGeom prst="rect">
+            <a:avLst/>
+          </a:prstGeom>
+          <a:ln w="12700">
+            <a:miter lim="400000"/>
+          </a:ln>
+        </p:spPr>
+      </p:pic>
+      <p:sp>
+        <p:nvSpPr>
+          <p:cNvPr id="86" name="Shape 86"/>
+          <p:cNvSpPr/>
           <p:nvPr>
             <p:ph type="sldNum" sz="quarter" idx="2"/>
           </p:nvPr>
@@ -7683,7 +7778,7 @@
       </p:grpSpPr>
       <p:sp>
         <p:nvSpPr>
-          <p:cNvPr id="91" name="Shape 91"/>
+          <p:cNvPr id="93" name="Shape 93"/>
           <p:cNvSpPr/>
           <p:nvPr>
             <p:ph type="body" sz="quarter" idx="13"/>
@@ -7732,7 +7827,7 @@
       </p:sp>
       <p:sp>
         <p:nvSpPr>
-          <p:cNvPr id="92" name="Shape 92"/>
+          <p:cNvPr id="94" name="Shape 94"/>
           <p:cNvSpPr/>
           <p:nvPr>
             <p:ph type="pic" sz="half" idx="14"/>
@@ -7759,7 +7854,7 @@
       </p:sp>
       <p:sp>
         <p:nvSpPr>
-          <p:cNvPr id="93" name="Shape 93"/>
+          <p:cNvPr id="95" name="Shape 95"/>
           <p:cNvSpPr/>
           <p:nvPr>
             <p:ph type="title"/>
@@ -7787,7 +7882,7 @@
       </p:sp>
       <p:sp>
         <p:nvSpPr>
-          <p:cNvPr id="94" name="Shape 94"/>
+          <p:cNvPr id="96" name="Shape 96"/>
           <p:cNvSpPr/>
           <p:nvPr>
             <p:ph type="body" sz="half" idx="1"/>
@@ -7875,7 +7970,7 @@
       </p:sp>
       <p:sp>
         <p:nvSpPr>
-          <p:cNvPr id="95" name="Shape 95"/>
+          <p:cNvPr id="97" name="Shape 97"/>
           <p:cNvSpPr/>
           <p:nvPr>
             <p:ph type="sldNum" sz="quarter" idx="2"/>
@@ -8994,7 +9089,7 @@
       </p:grpSpPr>
       <p:pic>
         <p:nvPicPr>
-          <p:cNvPr id="166" name="Writing Working GIF by pamelaespino-original.mp4"/>
+          <p:cNvPr id="168" name="Writing Working GIF by pamelaespino-original.mp4"/>
           <p:cNvPicPr>
             <a:picLocks noChangeAspect="0"/>
           </p:cNvPicPr>
@@ -9030,7 +9125,7 @@
       </p:pic>
       <p:sp>
         <p:nvSpPr>
-          <p:cNvPr id="167" name="Shape 167"/>
+          <p:cNvPr id="169" name="Shape 169"/>
           <p:cNvSpPr/>
           <p:nvPr/>
         </p:nvSpPr>
@@ -9075,7 +9170,7 @@
       </p:sp>
       <p:sp>
         <p:nvSpPr>
-          <p:cNvPr id="168" name="Shape 168"/>
+          <p:cNvPr id="170" name="Shape 170"/>
           <p:cNvSpPr/>
           <p:nvPr>
             <p:ph type="ctrTitle"/>
@@ -9107,7 +9202,7 @@
       </p:sp>
       <p:sp>
         <p:nvSpPr>
-          <p:cNvPr id="169" name="Shape 169"/>
+          <p:cNvPr id="171" name="Shape 171"/>
           <p:cNvSpPr/>
           <p:nvPr>
             <p:ph type="subTitle" sz="quarter" idx="1"/>
@@ -9176,7 +9271,7 @@
                                       <p:cBhvr>
                                         <p:cTn id="6" dur="1919999" fill="hold"/>
                                         <p:tgtEl>
-                                          <p:spTgt spid="166"/>
+                                          <p:spTgt spid="168"/>
                                         </p:tgtEl>
                                       </p:cBhvr>
                                     </p:cmd>
@@ -9214,7 +9309,7 @@
                   </p:stCondLst>
                 </p:cTn>
                 <p:tgtEl>
-                  <p:spTgt spid="166"/>
+                  <p:spTgt spid="168"/>
                 </p:tgtEl>
               </p:cMediaNode>
             </p:video>
@@ -9252,7 +9347,7 @@
       </p:grpSpPr>
       <p:sp>
         <p:nvSpPr>
-          <p:cNvPr id="213" name="Shape 213"/>
+          <p:cNvPr id="215" name="Shape 215"/>
           <p:cNvSpPr/>
           <p:nvPr>
             <p:ph type="body" idx="13"/>
@@ -9276,7 +9371,7 @@
       </p:sp>
       <p:sp>
         <p:nvSpPr>
-          <p:cNvPr id="214" name="Shape 214"/>
+          <p:cNvPr id="216" name="Shape 216"/>
           <p:cNvSpPr/>
           <p:nvPr>
             <p:ph type="title"/>
@@ -9307,7 +9402,7 @@
       </p:sp>
       <p:sp>
         <p:nvSpPr>
-          <p:cNvPr id="215" name="Shape 215"/>
+          <p:cNvPr id="217" name="Shape 217"/>
           <p:cNvSpPr/>
           <p:nvPr>
             <p:ph type="body" idx="1"/>
@@ -9409,7 +9504,7 @@
       </p:sp>
       <p:sp>
         <p:nvSpPr>
-          <p:cNvPr id="216" name="Shape 216"/>
+          <p:cNvPr id="218" name="Shape 218"/>
           <p:cNvSpPr/>
           <p:nvPr>
             <p:ph type="sldNum" sz="quarter" idx="4294967295"/>
@@ -9436,7 +9531,7 @@
       </p:sp>
       <p:pic>
         <p:nvPicPr>
-          <p:cNvPr id="217" name="Screen Shot 2018-04-07 at 2.13.03 PM.png"/>
+          <p:cNvPr id="219" name="Screen Shot 2018-04-07 at 2.13.03 PM.png"/>
           <p:cNvPicPr>
             <a:picLocks noChangeAspect="1"/>
           </p:cNvPicPr>
@@ -9452,8 +9547,8 @@
         </p:blipFill>
         <p:spPr>
           <a:xfrm>
-            <a:off x="503846" y="2447471"/>
-            <a:ext cx="11997108" cy="7252273"/>
+            <a:off x="503846" y="2053905"/>
+            <a:ext cx="11997108" cy="7252272"/>
           </a:xfrm>
           <a:prstGeom prst="rect">
             <a:avLst/>
@@ -9498,7 +9593,7 @@
       </p:grpSpPr>
       <p:sp>
         <p:nvSpPr>
-          <p:cNvPr id="219" name="Shape 219"/>
+          <p:cNvPr id="221" name="Shape 221"/>
           <p:cNvSpPr/>
           <p:nvPr>
             <p:ph type="body" idx="13"/>
@@ -9522,7 +9617,7 @@
       </p:sp>
       <p:sp>
         <p:nvSpPr>
-          <p:cNvPr id="220" name="Shape 220"/>
+          <p:cNvPr id="222" name="Shape 222"/>
           <p:cNvSpPr/>
           <p:nvPr>
             <p:ph type="title"/>
@@ -9553,7 +9648,7 @@
       </p:sp>
       <p:sp>
         <p:nvSpPr>
-          <p:cNvPr id="221" name="Shape 221"/>
+          <p:cNvPr id="223" name="Shape 223"/>
           <p:cNvSpPr/>
           <p:nvPr>
             <p:ph type="body" idx="1"/>
@@ -9655,7 +9750,7 @@
       </p:sp>
       <p:sp>
         <p:nvSpPr>
-          <p:cNvPr id="222" name="Shape 222"/>
+          <p:cNvPr id="224" name="Shape 224"/>
           <p:cNvSpPr/>
           <p:nvPr>
             <p:ph type="sldNum" sz="quarter" idx="4294967295"/>
@@ -9682,7 +9777,7 @@
       </p:sp>
       <p:pic>
         <p:nvPicPr>
-          <p:cNvPr id="223" name="Screen Shot 2018-04-07 at 2.13.12 PM.png"/>
+          <p:cNvPr id="225" name="Screen Shot 2018-04-07 at 2.13.12 PM.png"/>
           <p:cNvPicPr>
             <a:picLocks noChangeAspect="1"/>
           </p:cNvPicPr>
@@ -9698,7 +9793,7 @@
         </p:blipFill>
         <p:spPr>
           <a:xfrm>
-            <a:off x="491639" y="2485206"/>
+            <a:off x="406399" y="2274636"/>
             <a:ext cx="11176001" cy="7058528"/>
           </a:xfrm>
           <a:prstGeom prst="rect">
@@ -9744,7 +9839,7 @@
       </p:grpSpPr>
       <p:sp>
         <p:nvSpPr>
-          <p:cNvPr id="225" name="Shape 225"/>
+          <p:cNvPr id="227" name="Shape 227"/>
           <p:cNvSpPr/>
           <p:nvPr>
             <p:ph type="body" idx="13"/>
@@ -9768,7 +9863,7 @@
       </p:sp>
       <p:sp>
         <p:nvSpPr>
-          <p:cNvPr id="226" name="Shape 226"/>
+          <p:cNvPr id="228" name="Shape 228"/>
           <p:cNvSpPr/>
           <p:nvPr>
             <p:ph type="title"/>
@@ -9799,7 +9894,7 @@
       </p:sp>
       <p:sp>
         <p:nvSpPr>
-          <p:cNvPr id="227" name="Shape 227"/>
+          <p:cNvPr id="229" name="Shape 229"/>
           <p:cNvSpPr/>
           <p:nvPr>
             <p:ph type="body" idx="1"/>
@@ -9901,7 +9996,7 @@
       </p:sp>
       <p:sp>
         <p:nvSpPr>
-          <p:cNvPr id="228" name="Shape 228"/>
+          <p:cNvPr id="230" name="Shape 230"/>
           <p:cNvSpPr/>
           <p:nvPr>
             <p:ph type="sldNum" sz="quarter" idx="4294967295"/>
@@ -9928,7 +10023,7 @@
       </p:sp>
       <p:pic>
         <p:nvPicPr>
-          <p:cNvPr id="229" name="Screen Shot 2018-04-07 at 2.13.19 PM.png"/>
+          <p:cNvPr id="231" name="Screen Shot 2018-04-07 at 2.13.19 PM.png"/>
           <p:cNvPicPr>
             <a:picLocks noChangeAspect="1"/>
           </p:cNvPicPr>
@@ -9944,7 +10039,7 @@
         </p:blipFill>
         <p:spPr>
           <a:xfrm>
-            <a:off x="444205" y="2354998"/>
+            <a:off x="444205" y="2126398"/>
             <a:ext cx="11570774" cy="7188257"/>
           </a:xfrm>
           <a:prstGeom prst="rect">
@@ -9990,7 +10085,7 @@
       </p:grpSpPr>
       <p:sp>
         <p:nvSpPr>
-          <p:cNvPr id="231" name="Shape 231"/>
+          <p:cNvPr id="233" name="Shape 233"/>
           <p:cNvSpPr/>
           <p:nvPr>
             <p:ph type="body" idx="13"/>
@@ -10014,7 +10109,7 @@
       </p:sp>
       <p:sp>
         <p:nvSpPr>
-          <p:cNvPr id="232" name="Shape 232"/>
+          <p:cNvPr id="234" name="Shape 234"/>
           <p:cNvSpPr/>
           <p:nvPr>
             <p:ph type="title"/>
@@ -10045,7 +10140,7 @@
       </p:sp>
       <p:sp>
         <p:nvSpPr>
-          <p:cNvPr id="233" name="Shape 233"/>
+          <p:cNvPr id="235" name="Shape 235"/>
           <p:cNvSpPr/>
           <p:nvPr>
             <p:ph type="body" idx="1"/>
@@ -10183,7 +10278,7 @@
       </p:sp>
       <p:sp>
         <p:nvSpPr>
-          <p:cNvPr id="234" name="Shape 234"/>
+          <p:cNvPr id="236" name="Shape 236"/>
           <p:cNvSpPr/>
           <p:nvPr>
             <p:ph type="sldNum" sz="quarter" idx="4294967295"/>
@@ -10243,7 +10338,7 @@
       </p:grpSpPr>
       <p:pic>
         <p:nvPicPr>
-          <p:cNvPr id="236" name="Confused The Simpsons GIF-original.mp4"/>
+          <p:cNvPr id="238" name="Confused The Simpsons GIF-original.mp4"/>
           <p:cNvPicPr>
             <a:picLocks noChangeAspect="0"/>
           </p:cNvPicPr>
@@ -10279,7 +10374,7 @@
       </p:pic>
       <p:sp>
         <p:nvSpPr>
-          <p:cNvPr id="237" name="Shape 237"/>
+          <p:cNvPr id="239" name="Shape 239"/>
           <p:cNvSpPr/>
           <p:nvPr>
             <p:ph type="title"/>
@@ -10348,7 +10443,7 @@
                                       <p:cBhvr>
                                         <p:cTn id="6" dur="500000" fill="hold"/>
                                         <p:tgtEl>
-                                          <p:spTgt spid="236"/>
+                                          <p:spTgt spid="238"/>
                                         </p:tgtEl>
                                       </p:cBhvr>
                                     </p:cmd>
@@ -10386,7 +10481,7 @@
                   </p:stCondLst>
                 </p:cTn>
                 <p:tgtEl>
-                  <p:spTgt spid="236"/>
+                  <p:spTgt spid="238"/>
                 </p:tgtEl>
               </p:cMediaNode>
             </p:video>
@@ -10424,7 +10519,7 @@
       </p:grpSpPr>
       <p:sp>
         <p:nvSpPr>
-          <p:cNvPr id="241" name="Shape 241"/>
+          <p:cNvPr id="243" name="Shape 243"/>
           <p:cNvSpPr/>
           <p:nvPr>
             <p:ph type="body" idx="13"/>
@@ -10448,7 +10543,7 @@
       </p:sp>
       <p:sp>
         <p:nvSpPr>
-          <p:cNvPr id="242" name="Shape 242"/>
+          <p:cNvPr id="244" name="Shape 244"/>
           <p:cNvSpPr/>
           <p:nvPr>
             <p:ph type="title"/>
@@ -10479,7 +10574,7 @@
       </p:sp>
       <p:sp>
         <p:nvSpPr>
-          <p:cNvPr id="243" name="Shape 243"/>
+          <p:cNvPr id="245" name="Shape 245"/>
           <p:cNvSpPr/>
           <p:nvPr>
             <p:ph type="body" idx="1"/>
@@ -10573,7 +10668,7 @@
       </p:sp>
       <p:sp>
         <p:nvSpPr>
-          <p:cNvPr id="244" name="Shape 244"/>
+          <p:cNvPr id="246" name="Shape 246"/>
           <p:cNvSpPr/>
           <p:nvPr>
             <p:ph type="sldNum" sz="quarter" idx="4294967295"/>
@@ -10633,7 +10728,7 @@
       </p:grpSpPr>
       <p:sp>
         <p:nvSpPr>
-          <p:cNvPr id="248" name="Shape 248"/>
+          <p:cNvPr id="250" name="Shape 250"/>
           <p:cNvSpPr/>
           <p:nvPr>
             <p:ph type="body" idx="13"/>
@@ -10657,7 +10752,7 @@
       </p:sp>
       <p:sp>
         <p:nvSpPr>
-          <p:cNvPr id="249" name="Shape 249"/>
+          <p:cNvPr id="251" name="Shape 251"/>
           <p:cNvSpPr/>
           <p:nvPr>
             <p:ph type="title"/>
@@ -10688,7 +10783,7 @@
       </p:sp>
       <p:sp>
         <p:nvSpPr>
-          <p:cNvPr id="250" name="Shape 250"/>
+          <p:cNvPr id="252" name="Shape 252"/>
           <p:cNvSpPr/>
           <p:nvPr>
             <p:ph type="body" idx="1"/>
@@ -10903,7 +10998,7 @@
       </p:sp>
       <p:sp>
         <p:nvSpPr>
-          <p:cNvPr id="251" name="Shape 251"/>
+          <p:cNvPr id="253" name="Shape 253"/>
           <p:cNvSpPr/>
           <p:nvPr>
             <p:ph type="sldNum" sz="quarter" idx="4294967295"/>
@@ -10963,7 +11058,7 @@
       </p:grpSpPr>
       <p:sp>
         <p:nvSpPr>
-          <p:cNvPr id="255" name="Shape 255"/>
+          <p:cNvPr id="257" name="Shape 257"/>
           <p:cNvSpPr/>
           <p:nvPr>
             <p:ph type="body" idx="13"/>
@@ -10987,7 +11082,7 @@
       </p:sp>
       <p:sp>
         <p:nvSpPr>
-          <p:cNvPr id="256" name="Shape 256"/>
+          <p:cNvPr id="258" name="Shape 258"/>
           <p:cNvSpPr/>
           <p:nvPr>
             <p:ph type="title"/>
@@ -11018,7 +11113,7 @@
       </p:sp>
       <p:sp>
         <p:nvSpPr>
-          <p:cNvPr id="257" name="Shape 257"/>
+          <p:cNvPr id="259" name="Shape 259"/>
           <p:cNvSpPr/>
           <p:nvPr>
             <p:ph type="body" idx="1"/>
@@ -11170,7 +11265,7 @@
       </p:sp>
       <p:sp>
         <p:nvSpPr>
-          <p:cNvPr id="258" name="Shape 258"/>
+          <p:cNvPr id="260" name="Shape 260"/>
           <p:cNvSpPr/>
           <p:nvPr>
             <p:ph type="sldNum" sz="quarter" idx="4294967295"/>
@@ -11230,7 +11325,7 @@
       </p:grpSpPr>
       <p:sp>
         <p:nvSpPr>
-          <p:cNvPr id="262" name="Shape 262"/>
+          <p:cNvPr id="264" name="Shape 264"/>
           <p:cNvSpPr/>
           <p:nvPr>
             <p:ph type="body" idx="13"/>
@@ -11254,7 +11349,7 @@
       </p:sp>
       <p:sp>
         <p:nvSpPr>
-          <p:cNvPr id="263" name="Shape 263"/>
+          <p:cNvPr id="265" name="Shape 265"/>
           <p:cNvSpPr/>
           <p:nvPr>
             <p:ph type="title"/>
@@ -11285,7 +11380,7 @@
       </p:sp>
       <p:sp>
         <p:nvSpPr>
-          <p:cNvPr id="264" name="Shape 264"/>
+          <p:cNvPr id="266" name="Shape 266"/>
           <p:cNvSpPr/>
           <p:nvPr>
             <p:ph type="body" idx="1"/>
@@ -11361,7 +11456,7 @@
       </p:sp>
       <p:sp>
         <p:nvSpPr>
-          <p:cNvPr id="265" name="Shape 265"/>
+          <p:cNvPr id="267" name="Shape 267"/>
           <p:cNvSpPr/>
           <p:nvPr>
             <p:ph type="sldNum" sz="quarter" idx="4294967295"/>
@@ -11421,7 +11516,7 @@
       </p:grpSpPr>
       <p:sp>
         <p:nvSpPr>
-          <p:cNvPr id="267" name="Shape 267"/>
+          <p:cNvPr id="269" name="Shape 269"/>
           <p:cNvSpPr/>
           <p:nvPr>
             <p:ph type="body" idx="13"/>
@@ -11445,7 +11540,7 @@
       </p:sp>
       <p:sp>
         <p:nvSpPr>
-          <p:cNvPr id="268" name="Shape 268"/>
+          <p:cNvPr id="270" name="Shape 270"/>
           <p:cNvSpPr/>
           <p:nvPr>
             <p:ph type="title"/>
@@ -11476,7 +11571,7 @@
       </p:sp>
       <p:sp>
         <p:nvSpPr>
-          <p:cNvPr id="269" name="Shape 269"/>
+          <p:cNvPr id="271" name="Shape 271"/>
           <p:cNvSpPr/>
           <p:nvPr>
             <p:ph type="body" idx="1"/>
@@ -11556,7 +11651,7 @@
       </p:sp>
       <p:sp>
         <p:nvSpPr>
-          <p:cNvPr id="270" name="Shape 270"/>
+          <p:cNvPr id="272" name="Shape 272"/>
           <p:cNvSpPr/>
           <p:nvPr>
             <p:ph type="sldNum" sz="quarter" idx="4294967295"/>
@@ -11583,7 +11678,7 @@
       </p:sp>
       <p:pic>
         <p:nvPicPr>
-          <p:cNvPr id="271" name="github-screenshot.png"/>
+          <p:cNvPr id="273" name="github-screenshot.png"/>
           <p:cNvPicPr>
             <a:picLocks noChangeAspect="1"/>
           </p:cNvPicPr>
@@ -11612,7 +11707,7 @@
       </p:pic>
       <p:sp>
         <p:nvSpPr>
-          <p:cNvPr id="272" name="Shape 272"/>
+          <p:cNvPr id="274" name="Shape 274"/>
           <p:cNvSpPr/>
           <p:nvPr/>
         </p:nvSpPr>
@@ -11654,7 +11749,7 @@
       </p:sp>
       <p:sp>
         <p:nvSpPr>
-          <p:cNvPr id="273" name="Shape 273"/>
+          <p:cNvPr id="275" name="Shape 275"/>
           <p:cNvSpPr/>
           <p:nvPr/>
         </p:nvSpPr>
@@ -11696,7 +11791,7 @@
       </p:sp>
       <p:sp>
         <p:nvSpPr>
-          <p:cNvPr id="274" name="Shape 274"/>
+          <p:cNvPr id="276" name="Shape 276"/>
           <p:cNvSpPr/>
           <p:nvPr/>
         </p:nvSpPr>
@@ -11847,7 +11942,7 @@
       </p:sp>
       <p:sp>
         <p:nvSpPr>
-          <p:cNvPr id="275" name="Shape 275"/>
+          <p:cNvPr id="277" name="Shape 277"/>
           <p:cNvSpPr/>
           <p:nvPr/>
         </p:nvSpPr>
@@ -12018,7 +12113,7 @@
       </p:grpSpPr>
       <p:sp>
         <p:nvSpPr>
-          <p:cNvPr id="171" name="Shape 171"/>
+          <p:cNvPr id="173" name="Shape 173"/>
           <p:cNvSpPr/>
           <p:nvPr>
             <p:ph type="body" idx="13"/>
@@ -12042,7 +12137,7 @@
       </p:sp>
       <p:sp>
         <p:nvSpPr>
-          <p:cNvPr id="172" name="Shape 172"/>
+          <p:cNvPr id="174" name="Shape 174"/>
           <p:cNvSpPr/>
           <p:nvPr>
             <p:ph type="title"/>
@@ -12073,7 +12168,7 @@
       </p:sp>
       <p:sp>
         <p:nvSpPr>
-          <p:cNvPr id="173" name="Shape 173"/>
+          <p:cNvPr id="175" name="Shape 175"/>
           <p:cNvSpPr/>
           <p:nvPr>
             <p:ph type="body" idx="1"/>
@@ -12205,7 +12300,7 @@
       </p:sp>
       <p:sp>
         <p:nvSpPr>
-          <p:cNvPr id="174" name="Shape 174"/>
+          <p:cNvPr id="176" name="Shape 176"/>
           <p:cNvSpPr/>
           <p:nvPr>
             <p:ph type="sldNum" sz="quarter" idx="4294967295"/>
@@ -12236,7 +12331,7 @@
       </p:sp>
       <p:sp>
         <p:nvSpPr>
-          <p:cNvPr id="175" name="Shape 175"/>
+          <p:cNvPr id="177" name="Shape 177"/>
           <p:cNvSpPr/>
           <p:nvPr/>
         </p:nvSpPr>
@@ -12305,7 +12400,7 @@
       </p:grpSpPr>
       <p:sp>
         <p:nvSpPr>
-          <p:cNvPr id="277" name="Shape 277"/>
+          <p:cNvPr id="279" name="Shape 279"/>
           <p:cNvSpPr/>
           <p:nvPr>
             <p:ph type="body" idx="13"/>
@@ -12329,7 +12424,7 @@
       </p:sp>
       <p:sp>
         <p:nvSpPr>
-          <p:cNvPr id="278" name="Shape 278"/>
+          <p:cNvPr id="280" name="Shape 280"/>
           <p:cNvSpPr/>
           <p:nvPr>
             <p:ph type="title"/>
@@ -12360,7 +12455,7 @@
       </p:sp>
       <p:sp>
         <p:nvSpPr>
-          <p:cNvPr id="279" name="Shape 279"/>
+          <p:cNvPr id="281" name="Shape 281"/>
           <p:cNvSpPr/>
           <p:nvPr>
             <p:ph type="body" idx="1"/>
@@ -12436,7 +12531,7 @@
       </p:sp>
       <p:sp>
         <p:nvSpPr>
-          <p:cNvPr id="280" name="Shape 280"/>
+          <p:cNvPr id="282" name="Shape 282"/>
           <p:cNvSpPr/>
           <p:nvPr>
             <p:ph type="sldNum" sz="quarter" idx="4294967295"/>
@@ -12496,7 +12591,7 @@
       </p:grpSpPr>
       <p:sp>
         <p:nvSpPr>
-          <p:cNvPr id="282" name="Shape 282"/>
+          <p:cNvPr id="284" name="Shape 284"/>
           <p:cNvSpPr/>
           <p:nvPr>
             <p:ph type="body" idx="13"/>
@@ -12520,7 +12615,7 @@
       </p:sp>
       <p:sp>
         <p:nvSpPr>
-          <p:cNvPr id="283" name="Shape 283"/>
+          <p:cNvPr id="285" name="Shape 285"/>
           <p:cNvSpPr/>
           <p:nvPr>
             <p:ph type="title"/>
@@ -12551,7 +12646,7 @@
       </p:sp>
       <p:sp>
         <p:nvSpPr>
-          <p:cNvPr id="284" name="Shape 284"/>
+          <p:cNvPr id="286" name="Shape 286"/>
           <p:cNvSpPr/>
           <p:nvPr>
             <p:ph type="body" idx="1"/>
@@ -12648,7 +12743,7 @@
       </p:sp>
       <p:sp>
         <p:nvSpPr>
-          <p:cNvPr id="285" name="Shape 285"/>
+          <p:cNvPr id="287" name="Shape 287"/>
           <p:cNvSpPr/>
           <p:nvPr>
             <p:ph type="sldNum" sz="quarter" idx="4294967295"/>
@@ -12675,7 +12770,7 @@
       </p:sp>
       <p:pic>
         <p:nvPicPr>
-          <p:cNvPr id="286" name="jekyll-serve.png"/>
+          <p:cNvPr id="288" name="jekyll-serve.png"/>
           <p:cNvPicPr>
             <a:picLocks noChangeAspect="1"/>
           </p:cNvPicPr>
@@ -12738,7 +12833,7 @@
       </p:grpSpPr>
       <p:sp>
         <p:nvSpPr>
-          <p:cNvPr id="288" name="Shape 288"/>
+          <p:cNvPr id="290" name="Shape 290"/>
           <p:cNvSpPr/>
           <p:nvPr>
             <p:ph type="body" idx="13"/>
@@ -12762,7 +12857,7 @@
       </p:sp>
       <p:sp>
         <p:nvSpPr>
-          <p:cNvPr id="289" name="Shape 289"/>
+          <p:cNvPr id="291" name="Shape 291"/>
           <p:cNvSpPr/>
           <p:nvPr>
             <p:ph type="title"/>
@@ -12793,7 +12888,7 @@
       </p:sp>
       <p:sp>
         <p:nvSpPr>
-          <p:cNvPr id="290" name="Shape 290"/>
+          <p:cNvPr id="292" name="Shape 292"/>
           <p:cNvSpPr/>
           <p:nvPr>
             <p:ph type="body" idx="1"/>
@@ -12876,7 +12971,7 @@
       </p:sp>
       <p:sp>
         <p:nvSpPr>
-          <p:cNvPr id="291" name="Shape 291"/>
+          <p:cNvPr id="293" name="Shape 293"/>
           <p:cNvSpPr/>
           <p:nvPr>
             <p:ph type="sldNum" sz="quarter" idx="4294967295"/>
@@ -12903,7 +12998,7 @@
       </p:sp>
       <p:pic>
         <p:nvPicPr>
-          <p:cNvPr id="292" name="Screen Shot 2018-04-07 at 3.10.44 PM.png"/>
+          <p:cNvPr id="294" name="Screen Shot 2018-04-07 at 3.10.44 PM.png"/>
           <p:cNvPicPr>
             <a:picLocks noChangeAspect="1"/>
           </p:cNvPicPr>
@@ -12920,7 +13015,7 @@
         <p:spPr>
           <a:xfrm>
             <a:off x="2765439" y="3809681"/>
-            <a:ext cx="7789439" cy="5905483"/>
+            <a:ext cx="7222131" cy="5475384"/>
           </a:xfrm>
           <a:prstGeom prst="rect">
             <a:avLst/>
@@ -12965,7 +13060,7 @@
       </p:grpSpPr>
       <p:pic>
         <p:nvPicPr>
-          <p:cNvPr id="294" name="Confused The Simpsons GIF-original.mp4"/>
+          <p:cNvPr id="296" name="Confused The Simpsons GIF-original.mp4"/>
           <p:cNvPicPr>
             <a:picLocks noChangeAspect="0"/>
           </p:cNvPicPr>
@@ -13001,7 +13096,7 @@
       </p:pic>
       <p:sp>
         <p:nvSpPr>
-          <p:cNvPr id="295" name="Shape 295"/>
+          <p:cNvPr id="297" name="Shape 297"/>
           <p:cNvSpPr/>
           <p:nvPr>
             <p:ph type="title"/>
@@ -13070,7 +13165,7 @@
                                       <p:cBhvr>
                                         <p:cTn id="6" dur="500000" fill="hold"/>
                                         <p:tgtEl>
-                                          <p:spTgt spid="294"/>
+                                          <p:spTgt spid="296"/>
                                         </p:tgtEl>
                                       </p:cBhvr>
                                     </p:cmd>
@@ -13108,7 +13203,7 @@
                   </p:stCondLst>
                 </p:cTn>
                 <p:tgtEl>
-                  <p:spTgt spid="294"/>
+                  <p:spTgt spid="296"/>
                 </p:tgtEl>
               </p:cMediaNode>
             </p:video>
@@ -13146,7 +13241,7 @@
       </p:grpSpPr>
       <p:sp>
         <p:nvSpPr>
-          <p:cNvPr id="297" name="Shape 297"/>
+          <p:cNvPr id="299" name="Shape 299"/>
           <p:cNvSpPr/>
           <p:nvPr>
             <p:ph type="body" idx="13"/>
@@ -13170,7 +13265,7 @@
       </p:sp>
       <p:sp>
         <p:nvSpPr>
-          <p:cNvPr id="298" name="Shape 298"/>
+          <p:cNvPr id="300" name="Shape 300"/>
           <p:cNvSpPr/>
           <p:nvPr>
             <p:ph type="title"/>
@@ -13201,7 +13296,7 @@
       </p:sp>
       <p:sp>
         <p:nvSpPr>
-          <p:cNvPr id="299" name="Shape 299"/>
+          <p:cNvPr id="301" name="Shape 301"/>
           <p:cNvSpPr/>
           <p:nvPr>
             <p:ph type="body" idx="1"/>
@@ -13244,7 +13339,7 @@
       </p:sp>
       <p:sp>
         <p:nvSpPr>
-          <p:cNvPr id="300" name="Shape 300"/>
+          <p:cNvPr id="302" name="Shape 302"/>
           <p:cNvSpPr/>
           <p:nvPr>
             <p:ph type="sldNum" sz="quarter" idx="4294967295"/>
@@ -13304,7 +13399,7 @@
       </p:grpSpPr>
       <p:sp>
         <p:nvSpPr>
-          <p:cNvPr id="304" name="Shape 304"/>
+          <p:cNvPr id="306" name="Shape 306"/>
           <p:cNvSpPr/>
           <p:nvPr>
             <p:ph type="body" idx="13"/>
@@ -13328,7 +13423,7 @@
       </p:sp>
       <p:sp>
         <p:nvSpPr>
-          <p:cNvPr id="305" name="Shape 305"/>
+          <p:cNvPr id="307" name="Shape 307"/>
           <p:cNvSpPr/>
           <p:nvPr>
             <p:ph type="title"/>
@@ -13359,7 +13454,7 @@
       </p:sp>
       <p:sp>
         <p:nvSpPr>
-          <p:cNvPr id="306" name="Shape 306"/>
+          <p:cNvPr id="308" name="Shape 308"/>
           <p:cNvSpPr/>
           <p:nvPr>
             <p:ph type="body" idx="1"/>
@@ -13421,7 +13516,7 @@
       </p:sp>
       <p:sp>
         <p:nvSpPr>
-          <p:cNvPr id="307" name="Shape 307"/>
+          <p:cNvPr id="309" name="Shape 309"/>
           <p:cNvSpPr/>
           <p:nvPr>
             <p:ph type="sldNum" sz="quarter" idx="4294967295"/>
@@ -13481,7 +13576,7 @@
       </p:grpSpPr>
       <p:sp>
         <p:nvSpPr>
-          <p:cNvPr id="311" name="Shape 311"/>
+          <p:cNvPr id="313" name="Shape 313"/>
           <p:cNvSpPr/>
           <p:nvPr>
             <p:ph type="body" idx="13"/>
@@ -13505,7 +13600,7 @@
       </p:sp>
       <p:sp>
         <p:nvSpPr>
-          <p:cNvPr id="312" name="Shape 312"/>
+          <p:cNvPr id="314" name="Shape 314"/>
           <p:cNvSpPr/>
           <p:nvPr>
             <p:ph type="title"/>
@@ -13536,7 +13631,7 @@
       </p:sp>
       <p:sp>
         <p:nvSpPr>
-          <p:cNvPr id="313" name="Shape 313"/>
+          <p:cNvPr id="315" name="Shape 315"/>
           <p:cNvSpPr/>
           <p:nvPr>
             <p:ph type="body" idx="1"/>
@@ -13577,7 +13672,7 @@
       </p:sp>
       <p:sp>
         <p:nvSpPr>
-          <p:cNvPr id="314" name="Shape 314"/>
+          <p:cNvPr id="316" name="Shape 316"/>
           <p:cNvSpPr/>
           <p:nvPr>
             <p:ph type="sldNum" sz="quarter" idx="4294967295"/>
@@ -13637,7 +13732,7 @@
       </p:grpSpPr>
       <p:sp>
         <p:nvSpPr>
-          <p:cNvPr id="318" name="Shape 318"/>
+          <p:cNvPr id="320" name="Shape 320"/>
           <p:cNvSpPr/>
           <p:nvPr>
             <p:ph type="body" idx="13"/>
@@ -13661,7 +13756,7 @@
       </p:sp>
       <p:sp>
         <p:nvSpPr>
-          <p:cNvPr id="319" name="Shape 319"/>
+          <p:cNvPr id="321" name="Shape 321"/>
           <p:cNvSpPr/>
           <p:nvPr>
             <p:ph type="title"/>
@@ -13692,7 +13787,7 @@
       </p:sp>
       <p:sp>
         <p:nvSpPr>
-          <p:cNvPr id="320" name="Shape 320"/>
+          <p:cNvPr id="322" name="Shape 322"/>
           <p:cNvSpPr/>
           <p:nvPr>
             <p:ph type="body" idx="1"/>
@@ -13834,7 +13929,7 @@
       </p:sp>
       <p:sp>
         <p:nvSpPr>
-          <p:cNvPr id="321" name="Shape 321"/>
+          <p:cNvPr id="323" name="Shape 323"/>
           <p:cNvSpPr/>
           <p:nvPr>
             <p:ph type="sldNum" sz="quarter" idx="4294967295"/>
@@ -13894,7 +13989,7 @@
       </p:grpSpPr>
       <p:sp>
         <p:nvSpPr>
-          <p:cNvPr id="325" name="Shape 325"/>
+          <p:cNvPr id="327" name="Shape 327"/>
           <p:cNvSpPr/>
           <p:nvPr>
             <p:ph type="body" idx="13"/>
@@ -13918,7 +14013,7 @@
       </p:sp>
       <p:sp>
         <p:nvSpPr>
-          <p:cNvPr id="326" name="Shape 326"/>
+          <p:cNvPr id="328" name="Shape 328"/>
           <p:cNvSpPr/>
           <p:nvPr>
             <p:ph type="title"/>
@@ -13949,7 +14044,7 @@
       </p:sp>
       <p:sp>
         <p:nvSpPr>
-          <p:cNvPr id="327" name="Shape 327"/>
+          <p:cNvPr id="329" name="Shape 329"/>
           <p:cNvSpPr/>
           <p:nvPr>
             <p:ph type="body" idx="1"/>
@@ -14015,7 +14110,7 @@
       </p:sp>
       <p:sp>
         <p:nvSpPr>
-          <p:cNvPr id="328" name="Shape 328"/>
+          <p:cNvPr id="330" name="Shape 330"/>
           <p:cNvSpPr/>
           <p:nvPr>
             <p:ph type="sldNum" sz="quarter" idx="4294967295"/>
@@ -14042,7 +14137,7 @@
       </p:sp>
       <p:pic>
         <p:nvPicPr>
-          <p:cNvPr id="329" name="restart-server.png"/>
+          <p:cNvPr id="331" name="restart-server.png"/>
           <p:cNvPicPr>
             <a:picLocks noChangeAspect="1"/>
           </p:cNvPicPr>
@@ -14059,7 +14154,7 @@
         <p:spPr>
           <a:xfrm>
             <a:off x="0" y="5131966"/>
-            <a:ext cx="13004801" cy="4930393"/>
+            <a:ext cx="13004800" cy="4930393"/>
           </a:xfrm>
           <a:prstGeom prst="rect">
             <a:avLst/>
@@ -14104,7 +14199,7 @@
       </p:grpSpPr>
       <p:sp>
         <p:nvSpPr>
-          <p:cNvPr id="333" name="Shape 333"/>
+          <p:cNvPr id="335" name="Shape 335"/>
           <p:cNvSpPr/>
           <p:nvPr>
             <p:ph type="body" idx="13"/>
@@ -14128,7 +14223,7 @@
       </p:sp>
       <p:sp>
         <p:nvSpPr>
-          <p:cNvPr id="334" name="Shape 334"/>
+          <p:cNvPr id="336" name="Shape 336"/>
           <p:cNvSpPr/>
           <p:nvPr>
             <p:ph type="title"/>
@@ -14159,7 +14254,7 @@
       </p:sp>
       <p:sp>
         <p:nvSpPr>
-          <p:cNvPr id="335" name="Shape 335"/>
+          <p:cNvPr id="337" name="Shape 337"/>
           <p:cNvSpPr/>
           <p:nvPr>
             <p:ph type="body" idx="1"/>
@@ -14197,7 +14292,7 @@
       </p:sp>
       <p:sp>
         <p:nvSpPr>
-          <p:cNvPr id="336" name="Shape 336"/>
+          <p:cNvPr id="338" name="Shape 338"/>
           <p:cNvSpPr/>
           <p:nvPr>
             <p:ph type="sldNum" sz="quarter" idx="4294967295"/>
@@ -14224,13 +14319,13 @@
       </p:sp>
       <p:sp>
         <p:nvSpPr>
-          <p:cNvPr id="337" name="Shape 337"/>
+          <p:cNvPr id="339" name="Shape 339"/>
           <p:cNvSpPr/>
           <p:nvPr/>
         </p:nvSpPr>
         <p:spPr>
           <a:xfrm>
-            <a:off x="8940630" y="9050230"/>
+            <a:off x="8358673" y="8864004"/>
             <a:ext cx="3761995" cy="444501"/>
           </a:xfrm>
           <a:prstGeom prst="rect">
@@ -14302,7 +14397,7 @@
       </p:grpSpPr>
       <p:sp>
         <p:nvSpPr>
-          <p:cNvPr id="177" name="Shape 177"/>
+          <p:cNvPr id="179" name="Shape 179"/>
           <p:cNvSpPr/>
           <p:nvPr>
             <p:ph type="title"/>
@@ -14376,7 +14471,7 @@
       </p:grpSpPr>
       <p:sp>
         <p:nvSpPr>
-          <p:cNvPr id="341" name="Shape 341"/>
+          <p:cNvPr id="343" name="Shape 343"/>
           <p:cNvSpPr/>
           <p:nvPr>
             <p:ph type="body" idx="13"/>
@@ -14400,7 +14495,7 @@
       </p:sp>
       <p:sp>
         <p:nvSpPr>
-          <p:cNvPr id="342" name="Shape 342"/>
+          <p:cNvPr id="344" name="Shape 344"/>
           <p:cNvSpPr/>
           <p:nvPr>
             <p:ph type="title"/>
@@ -14431,7 +14526,7 @@
       </p:sp>
       <p:sp>
         <p:nvSpPr>
-          <p:cNvPr id="343" name="Shape 343"/>
+          <p:cNvPr id="345" name="Shape 345"/>
           <p:cNvSpPr/>
           <p:nvPr>
             <p:ph type="body" idx="1"/>
@@ -14469,7 +14564,7 @@
       </p:sp>
       <p:sp>
         <p:nvSpPr>
-          <p:cNvPr id="344" name="Shape 344"/>
+          <p:cNvPr id="346" name="Shape 346"/>
           <p:cNvSpPr/>
           <p:nvPr>
             <p:ph type="sldNum" sz="quarter" idx="4294967295"/>
@@ -14496,14 +14591,14 @@
       </p:sp>
       <p:sp>
         <p:nvSpPr>
-          <p:cNvPr id="345" name="Shape 345"/>
+          <p:cNvPr id="347" name="Shape 347"/>
           <p:cNvSpPr/>
           <p:nvPr/>
         </p:nvSpPr>
         <p:spPr>
           <a:xfrm>
-            <a:off x="8940630" y="9050230"/>
-            <a:ext cx="3761995" cy="444501"/>
+            <a:off x="9242806" y="0"/>
+            <a:ext cx="3761995" cy="444500"/>
           </a:xfrm>
           <a:prstGeom prst="rect">
             <a:avLst/>
@@ -14574,7 +14669,7 @@
       </p:grpSpPr>
       <p:sp>
         <p:nvSpPr>
-          <p:cNvPr id="349" name="Shape 349"/>
+          <p:cNvPr id="351" name="Shape 351"/>
           <p:cNvSpPr/>
           <p:nvPr>
             <p:ph type="body" idx="13"/>
@@ -14598,7 +14693,7 @@
       </p:sp>
       <p:sp>
         <p:nvSpPr>
-          <p:cNvPr id="350" name="Shape 350"/>
+          <p:cNvPr id="352" name="Shape 352"/>
           <p:cNvSpPr/>
           <p:nvPr>
             <p:ph type="title"/>
@@ -14629,7 +14724,7 @@
       </p:sp>
       <p:sp>
         <p:nvSpPr>
-          <p:cNvPr id="351" name="Shape 351"/>
+          <p:cNvPr id="353" name="Shape 353"/>
           <p:cNvSpPr/>
           <p:nvPr>
             <p:ph type="body" idx="1"/>
@@ -14667,7 +14762,7 @@
       </p:sp>
       <p:sp>
         <p:nvSpPr>
-          <p:cNvPr id="352" name="Shape 352"/>
+          <p:cNvPr id="354" name="Shape 354"/>
           <p:cNvSpPr/>
           <p:nvPr>
             <p:ph type="sldNum" sz="quarter" idx="4294967295"/>
@@ -14694,14 +14789,14 @@
       </p:sp>
       <p:sp>
         <p:nvSpPr>
-          <p:cNvPr id="353" name="Shape 353"/>
+          <p:cNvPr id="355" name="Shape 355"/>
           <p:cNvSpPr/>
           <p:nvPr/>
         </p:nvSpPr>
         <p:spPr>
           <a:xfrm>
-            <a:off x="8940630" y="9050230"/>
-            <a:ext cx="3761995" cy="444501"/>
+            <a:off x="9242806" y="0"/>
+            <a:ext cx="3761995" cy="444500"/>
           </a:xfrm>
           <a:prstGeom prst="rect">
             <a:avLst/>
@@ -14772,7 +14867,7 @@
       </p:grpSpPr>
       <p:sp>
         <p:nvSpPr>
-          <p:cNvPr id="357" name="Shape 357"/>
+          <p:cNvPr id="359" name="Shape 359"/>
           <p:cNvSpPr/>
           <p:nvPr>
             <p:ph type="body" idx="13"/>
@@ -14796,7 +14891,7 @@
       </p:sp>
       <p:sp>
         <p:nvSpPr>
-          <p:cNvPr id="358" name="Shape 358"/>
+          <p:cNvPr id="360" name="Shape 360"/>
           <p:cNvSpPr/>
           <p:nvPr>
             <p:ph type="title"/>
@@ -14827,7 +14922,7 @@
       </p:sp>
       <p:sp>
         <p:nvSpPr>
-          <p:cNvPr id="359" name="Shape 359"/>
+          <p:cNvPr id="361" name="Shape 361"/>
           <p:cNvSpPr/>
           <p:nvPr>
             <p:ph type="body" idx="1"/>
@@ -14873,7 +14968,7 @@
       </p:sp>
       <p:sp>
         <p:nvSpPr>
-          <p:cNvPr id="360" name="Shape 360"/>
+          <p:cNvPr id="362" name="Shape 362"/>
           <p:cNvSpPr/>
           <p:nvPr>
             <p:ph type="sldNum" sz="quarter" idx="4294967295"/>
@@ -14900,14 +14995,14 @@
       </p:sp>
       <p:sp>
         <p:nvSpPr>
-          <p:cNvPr id="361" name="Shape 361"/>
+          <p:cNvPr id="363" name="Shape 363"/>
           <p:cNvSpPr/>
           <p:nvPr/>
         </p:nvSpPr>
         <p:spPr>
           <a:xfrm>
-            <a:off x="8940630" y="9050230"/>
-            <a:ext cx="3761995" cy="444501"/>
+            <a:off x="9242806" y="0"/>
+            <a:ext cx="3761995" cy="444500"/>
           </a:xfrm>
           <a:prstGeom prst="rect">
             <a:avLst/>
@@ -14978,7 +15073,7 @@
       </p:grpSpPr>
       <p:sp>
         <p:nvSpPr>
-          <p:cNvPr id="365" name="Shape 365"/>
+          <p:cNvPr id="367" name="Shape 367"/>
           <p:cNvSpPr/>
           <p:nvPr>
             <p:ph type="body" idx="13"/>
@@ -15002,7 +15097,7 @@
       </p:sp>
       <p:sp>
         <p:nvSpPr>
-          <p:cNvPr id="366" name="Shape 366"/>
+          <p:cNvPr id="368" name="Shape 368"/>
           <p:cNvSpPr/>
           <p:nvPr>
             <p:ph type="title"/>
@@ -15033,7 +15128,7 @@
       </p:sp>
       <p:sp>
         <p:nvSpPr>
-          <p:cNvPr id="367" name="Shape 367"/>
+          <p:cNvPr id="369" name="Shape 369"/>
           <p:cNvSpPr/>
           <p:nvPr>
             <p:ph type="body" idx="1"/>
@@ -15071,7 +15166,7 @@
       </p:sp>
       <p:sp>
         <p:nvSpPr>
-          <p:cNvPr id="368" name="Shape 368"/>
+          <p:cNvPr id="370" name="Shape 370"/>
           <p:cNvSpPr/>
           <p:nvPr>
             <p:ph type="sldNum" sz="quarter" idx="4294967295"/>
@@ -15098,14 +15193,14 @@
       </p:sp>
       <p:sp>
         <p:nvSpPr>
-          <p:cNvPr id="369" name="Shape 369"/>
+          <p:cNvPr id="371" name="Shape 371"/>
           <p:cNvSpPr/>
           <p:nvPr/>
         </p:nvSpPr>
         <p:spPr>
           <a:xfrm>
-            <a:off x="8940630" y="9050230"/>
-            <a:ext cx="3761995" cy="444501"/>
+            <a:off x="9242806" y="0"/>
+            <a:ext cx="3761995" cy="444500"/>
           </a:xfrm>
           <a:prstGeom prst="rect">
             <a:avLst/>
@@ -15176,7 +15271,7 @@
       </p:grpSpPr>
       <p:pic>
         <p:nvPicPr>
-          <p:cNvPr id="373" name="writing GIF-original.mp4"/>
+          <p:cNvPr id="375" name="writing GIF-original.mp4"/>
           <p:cNvPicPr>
             <a:picLocks noChangeAspect="0"/>
           </p:cNvPicPr>
@@ -15212,7 +15307,7 @@
       </p:pic>
       <p:sp>
         <p:nvSpPr>
-          <p:cNvPr id="374" name="Shape 374"/>
+          <p:cNvPr id="376" name="Shape 376"/>
           <p:cNvSpPr/>
           <p:nvPr/>
         </p:nvSpPr>
@@ -15259,7 +15354,7 @@
       </p:sp>
       <p:sp>
         <p:nvSpPr>
-          <p:cNvPr id="375" name="Shape 375"/>
+          <p:cNvPr id="377" name="Shape 377"/>
           <p:cNvSpPr/>
           <p:nvPr>
             <p:ph type="title"/>
@@ -15328,7 +15423,7 @@
                                       <p:cBhvr>
                                         <p:cTn id="6" dur="2720000" fill="hold"/>
                                         <p:tgtEl>
-                                          <p:spTgt spid="373"/>
+                                          <p:spTgt spid="375"/>
                                         </p:tgtEl>
                                       </p:cBhvr>
                                     </p:cmd>
@@ -15366,7 +15461,7 @@
                   </p:stCondLst>
                 </p:cTn>
                 <p:tgtEl>
-                  <p:spTgt spid="373"/>
+                  <p:spTgt spid="375"/>
                 </p:tgtEl>
               </p:cMediaNode>
             </p:video>
@@ -15404,7 +15499,7 @@
       </p:grpSpPr>
       <p:sp>
         <p:nvSpPr>
-          <p:cNvPr id="377" name="Shape 377"/>
+          <p:cNvPr id="379" name="Shape 379"/>
           <p:cNvSpPr/>
           <p:nvPr>
             <p:ph type="body" idx="13"/>
@@ -15428,7 +15523,7 @@
       </p:sp>
       <p:sp>
         <p:nvSpPr>
-          <p:cNvPr id="378" name="Shape 378"/>
+          <p:cNvPr id="380" name="Shape 380"/>
           <p:cNvSpPr/>
           <p:nvPr>
             <p:ph type="title"/>
@@ -15459,7 +15554,7 @@
       </p:sp>
       <p:sp>
         <p:nvSpPr>
-          <p:cNvPr id="379" name="Shape 379"/>
+          <p:cNvPr id="381" name="Shape 381"/>
           <p:cNvSpPr/>
           <p:nvPr>
             <p:ph type="body" idx="1"/>
@@ -15600,7 +15695,7 @@
       </p:sp>
       <p:sp>
         <p:nvSpPr>
-          <p:cNvPr id="380" name="Shape 380"/>
+          <p:cNvPr id="382" name="Shape 382"/>
           <p:cNvSpPr/>
           <p:nvPr>
             <p:ph type="sldNum" sz="quarter" idx="4294967295"/>
@@ -15627,13 +15722,13 @@
       </p:sp>
       <p:sp>
         <p:nvSpPr>
-          <p:cNvPr id="381" name="Shape 381"/>
+          <p:cNvPr id="383" name="Shape 383"/>
           <p:cNvSpPr/>
           <p:nvPr/>
         </p:nvSpPr>
         <p:spPr>
           <a:xfrm>
-            <a:off x="8940630" y="9050230"/>
+            <a:off x="8498342" y="9026952"/>
             <a:ext cx="3593339" cy="444501"/>
           </a:xfrm>
           <a:prstGeom prst="rect">
@@ -15705,7 +15800,7 @@
       </p:grpSpPr>
       <p:sp>
         <p:nvSpPr>
-          <p:cNvPr id="385" name="Shape 385"/>
+          <p:cNvPr id="387" name="Shape 387"/>
           <p:cNvSpPr/>
           <p:nvPr>
             <p:ph type="body" idx="13"/>
@@ -15729,7 +15824,7 @@
       </p:sp>
       <p:sp>
         <p:nvSpPr>
-          <p:cNvPr id="386" name="Shape 386"/>
+          <p:cNvPr id="388" name="Shape 388"/>
           <p:cNvSpPr/>
           <p:nvPr>
             <p:ph type="title"/>
@@ -15760,7 +15855,7 @@
       </p:sp>
       <p:sp>
         <p:nvSpPr>
-          <p:cNvPr id="387" name="Shape 387"/>
+          <p:cNvPr id="389" name="Shape 389"/>
           <p:cNvSpPr/>
           <p:nvPr>
             <p:ph type="body" idx="1"/>
@@ -15882,7 +15977,7 @@
       </p:sp>
       <p:sp>
         <p:nvSpPr>
-          <p:cNvPr id="388" name="Shape 388"/>
+          <p:cNvPr id="390" name="Shape 390"/>
           <p:cNvSpPr/>
           <p:nvPr>
             <p:ph type="sldNum" sz="quarter" idx="4294967295"/>
@@ -15942,7 +16037,7 @@
       </p:grpSpPr>
       <p:sp>
         <p:nvSpPr>
-          <p:cNvPr id="392" name="Shape 392"/>
+          <p:cNvPr id="394" name="Shape 394"/>
           <p:cNvSpPr/>
           <p:nvPr>
             <p:ph type="body" idx="13"/>
@@ -15966,7 +16061,7 @@
       </p:sp>
       <p:sp>
         <p:nvSpPr>
-          <p:cNvPr id="393" name="Shape 393"/>
+          <p:cNvPr id="395" name="Shape 395"/>
           <p:cNvSpPr/>
           <p:nvPr>
             <p:ph type="title"/>
@@ -15997,7 +16092,7 @@
       </p:sp>
       <p:sp>
         <p:nvSpPr>
-          <p:cNvPr id="394" name="Shape 394"/>
+          <p:cNvPr id="396" name="Shape 396"/>
           <p:cNvSpPr/>
           <p:nvPr>
             <p:ph type="body" idx="1"/>
@@ -16053,7 +16148,7 @@
       </p:sp>
       <p:sp>
         <p:nvSpPr>
-          <p:cNvPr id="395" name="Shape 395"/>
+          <p:cNvPr id="397" name="Shape 397"/>
           <p:cNvSpPr/>
           <p:nvPr>
             <p:ph type="sldNum" sz="quarter" idx="4294967295"/>
@@ -16080,7 +16175,7 @@
       </p:sp>
       <p:pic>
         <p:nvPicPr>
-          <p:cNvPr id="396" name="carbon(1).png"/>
+          <p:cNvPr id="398" name="carbon(1).png"/>
           <p:cNvPicPr>
             <a:picLocks noChangeAspect="1"/>
           </p:cNvPicPr>
@@ -16109,7 +16204,7 @@
       </p:pic>
       <p:sp>
         <p:nvSpPr>
-          <p:cNvPr id="397" name="Shape 397"/>
+          <p:cNvPr id="399" name="Shape 399"/>
           <p:cNvSpPr/>
           <p:nvPr/>
         </p:nvSpPr>
@@ -16203,7 +16298,7 @@
       </p:grpSpPr>
       <p:sp>
         <p:nvSpPr>
-          <p:cNvPr id="401" name="Shape 401"/>
+          <p:cNvPr id="403" name="Shape 403"/>
           <p:cNvSpPr/>
           <p:nvPr>
             <p:ph type="body" idx="13"/>
@@ -16227,7 +16322,7 @@
       </p:sp>
       <p:sp>
         <p:nvSpPr>
-          <p:cNvPr id="402" name="Shape 402"/>
+          <p:cNvPr id="404" name="Shape 404"/>
           <p:cNvSpPr/>
           <p:nvPr>
             <p:ph type="title"/>
@@ -16258,7 +16353,7 @@
       </p:sp>
       <p:sp>
         <p:nvSpPr>
-          <p:cNvPr id="403" name="Shape 403"/>
+          <p:cNvPr id="405" name="Shape 405"/>
           <p:cNvSpPr/>
           <p:nvPr>
             <p:ph type="body" idx="1"/>
@@ -16296,7 +16391,7 @@
       </p:sp>
       <p:sp>
         <p:nvSpPr>
-          <p:cNvPr id="404" name="Shape 404"/>
+          <p:cNvPr id="406" name="Shape 406"/>
           <p:cNvSpPr/>
           <p:nvPr>
             <p:ph type="sldNum" sz="quarter" idx="4294967295"/>
@@ -16356,7 +16451,7 @@
       </p:grpSpPr>
       <p:sp>
         <p:nvSpPr>
-          <p:cNvPr id="408" name="Shape 408"/>
+          <p:cNvPr id="410" name="Shape 410"/>
           <p:cNvSpPr/>
           <p:nvPr>
             <p:ph type="body" idx="13"/>
@@ -16380,7 +16475,7 @@
       </p:sp>
       <p:sp>
         <p:nvSpPr>
-          <p:cNvPr id="409" name="Shape 409"/>
+          <p:cNvPr id="411" name="Shape 411"/>
           <p:cNvSpPr/>
           <p:nvPr>
             <p:ph type="title"/>
@@ -16411,7 +16506,7 @@
       </p:sp>
       <p:sp>
         <p:nvSpPr>
-          <p:cNvPr id="410" name="Shape 410"/>
+          <p:cNvPr id="412" name="Shape 412"/>
           <p:cNvSpPr/>
           <p:nvPr>
             <p:ph type="body" idx="1"/>
@@ -16866,7 +16961,7 @@
       </p:sp>
       <p:sp>
         <p:nvSpPr>
-          <p:cNvPr id="411" name="Shape 411"/>
+          <p:cNvPr id="413" name="Shape 413"/>
           <p:cNvSpPr/>
           <p:nvPr>
             <p:ph type="sldNum" sz="quarter" idx="4294967295"/>
@@ -16893,14 +16988,14 @@
       </p:sp>
       <p:sp>
         <p:nvSpPr>
-          <p:cNvPr id="412" name="Shape 412"/>
+          <p:cNvPr id="414" name="Shape 414"/>
           <p:cNvSpPr/>
           <p:nvPr/>
         </p:nvSpPr>
         <p:spPr>
           <a:xfrm>
-            <a:off x="8940630" y="9050230"/>
-            <a:ext cx="3593339" cy="444501"/>
+            <a:off x="9411461" y="0"/>
+            <a:ext cx="3593339" cy="444500"/>
           </a:xfrm>
           <a:prstGeom prst="rect">
             <a:avLst/>
@@ -16971,7 +17066,7 @@
       </p:grpSpPr>
       <p:sp>
         <p:nvSpPr>
-          <p:cNvPr id="179" name="Shape 179"/>
+          <p:cNvPr id="181" name="Shape 181"/>
           <p:cNvSpPr/>
           <p:nvPr>
             <p:ph type="body" idx="13"/>
@@ -16995,7 +17090,7 @@
       </p:sp>
       <p:sp>
         <p:nvSpPr>
-          <p:cNvPr id="180" name="Shape 180"/>
+          <p:cNvPr id="182" name="Shape 182"/>
           <p:cNvSpPr/>
           <p:nvPr>
             <p:ph type="title"/>
@@ -17026,7 +17121,7 @@
       </p:sp>
       <p:sp>
         <p:nvSpPr>
-          <p:cNvPr id="181" name="Shape 181"/>
+          <p:cNvPr id="183" name="Shape 183"/>
           <p:cNvSpPr/>
           <p:nvPr>
             <p:ph type="body" idx="1"/>
@@ -17090,7 +17185,7 @@
       </p:sp>
       <p:sp>
         <p:nvSpPr>
-          <p:cNvPr id="182" name="Shape 182"/>
+          <p:cNvPr id="184" name="Shape 184"/>
           <p:cNvSpPr/>
           <p:nvPr>
             <p:ph type="sldNum" sz="quarter" idx="4294967295"/>
@@ -17154,7 +17249,7 @@
       </p:grpSpPr>
       <p:sp>
         <p:nvSpPr>
-          <p:cNvPr id="416" name="Shape 416"/>
+          <p:cNvPr id="418" name="Shape 418"/>
           <p:cNvSpPr/>
           <p:nvPr>
             <p:ph type="body" idx="13"/>
@@ -17178,7 +17273,7 @@
       </p:sp>
       <p:sp>
         <p:nvSpPr>
-          <p:cNvPr id="417" name="Shape 417"/>
+          <p:cNvPr id="419" name="Shape 419"/>
           <p:cNvSpPr/>
           <p:nvPr>
             <p:ph type="title"/>
@@ -17209,7 +17304,7 @@
       </p:sp>
       <p:sp>
         <p:nvSpPr>
-          <p:cNvPr id="418" name="Shape 418"/>
+          <p:cNvPr id="420" name="Shape 420"/>
           <p:cNvSpPr/>
           <p:nvPr>
             <p:ph type="body" idx="1"/>
@@ -17269,7 +17364,7 @@
       </p:sp>
       <p:sp>
         <p:nvSpPr>
-          <p:cNvPr id="419" name="Shape 419"/>
+          <p:cNvPr id="421" name="Shape 421"/>
           <p:cNvSpPr/>
           <p:nvPr>
             <p:ph type="sldNum" sz="quarter" idx="4294967295"/>
@@ -17329,7 +17424,7 @@
       </p:grpSpPr>
       <p:sp>
         <p:nvSpPr>
-          <p:cNvPr id="423" name="Shape 423"/>
+          <p:cNvPr id="425" name="Shape 425"/>
           <p:cNvSpPr/>
           <p:nvPr>
             <p:ph type="body" idx="13"/>
@@ -17353,7 +17448,7 @@
       </p:sp>
       <p:sp>
         <p:nvSpPr>
-          <p:cNvPr id="424" name="Shape 424"/>
+          <p:cNvPr id="426" name="Shape 426"/>
           <p:cNvSpPr/>
           <p:nvPr>
             <p:ph type="title"/>
@@ -17384,7 +17479,7 @@
       </p:sp>
       <p:sp>
         <p:nvSpPr>
-          <p:cNvPr id="425" name="Shape 425"/>
+          <p:cNvPr id="427" name="Shape 427"/>
           <p:cNvSpPr/>
           <p:nvPr>
             <p:ph type="body" idx="1"/>
@@ -17422,7 +17517,7 @@
       </p:sp>
       <p:sp>
         <p:nvSpPr>
-          <p:cNvPr id="426" name="Shape 426"/>
+          <p:cNvPr id="428" name="Shape 428"/>
           <p:cNvSpPr/>
           <p:nvPr>
             <p:ph type="sldNum" sz="quarter" idx="4294967295"/>
@@ -17482,7 +17577,7 @@
       </p:grpSpPr>
       <p:sp>
         <p:nvSpPr>
-          <p:cNvPr id="430" name="Shape 430"/>
+          <p:cNvPr id="432" name="Shape 432"/>
           <p:cNvSpPr/>
           <p:nvPr>
             <p:ph type="body" idx="13"/>
@@ -17506,7 +17601,7 @@
       </p:sp>
       <p:sp>
         <p:nvSpPr>
-          <p:cNvPr id="431" name="Shape 431"/>
+          <p:cNvPr id="433" name="Shape 433"/>
           <p:cNvSpPr/>
           <p:nvPr>
             <p:ph type="title"/>
@@ -17544,7 +17639,7 @@
       </p:sp>
       <p:sp>
         <p:nvSpPr>
-          <p:cNvPr id="432" name="Shape 432"/>
+          <p:cNvPr id="434" name="Shape 434"/>
           <p:cNvSpPr/>
           <p:nvPr>
             <p:ph type="body" idx="1"/>
@@ -17571,7 +17666,7 @@
       </p:sp>
       <p:sp>
         <p:nvSpPr>
-          <p:cNvPr id="433" name="Shape 433"/>
+          <p:cNvPr id="435" name="Shape 435"/>
           <p:cNvSpPr/>
           <p:nvPr>
             <p:ph type="sldNum" sz="quarter" idx="4294967295"/>
@@ -17598,7 +17693,7 @@
       </p:sp>
       <p:sp>
         <p:nvSpPr>
-          <p:cNvPr id="434" name="Shape 434"/>
+          <p:cNvPr id="436" name="Shape 436"/>
           <p:cNvSpPr/>
           <p:nvPr/>
         </p:nvSpPr>
@@ -17643,7 +17738,7 @@
       </p:sp>
       <p:pic>
         <p:nvPicPr>
-          <p:cNvPr id="435" name="markdown-editor.png"/>
+          <p:cNvPr id="437" name="markdown-editor.png"/>
           <p:cNvPicPr>
             <a:picLocks noChangeAspect="1"/>
           </p:cNvPicPr>
@@ -17705,7 +17800,7 @@
       </p:grpSpPr>
       <p:sp>
         <p:nvSpPr>
-          <p:cNvPr id="439" name="Shape 439"/>
+          <p:cNvPr id="441" name="Shape 441"/>
           <p:cNvSpPr/>
           <p:nvPr>
             <p:ph type="body" idx="13"/>
@@ -17729,7 +17824,7 @@
       </p:sp>
       <p:sp>
         <p:nvSpPr>
-          <p:cNvPr id="440" name="Shape 440"/>
+          <p:cNvPr id="442" name="Shape 442"/>
           <p:cNvSpPr/>
           <p:nvPr>
             <p:ph type="title"/>
@@ -17767,7 +17862,7 @@
       </p:sp>
       <p:sp>
         <p:nvSpPr>
-          <p:cNvPr id="441" name="Shape 441"/>
+          <p:cNvPr id="443" name="Shape 443"/>
           <p:cNvSpPr/>
           <p:nvPr>
             <p:ph type="body" idx="1"/>
@@ -17811,7 +17906,7 @@
       </p:sp>
       <p:sp>
         <p:nvSpPr>
-          <p:cNvPr id="442" name="Shape 442"/>
+          <p:cNvPr id="444" name="Shape 444"/>
           <p:cNvSpPr/>
           <p:nvPr>
             <p:ph type="sldNum" sz="quarter" idx="4294967295"/>
@@ -17871,7 +17966,7 @@
       </p:grpSpPr>
       <p:sp>
         <p:nvSpPr>
-          <p:cNvPr id="446" name="Shape 446"/>
+          <p:cNvPr id="448" name="Shape 448"/>
           <p:cNvSpPr/>
           <p:nvPr>
             <p:ph type="body" idx="13"/>
@@ -17895,7 +17990,7 @@
       </p:sp>
       <p:sp>
         <p:nvSpPr>
-          <p:cNvPr id="447" name="Shape 447"/>
+          <p:cNvPr id="449" name="Shape 449"/>
           <p:cNvSpPr/>
           <p:nvPr>
             <p:ph type="title"/>
@@ -17926,7 +18021,7 @@
       </p:sp>
       <p:sp>
         <p:nvSpPr>
-          <p:cNvPr id="448" name="Shape 448"/>
+          <p:cNvPr id="450" name="Shape 450"/>
           <p:cNvSpPr/>
           <p:nvPr>
             <p:ph type="body" idx="1"/>
@@ -17981,7 +18076,7 @@
       </p:sp>
       <p:sp>
         <p:nvSpPr>
-          <p:cNvPr id="449" name="Shape 449"/>
+          <p:cNvPr id="451" name="Shape 451"/>
           <p:cNvSpPr/>
           <p:nvPr>
             <p:ph type="sldNum" sz="quarter" idx="4294967295"/>
@@ -18041,7 +18136,7 @@
       </p:grpSpPr>
       <p:sp>
         <p:nvSpPr>
-          <p:cNvPr id="453" name="Shape 453"/>
+          <p:cNvPr id="455" name="Shape 455"/>
           <p:cNvSpPr/>
           <p:nvPr>
             <p:ph type="body" idx="13"/>
@@ -18065,7 +18160,7 @@
       </p:sp>
       <p:sp>
         <p:nvSpPr>
-          <p:cNvPr id="454" name="Shape 454"/>
+          <p:cNvPr id="456" name="Shape 456"/>
           <p:cNvSpPr/>
           <p:nvPr>
             <p:ph type="title"/>
@@ -18096,7 +18191,7 @@
       </p:sp>
       <p:sp>
         <p:nvSpPr>
-          <p:cNvPr id="455" name="Shape 455"/>
+          <p:cNvPr id="457" name="Shape 457"/>
           <p:cNvSpPr/>
           <p:nvPr>
             <p:ph type="body" idx="1"/>
@@ -18297,7 +18392,7 @@
       </p:sp>
       <p:sp>
         <p:nvSpPr>
-          <p:cNvPr id="456" name="Shape 456"/>
+          <p:cNvPr id="458" name="Shape 458"/>
           <p:cNvSpPr/>
           <p:nvPr>
             <p:ph type="sldNum" sz="quarter" idx="4294967295"/>
@@ -18324,7 +18419,7 @@
       </p:sp>
       <p:pic>
         <p:nvPicPr>
-          <p:cNvPr id="457" name="Screen Shot 2018-04-08 at 11.44.57 PM.png"/>
+          <p:cNvPr id="459" name="Screen Shot 2018-04-08 at 11.44.57 PM.png"/>
           <p:cNvPicPr>
             <a:picLocks noChangeAspect="1"/>
           </p:cNvPicPr>
@@ -18340,8 +18435,8 @@
         </p:blipFill>
         <p:spPr>
           <a:xfrm>
-            <a:off x="1536699" y="8038558"/>
-            <a:ext cx="8915401" cy="1422401"/>
+            <a:off x="1606706" y="7875610"/>
+            <a:ext cx="8457834" cy="1349399"/>
           </a:xfrm>
           <a:prstGeom prst="rect">
             <a:avLst/>
@@ -18353,14 +18448,14 @@
       </p:pic>
       <p:sp>
         <p:nvSpPr>
-          <p:cNvPr id="458" name="Shape 458"/>
+          <p:cNvPr id="460" name="Shape 460"/>
           <p:cNvSpPr/>
           <p:nvPr/>
         </p:nvSpPr>
         <p:spPr>
           <a:xfrm>
-            <a:off x="8929068" y="8907085"/>
-            <a:ext cx="1344919" cy="431801"/>
+            <a:off x="8719735" y="8720858"/>
+            <a:ext cx="1048667" cy="336687"/>
           </a:xfrm>
           <a:prstGeom prst="rect">
             <a:avLst/>
@@ -18428,7 +18523,7 @@
       </p:grpSpPr>
       <p:sp>
         <p:nvSpPr>
-          <p:cNvPr id="462" name="Shape 462"/>
+          <p:cNvPr id="464" name="Shape 464"/>
           <p:cNvSpPr/>
           <p:nvPr>
             <p:ph type="body" idx="13"/>
@@ -18452,7 +18547,7 @@
       </p:sp>
       <p:sp>
         <p:nvSpPr>
-          <p:cNvPr id="463" name="Shape 463"/>
+          <p:cNvPr id="465" name="Shape 465"/>
           <p:cNvSpPr/>
           <p:nvPr>
             <p:ph type="title"/>
@@ -18483,7 +18578,7 @@
       </p:sp>
       <p:sp>
         <p:nvSpPr>
-          <p:cNvPr id="464" name="Shape 464"/>
+          <p:cNvPr id="466" name="Shape 466"/>
           <p:cNvSpPr/>
           <p:nvPr>
             <p:ph type="body" idx="1"/>
@@ -18515,7 +18610,7 @@
       </p:sp>
       <p:sp>
         <p:nvSpPr>
-          <p:cNvPr id="465" name="Shape 465"/>
+          <p:cNvPr id="467" name="Shape 467"/>
           <p:cNvSpPr/>
           <p:nvPr>
             <p:ph type="sldNum" sz="quarter" idx="4294967295"/>
@@ -18542,7 +18637,7 @@
       </p:sp>
       <p:pic>
         <p:nvPicPr>
-          <p:cNvPr id="466" name="Screen Shot 2018-04-08 at 11.40.02 PM.png"/>
+          <p:cNvPr id="468" name="Screen Shot 2018-04-08 at 11.40.02 PM.png"/>
           <p:cNvPicPr>
             <a:picLocks noChangeAspect="1"/>
           </p:cNvPicPr>
@@ -18558,7 +18653,7 @@
         </p:blipFill>
         <p:spPr>
           <a:xfrm>
-            <a:off x="1105583" y="3854820"/>
+            <a:off x="952500" y="3854820"/>
             <a:ext cx="11099801" cy="8064501"/>
           </a:xfrm>
           <a:prstGeom prst="rect">
@@ -18604,7 +18699,7 @@
       </p:grpSpPr>
       <p:sp>
         <p:nvSpPr>
-          <p:cNvPr id="470" name="Shape 470"/>
+          <p:cNvPr id="472" name="Shape 472"/>
           <p:cNvSpPr/>
           <p:nvPr>
             <p:ph type="body" idx="13"/>
@@ -18628,7 +18723,7 @@
       </p:sp>
       <p:sp>
         <p:nvSpPr>
-          <p:cNvPr id="471" name="Shape 471"/>
+          <p:cNvPr id="473" name="Shape 473"/>
           <p:cNvSpPr/>
           <p:nvPr>
             <p:ph type="title"/>
@@ -18659,7 +18754,7 @@
       </p:sp>
       <p:sp>
         <p:nvSpPr>
-          <p:cNvPr id="472" name="Shape 472"/>
+          <p:cNvPr id="474" name="Shape 474"/>
           <p:cNvSpPr/>
           <p:nvPr>
             <p:ph type="body" idx="1"/>
@@ -18691,7 +18786,7 @@
       </p:sp>
       <p:sp>
         <p:nvSpPr>
-          <p:cNvPr id="473" name="Shape 473"/>
+          <p:cNvPr id="475" name="Shape 475"/>
           <p:cNvSpPr/>
           <p:nvPr>
             <p:ph type="sldNum" sz="quarter" idx="4294967295"/>
@@ -18716,9 +18811,51 @@
           </a:p>
         </p:txBody>
       </p:sp>
+      <p:sp>
+        <p:nvSpPr>
+          <p:cNvPr id="476" name="Shape 476"/>
+          <p:cNvSpPr/>
+          <p:nvPr/>
+        </p:nvSpPr>
+        <p:spPr>
+          <a:xfrm>
+            <a:off x="-697076" y="8614964"/>
+            <a:ext cx="14889069" cy="2164214"/>
+          </a:xfrm>
+          <a:prstGeom prst="rect">
+            <a:avLst/>
+          </a:prstGeom>
+          <a:solidFill>
+            <a:srgbClr val="EBEBEB"/>
+          </a:solidFill>
+          <a:ln w="12700">
+            <a:miter lim="400000"/>
+          </a:ln>
+        </p:spPr>
+        <p:txBody>
+          <a:bodyPr lIns="50800" tIns="50800" rIns="50800" bIns="50800" anchor="ctr"/>
+          <a:lstStyle/>
+          <a:p>
+            <a:pPr algn="ctr">
+              <a:lnSpc>
+                <a:spcPct val="80000"/>
+              </a:lnSpc>
+              <a:spcBef>
+                <a:spcPts val="0"/>
+              </a:spcBef>
+              <a:defRPr cap="all" sz="2800">
+                <a:latin typeface="+mn-lt"/>
+                <a:ea typeface="+mn-ea"/>
+                <a:cs typeface="+mn-cs"/>
+                <a:sym typeface="DIN Condensed"/>
+              </a:defRPr>
+            </a:pPr>
+          </a:p>
+        </p:txBody>
+      </p:sp>
       <p:pic>
         <p:nvPicPr>
-          <p:cNvPr id="474" name="Screen Shot 2018-04-08 at 11.42.07 PM.png"/>
+          <p:cNvPr id="477" name="Screen Shot 2018-04-08 at 11.42.07 PM.png"/>
           <p:cNvPicPr>
             <a:picLocks noChangeAspect="1"/>
           </p:cNvPicPr>
@@ -18734,7 +18871,7 @@
         </p:blipFill>
         <p:spPr>
           <a:xfrm>
-            <a:off x="1803513" y="5002661"/>
+            <a:off x="1677987" y="4723321"/>
             <a:ext cx="9906001" cy="7912101"/>
           </a:xfrm>
           <a:prstGeom prst="rect">
@@ -18780,7 +18917,7 @@
       </p:grpSpPr>
       <p:sp>
         <p:nvSpPr>
-          <p:cNvPr id="478" name="Shape 478"/>
+          <p:cNvPr id="481" name="Shape 481"/>
           <p:cNvSpPr/>
           <p:nvPr>
             <p:ph type="body" idx="13"/>
@@ -18804,7 +18941,7 @@
       </p:sp>
       <p:sp>
         <p:nvSpPr>
-          <p:cNvPr id="479" name="Shape 479"/>
+          <p:cNvPr id="482" name="Shape 482"/>
           <p:cNvSpPr/>
           <p:nvPr>
             <p:ph type="title"/>
@@ -18835,7 +18972,7 @@
       </p:sp>
       <p:sp>
         <p:nvSpPr>
-          <p:cNvPr id="480" name="Shape 480"/>
+          <p:cNvPr id="483" name="Shape 483"/>
           <p:cNvSpPr/>
           <p:nvPr>
             <p:ph type="body" idx="1"/>
@@ -18898,7 +19035,7 @@
       </p:sp>
       <p:sp>
         <p:nvSpPr>
-          <p:cNvPr id="481" name="Shape 481"/>
+          <p:cNvPr id="484" name="Shape 484"/>
           <p:cNvSpPr/>
           <p:nvPr>
             <p:ph type="sldNum" sz="quarter" idx="4294967295"/>
@@ -18958,7 +19095,7 @@
       </p:grpSpPr>
       <p:sp>
         <p:nvSpPr>
-          <p:cNvPr id="485" name="Shape 485"/>
+          <p:cNvPr id="488" name="Shape 488"/>
           <p:cNvSpPr/>
           <p:nvPr>
             <p:ph type="body" idx="13"/>
@@ -18982,7 +19119,7 @@
       </p:sp>
       <p:sp>
         <p:nvSpPr>
-          <p:cNvPr id="486" name="Shape 486"/>
+          <p:cNvPr id="489" name="Shape 489"/>
           <p:cNvSpPr/>
           <p:nvPr>
             <p:ph type="title"/>
@@ -19013,7 +19150,7 @@
       </p:sp>
       <p:sp>
         <p:nvSpPr>
-          <p:cNvPr id="487" name="Shape 487"/>
+          <p:cNvPr id="490" name="Shape 490"/>
           <p:cNvSpPr/>
           <p:nvPr>
             <p:ph type="body" idx="1"/>
@@ -19076,7 +19213,7 @@
       </p:sp>
       <p:sp>
         <p:nvSpPr>
-          <p:cNvPr id="488" name="Shape 488"/>
+          <p:cNvPr id="491" name="Shape 491"/>
           <p:cNvSpPr/>
           <p:nvPr>
             <p:ph type="sldNum" sz="quarter" idx="4294967295"/>
@@ -19136,7 +19273,7 @@
       </p:grpSpPr>
       <p:sp>
         <p:nvSpPr>
-          <p:cNvPr id="184" name="Shape 184"/>
+          <p:cNvPr id="186" name="Shape 186"/>
           <p:cNvSpPr/>
           <p:nvPr>
             <p:ph type="body" idx="13"/>
@@ -19160,7 +19297,7 @@
       </p:sp>
       <p:sp>
         <p:nvSpPr>
-          <p:cNvPr id="185" name="Shape 185"/>
+          <p:cNvPr id="187" name="Shape 187"/>
           <p:cNvSpPr/>
           <p:nvPr>
             <p:ph type="title"/>
@@ -19191,7 +19328,7 @@
       </p:sp>
       <p:sp>
         <p:nvSpPr>
-          <p:cNvPr id="186" name="Shape 186"/>
+          <p:cNvPr id="188" name="Shape 188"/>
           <p:cNvSpPr/>
           <p:nvPr>
             <p:ph type="body" idx="1"/>
@@ -19258,7 +19395,7 @@
       </p:sp>
       <p:sp>
         <p:nvSpPr>
-          <p:cNvPr id="187" name="Shape 187"/>
+          <p:cNvPr id="189" name="Shape 189"/>
           <p:cNvSpPr/>
           <p:nvPr>
             <p:ph type="sldNum" sz="quarter" idx="4294967295"/>
@@ -19322,7 +19459,7 @@
       </p:grpSpPr>
       <p:sp>
         <p:nvSpPr>
-          <p:cNvPr id="492" name="Shape 492"/>
+          <p:cNvPr id="495" name="Shape 495"/>
           <p:cNvSpPr/>
           <p:nvPr>
             <p:ph type="body" idx="13"/>
@@ -19346,7 +19483,7 @@
       </p:sp>
       <p:sp>
         <p:nvSpPr>
-          <p:cNvPr id="493" name="Shape 493"/>
+          <p:cNvPr id="496" name="Shape 496"/>
           <p:cNvSpPr/>
           <p:nvPr>
             <p:ph type="title"/>
@@ -19377,7 +19514,7 @@
       </p:sp>
       <p:sp>
         <p:nvSpPr>
-          <p:cNvPr id="494" name="Shape 494"/>
+          <p:cNvPr id="497" name="Shape 497"/>
           <p:cNvSpPr/>
           <p:nvPr>
             <p:ph type="body" idx="1"/>
@@ -19418,7 +19555,7 @@
       </p:sp>
       <p:sp>
         <p:nvSpPr>
-          <p:cNvPr id="495" name="Shape 495"/>
+          <p:cNvPr id="498" name="Shape 498"/>
           <p:cNvSpPr/>
           <p:nvPr>
             <p:ph type="sldNum" sz="quarter" idx="4294967295"/>
@@ -19445,7 +19582,7 @@
       </p:sp>
       <p:pic>
         <p:nvPicPr>
-          <p:cNvPr id="496" name="generic-about.png"/>
+          <p:cNvPr id="499" name="generic-about.png"/>
           <p:cNvPicPr>
             <a:picLocks noChangeAspect="1"/>
           </p:cNvPicPr>
@@ -19507,7 +19644,7 @@
       </p:grpSpPr>
       <p:sp>
         <p:nvSpPr>
-          <p:cNvPr id="500" name="Shape 500"/>
+          <p:cNvPr id="503" name="Shape 503"/>
           <p:cNvSpPr/>
           <p:nvPr>
             <p:ph type="body" idx="13"/>
@@ -19531,7 +19668,7 @@
       </p:sp>
       <p:sp>
         <p:nvSpPr>
-          <p:cNvPr id="501" name="Shape 501"/>
+          <p:cNvPr id="504" name="Shape 504"/>
           <p:cNvSpPr/>
           <p:nvPr>
             <p:ph type="title"/>
@@ -19562,7 +19699,7 @@
       </p:sp>
       <p:sp>
         <p:nvSpPr>
-          <p:cNvPr id="502" name="Shape 502"/>
+          <p:cNvPr id="505" name="Shape 505"/>
           <p:cNvSpPr/>
           <p:nvPr>
             <p:ph type="body" idx="1"/>
@@ -19594,7 +19731,7 @@
       </p:sp>
       <p:sp>
         <p:nvSpPr>
-          <p:cNvPr id="503" name="Shape 503"/>
+          <p:cNvPr id="506" name="Shape 506"/>
           <p:cNvSpPr/>
           <p:nvPr>
             <p:ph type="sldNum" sz="quarter" idx="4294967295"/>
@@ -19654,7 +19791,7 @@
       </p:grpSpPr>
       <p:sp>
         <p:nvSpPr>
-          <p:cNvPr id="507" name="Shape 507"/>
+          <p:cNvPr id="510" name="Shape 510"/>
           <p:cNvSpPr/>
           <p:nvPr>
             <p:ph type="body" idx="13"/>
@@ -19678,7 +19815,7 @@
       </p:sp>
       <p:sp>
         <p:nvSpPr>
-          <p:cNvPr id="508" name="Shape 508"/>
+          <p:cNvPr id="511" name="Shape 511"/>
           <p:cNvSpPr/>
           <p:nvPr>
             <p:ph type="title"/>
@@ -19709,7 +19846,7 @@
       </p:sp>
       <p:sp>
         <p:nvSpPr>
-          <p:cNvPr id="509" name="Shape 509"/>
+          <p:cNvPr id="512" name="Shape 512"/>
           <p:cNvSpPr/>
           <p:nvPr>
             <p:ph type="sldNum" sz="quarter" idx="4294967295"/>
@@ -19736,7 +19873,7 @@
       </p:sp>
       <p:pic>
         <p:nvPicPr>
-          <p:cNvPr id="510" name="Screen Shot 2018-04-07 at 5.31.33 PM.png"/>
+          <p:cNvPr id="513" name="Screen Shot 2018-04-07 at 5.31.33 PM.png"/>
           <p:cNvPicPr>
             <a:picLocks noChangeAspect="1"/>
           </p:cNvPicPr>
@@ -19765,7 +19902,7 @@
       </p:pic>
       <p:pic>
         <p:nvPicPr>
-          <p:cNvPr id="511" name="Screen Shot 2018-04-07 at 5.32.03 PM.png"/>
+          <p:cNvPr id="514" name="Screen Shot 2018-04-07 at 5.32.03 PM.png"/>
           <p:cNvPicPr>
             <a:picLocks noChangeAspect="1"/>
           </p:cNvPicPr>
@@ -19781,7 +19918,7 @@
         </p:blipFill>
         <p:spPr>
           <a:xfrm>
-            <a:off x="2686050" y="6556275"/>
+            <a:off x="2686050" y="6289575"/>
             <a:ext cx="7632700" cy="2908301"/>
           </a:xfrm>
           <a:prstGeom prst="rect">
@@ -19827,7 +19964,7 @@
       </p:grpSpPr>
       <p:sp>
         <p:nvSpPr>
-          <p:cNvPr id="515" name="Shape 515"/>
+          <p:cNvPr id="518" name="Shape 518"/>
           <p:cNvSpPr/>
           <p:nvPr>
             <p:ph type="body" idx="13"/>
@@ -19851,7 +19988,7 @@
       </p:sp>
       <p:sp>
         <p:nvSpPr>
-          <p:cNvPr id="516" name="Shape 516"/>
+          <p:cNvPr id="519" name="Shape 519"/>
           <p:cNvSpPr/>
           <p:nvPr>
             <p:ph type="title"/>
@@ -19882,7 +20019,7 @@
       </p:sp>
       <p:sp>
         <p:nvSpPr>
-          <p:cNvPr id="517" name="Shape 517"/>
+          <p:cNvPr id="520" name="Shape 520"/>
           <p:cNvSpPr/>
           <p:nvPr>
             <p:ph type="body" idx="1"/>
@@ -19956,7 +20093,7 @@
       </p:sp>
       <p:sp>
         <p:nvSpPr>
-          <p:cNvPr id="518" name="Shape 518"/>
+          <p:cNvPr id="521" name="Shape 521"/>
           <p:cNvSpPr/>
           <p:nvPr>
             <p:ph type="sldNum" sz="quarter" idx="4294967295"/>
@@ -20016,7 +20153,7 @@
       </p:grpSpPr>
       <p:sp>
         <p:nvSpPr>
-          <p:cNvPr id="522" name="Shape 522"/>
+          <p:cNvPr id="525" name="Shape 525"/>
           <p:cNvSpPr/>
           <p:nvPr>
             <p:ph type="body" idx="13"/>
@@ -20040,7 +20177,7 @@
       </p:sp>
       <p:sp>
         <p:nvSpPr>
-          <p:cNvPr id="523" name="Shape 523"/>
+          <p:cNvPr id="526" name="Shape 526"/>
           <p:cNvSpPr/>
           <p:nvPr>
             <p:ph type="title"/>
@@ -20071,7 +20208,7 @@
       </p:sp>
       <p:sp>
         <p:nvSpPr>
-          <p:cNvPr id="524" name="Shape 524"/>
+          <p:cNvPr id="527" name="Shape 527"/>
           <p:cNvSpPr/>
           <p:nvPr>
             <p:ph type="body" idx="1"/>
@@ -20106,7 +20243,7 @@
       </p:sp>
       <p:sp>
         <p:nvSpPr>
-          <p:cNvPr id="525" name="Shape 525"/>
+          <p:cNvPr id="528" name="Shape 528"/>
           <p:cNvSpPr/>
           <p:nvPr>
             <p:ph type="sldNum" sz="quarter" idx="4294967295"/>
@@ -20133,7 +20270,7 @@
       </p:sp>
       <p:pic>
         <p:nvPicPr>
-          <p:cNvPr id="526" name="restart-server.png"/>
+          <p:cNvPr id="529" name="restart-server.png"/>
           <p:cNvPicPr>
             <a:picLocks noChangeAspect="1"/>
           </p:cNvPicPr>
@@ -20195,7 +20332,7 @@
       </p:grpSpPr>
       <p:sp>
         <p:nvSpPr>
-          <p:cNvPr id="530" name="Shape 530"/>
+          <p:cNvPr id="533" name="Shape 533"/>
           <p:cNvSpPr/>
           <p:nvPr>
             <p:ph type="body" idx="13"/>
@@ -20219,7 +20356,7 @@
       </p:sp>
       <p:sp>
         <p:nvSpPr>
-          <p:cNvPr id="531" name="Shape 531"/>
+          <p:cNvPr id="534" name="Shape 534"/>
           <p:cNvSpPr/>
           <p:nvPr>
             <p:ph type="title"/>
@@ -20250,7 +20387,7 @@
       </p:sp>
       <p:sp>
         <p:nvSpPr>
-          <p:cNvPr id="532" name="Shape 532"/>
+          <p:cNvPr id="535" name="Shape 535"/>
           <p:cNvSpPr/>
           <p:nvPr>
             <p:ph type="body" idx="1"/>
@@ -20291,7 +20428,7 @@
       </p:sp>
       <p:sp>
         <p:nvSpPr>
-          <p:cNvPr id="533" name="Shape 533"/>
+          <p:cNvPr id="536" name="Shape 536"/>
           <p:cNvSpPr/>
           <p:nvPr>
             <p:ph type="sldNum" sz="quarter" idx="4294967295"/>
@@ -20318,7 +20455,7 @@
       </p:sp>
       <p:pic>
         <p:nvPicPr>
-          <p:cNvPr id="534" name="Screen Shot 2018-04-07 at 5.38.53 PM.png"/>
+          <p:cNvPr id="537" name="Screen Shot 2018-04-07 at 5.38.53 PM.png"/>
           <p:cNvPicPr>
             <a:picLocks noChangeAspect="1"/>
           </p:cNvPicPr>
@@ -20380,7 +20517,7 @@
       </p:grpSpPr>
       <p:sp>
         <p:nvSpPr>
-          <p:cNvPr id="538" name="Shape 538"/>
+          <p:cNvPr id="541" name="Shape 541"/>
           <p:cNvSpPr/>
           <p:nvPr>
             <p:ph type="body" idx="13"/>
@@ -20404,7 +20541,7 @@
       </p:sp>
       <p:sp>
         <p:nvSpPr>
-          <p:cNvPr id="539" name="Shape 539"/>
+          <p:cNvPr id="542" name="Shape 542"/>
           <p:cNvSpPr/>
           <p:nvPr>
             <p:ph type="title"/>
@@ -20435,7 +20572,7 @@
       </p:sp>
       <p:sp>
         <p:nvSpPr>
-          <p:cNvPr id="540" name="Shape 540"/>
+          <p:cNvPr id="543" name="Shape 543"/>
           <p:cNvSpPr/>
           <p:nvPr>
             <p:ph type="body" idx="1"/>
@@ -20482,7 +20619,7 @@
       </p:sp>
       <p:sp>
         <p:nvSpPr>
-          <p:cNvPr id="541" name="Shape 541"/>
+          <p:cNvPr id="544" name="Shape 544"/>
           <p:cNvSpPr/>
           <p:nvPr>
             <p:ph type="sldNum" sz="quarter" idx="4294967295"/>
@@ -20542,7 +20679,7 @@
       </p:grpSpPr>
       <p:sp>
         <p:nvSpPr>
-          <p:cNvPr id="545" name="Shape 545"/>
+          <p:cNvPr id="548" name="Shape 548"/>
           <p:cNvSpPr/>
           <p:nvPr>
             <p:ph type="body" idx="13"/>
@@ -20566,7 +20703,7 @@
       </p:sp>
       <p:sp>
         <p:nvSpPr>
-          <p:cNvPr id="546" name="Shape 546"/>
+          <p:cNvPr id="549" name="Shape 549"/>
           <p:cNvSpPr/>
           <p:nvPr>
             <p:ph type="title"/>
@@ -20597,7 +20734,7 @@
       </p:sp>
       <p:sp>
         <p:nvSpPr>
-          <p:cNvPr id="547" name="Shape 547"/>
+          <p:cNvPr id="550" name="Shape 550"/>
           <p:cNvSpPr/>
           <p:nvPr>
             <p:ph type="body" idx="1"/>
@@ -20656,7 +20793,7 @@
       </p:sp>
       <p:sp>
         <p:nvSpPr>
-          <p:cNvPr id="548" name="Shape 548"/>
+          <p:cNvPr id="551" name="Shape 551"/>
           <p:cNvSpPr/>
           <p:nvPr>
             <p:ph type="sldNum" sz="quarter" idx="4294967295"/>
@@ -20683,7 +20820,7 @@
       </p:sp>
       <p:pic>
         <p:nvPicPr>
-          <p:cNvPr id="549" name="Screen Shot 2018-04-08 at 11.13.13 PM.png"/>
+          <p:cNvPr id="552" name="Screen Shot 2018-04-08 at 11.13.13 PM.png"/>
           <p:cNvPicPr>
             <a:picLocks noChangeAspect="1"/>
           </p:cNvPicPr>
@@ -20745,7 +20882,7 @@
       </p:grpSpPr>
       <p:sp>
         <p:nvSpPr>
-          <p:cNvPr id="553" name="Shape 553"/>
+          <p:cNvPr id="556" name="Shape 556"/>
           <p:cNvSpPr/>
           <p:nvPr>
             <p:ph type="body" idx="13"/>
@@ -20769,7 +20906,7 @@
       </p:sp>
       <p:sp>
         <p:nvSpPr>
-          <p:cNvPr id="554" name="Shape 554"/>
+          <p:cNvPr id="557" name="Shape 557"/>
           <p:cNvSpPr/>
           <p:nvPr>
             <p:ph type="title"/>
@@ -20800,7 +20937,7 @@
       </p:sp>
       <p:sp>
         <p:nvSpPr>
-          <p:cNvPr id="555" name="Shape 555"/>
+          <p:cNvPr id="558" name="Shape 558"/>
           <p:cNvSpPr/>
           <p:nvPr>
             <p:ph type="body" idx="1"/>
@@ -20990,7 +21127,7 @@
       </p:sp>
       <p:sp>
         <p:nvSpPr>
-          <p:cNvPr id="556" name="Shape 556"/>
+          <p:cNvPr id="559" name="Shape 559"/>
           <p:cNvSpPr/>
           <p:nvPr>
             <p:ph type="sldNum" sz="quarter" idx="4294967295"/>
@@ -21017,7 +21154,7 @@
       </p:sp>
       <p:pic>
         <p:nvPicPr>
-          <p:cNvPr id="557" name="Screen Shot 2018-04-08 at 11.31.15 PM.png"/>
+          <p:cNvPr id="560" name="Screen Shot 2018-04-08 at 11.31.15 PM.png"/>
           <p:cNvPicPr>
             <a:picLocks noChangeAspect="1"/>
           </p:cNvPicPr>
@@ -21079,7 +21216,7 @@
       </p:grpSpPr>
       <p:sp>
         <p:nvSpPr>
-          <p:cNvPr id="561" name="Shape 561"/>
+          <p:cNvPr id="564" name="Shape 564"/>
           <p:cNvSpPr/>
           <p:nvPr>
             <p:ph type="body" idx="13"/>
@@ -21103,7 +21240,7 @@
       </p:sp>
       <p:sp>
         <p:nvSpPr>
-          <p:cNvPr id="562" name="Shape 562"/>
+          <p:cNvPr id="565" name="Shape 565"/>
           <p:cNvSpPr/>
           <p:nvPr>
             <p:ph type="title"/>
@@ -21134,7 +21271,7 @@
       </p:sp>
       <p:sp>
         <p:nvSpPr>
-          <p:cNvPr id="563" name="Shape 563"/>
+          <p:cNvPr id="566" name="Shape 566"/>
           <p:cNvSpPr/>
           <p:nvPr>
             <p:ph type="body" idx="1"/>
@@ -21570,7 +21707,7 @@
       </p:sp>
       <p:sp>
         <p:nvSpPr>
-          <p:cNvPr id="564" name="Shape 564"/>
+          <p:cNvPr id="567" name="Shape 567"/>
           <p:cNvSpPr/>
           <p:nvPr>
             <p:ph type="sldNum" sz="quarter" idx="4294967295"/>
@@ -21597,7 +21734,7 @@
       </p:sp>
       <p:pic>
         <p:nvPicPr>
-          <p:cNvPr id="565" name="Screen Shot 2018-04-08 at 11.17.15 PM.png"/>
+          <p:cNvPr id="568" name="Screen Shot 2018-04-08 at 11.17.15 PM.png"/>
           <p:cNvPicPr>
             <a:picLocks noChangeAspect="1"/>
           </p:cNvPicPr>
@@ -21659,7 +21796,7 @@
       </p:grpSpPr>
       <p:sp>
         <p:nvSpPr>
-          <p:cNvPr id="189" name="Shape 189"/>
+          <p:cNvPr id="191" name="Shape 191"/>
           <p:cNvSpPr/>
           <p:nvPr>
             <p:ph type="body" idx="13"/>
@@ -21708,7 +21845,7 @@
       </p:sp>
       <p:sp>
         <p:nvSpPr>
-          <p:cNvPr id="190" name="Shape 190"/>
+          <p:cNvPr id="192" name="Shape 192"/>
           <p:cNvSpPr/>
           <p:nvPr>
             <p:ph type="body" idx="14"/>
@@ -21753,7 +21890,7 @@
       </p:sp>
       <p:sp>
         <p:nvSpPr>
-          <p:cNvPr id="191" name="Shape 191"/>
+          <p:cNvPr id="193" name="Shape 193"/>
           <p:cNvSpPr/>
           <p:nvPr>
             <p:ph type="body" idx="15"/>
@@ -21777,7 +21914,7 @@
       </p:sp>
       <p:sp>
         <p:nvSpPr>
-          <p:cNvPr id="192" name="Shape 192"/>
+          <p:cNvPr id="194" name="Shape 194"/>
           <p:cNvSpPr/>
           <p:nvPr>
             <p:ph type="title" idx="4294967295"/>
@@ -21841,7 +21978,7 @@
       </p:grpSpPr>
       <p:sp>
         <p:nvSpPr>
-          <p:cNvPr id="569" name="Shape 569"/>
+          <p:cNvPr id="572" name="Shape 572"/>
           <p:cNvSpPr/>
           <p:nvPr>
             <p:ph type="body" idx="13"/>
@@ -21865,7 +22002,7 @@
       </p:sp>
       <p:sp>
         <p:nvSpPr>
-          <p:cNvPr id="570" name="Shape 570"/>
+          <p:cNvPr id="573" name="Shape 573"/>
           <p:cNvSpPr/>
           <p:nvPr>
             <p:ph type="title"/>
@@ -21896,7 +22033,7 @@
       </p:sp>
       <p:sp>
         <p:nvSpPr>
-          <p:cNvPr id="571" name="Shape 571"/>
+          <p:cNvPr id="574" name="Shape 574"/>
           <p:cNvSpPr/>
           <p:nvPr>
             <p:ph type="body" idx="1"/>
@@ -22682,7 +22819,7 @@
       </p:sp>
       <p:sp>
         <p:nvSpPr>
-          <p:cNvPr id="572" name="Shape 572"/>
+          <p:cNvPr id="575" name="Shape 575"/>
           <p:cNvSpPr/>
           <p:nvPr>
             <p:ph type="sldNum" sz="quarter" idx="4294967295"/>
@@ -22742,7 +22879,7 @@
       </p:grpSpPr>
       <p:sp>
         <p:nvSpPr>
-          <p:cNvPr id="576" name="Shape 576"/>
+          <p:cNvPr id="579" name="Shape 579"/>
           <p:cNvSpPr/>
           <p:nvPr>
             <p:ph type="body" idx="13"/>
@@ -22766,7 +22903,7 @@
       </p:sp>
       <p:sp>
         <p:nvSpPr>
-          <p:cNvPr id="577" name="Shape 577"/>
+          <p:cNvPr id="580" name="Shape 580"/>
           <p:cNvSpPr/>
           <p:nvPr>
             <p:ph type="title"/>
@@ -22797,7 +22934,7 @@
       </p:sp>
       <p:sp>
         <p:nvSpPr>
-          <p:cNvPr id="578" name="Shape 578"/>
+          <p:cNvPr id="581" name="Shape 581"/>
           <p:cNvSpPr/>
           <p:nvPr>
             <p:ph type="body" idx="1"/>
@@ -23450,7 +23587,7 @@
       </p:sp>
       <p:sp>
         <p:nvSpPr>
-          <p:cNvPr id="579" name="Shape 579"/>
+          <p:cNvPr id="582" name="Shape 582"/>
           <p:cNvSpPr/>
           <p:nvPr>
             <p:ph type="sldNum" sz="quarter" idx="4294967295"/>
@@ -23510,7 +23647,7 @@
       </p:grpSpPr>
       <p:sp>
         <p:nvSpPr>
-          <p:cNvPr id="583" name="Shape 583"/>
+          <p:cNvPr id="586" name="Shape 586"/>
           <p:cNvSpPr/>
           <p:nvPr>
             <p:ph type="body" idx="13"/>
@@ -23534,7 +23671,7 @@
       </p:sp>
       <p:sp>
         <p:nvSpPr>
-          <p:cNvPr id="584" name="Shape 584"/>
+          <p:cNvPr id="587" name="Shape 587"/>
           <p:cNvSpPr/>
           <p:nvPr>
             <p:ph type="title"/>
@@ -23565,7 +23702,7 @@
       </p:sp>
       <p:sp>
         <p:nvSpPr>
-          <p:cNvPr id="585" name="Shape 585"/>
+          <p:cNvPr id="588" name="Shape 588"/>
           <p:cNvSpPr/>
           <p:nvPr>
             <p:ph type="body" idx="1"/>
@@ -24113,7 +24250,7 @@
       </p:sp>
       <p:sp>
         <p:nvSpPr>
-          <p:cNvPr id="586" name="Shape 586"/>
+          <p:cNvPr id="589" name="Shape 589"/>
           <p:cNvSpPr/>
           <p:nvPr>
             <p:ph type="sldNum" sz="quarter" idx="4294967295"/>
@@ -24173,7 +24310,7 @@
       </p:grpSpPr>
       <p:sp>
         <p:nvSpPr>
-          <p:cNvPr id="590" name="Shape 590"/>
+          <p:cNvPr id="593" name="Shape 593"/>
           <p:cNvSpPr/>
           <p:nvPr>
             <p:ph type="body" idx="13"/>
@@ -24197,7 +24334,7 @@
       </p:sp>
       <p:sp>
         <p:nvSpPr>
-          <p:cNvPr id="591" name="Shape 591"/>
+          <p:cNvPr id="594" name="Shape 594"/>
           <p:cNvSpPr/>
           <p:nvPr>
             <p:ph type="title"/>
@@ -24228,7 +24365,7 @@
       </p:sp>
       <p:sp>
         <p:nvSpPr>
-          <p:cNvPr id="592" name="Shape 592"/>
+          <p:cNvPr id="595" name="Shape 595"/>
           <p:cNvSpPr/>
           <p:nvPr>
             <p:ph type="body" idx="1"/>
@@ -24260,7 +24397,7 @@
       </p:sp>
       <p:sp>
         <p:nvSpPr>
-          <p:cNvPr id="593" name="Shape 593"/>
+          <p:cNvPr id="596" name="Shape 596"/>
           <p:cNvSpPr/>
           <p:nvPr>
             <p:ph type="sldNum" sz="quarter" idx="4294967295"/>
@@ -24287,7 +24424,7 @@
       </p:sp>
       <p:pic>
         <p:nvPicPr>
-          <p:cNvPr id="594" name="scsscolors.png"/>
+          <p:cNvPr id="597" name="scsscolors.png"/>
           <p:cNvPicPr>
             <a:picLocks noChangeAspect="1"/>
           </p:cNvPicPr>
@@ -24303,8 +24440,8 @@
         </p:blipFill>
         <p:spPr>
           <a:xfrm>
-            <a:off x="3308782" y="3534126"/>
-            <a:ext cx="6773525" cy="6653182"/>
+            <a:off x="3392802" y="3466038"/>
+            <a:ext cx="5953646" cy="5847869"/>
           </a:xfrm>
           <a:prstGeom prst="rect">
             <a:avLst/>
@@ -24349,7 +24486,7 @@
       </p:grpSpPr>
       <p:sp>
         <p:nvSpPr>
-          <p:cNvPr id="598" name="Shape 598"/>
+          <p:cNvPr id="601" name="Shape 601"/>
           <p:cNvSpPr/>
           <p:nvPr>
             <p:ph type="body" idx="13"/>
@@ -24373,7 +24510,7 @@
       </p:sp>
       <p:sp>
         <p:nvSpPr>
-          <p:cNvPr id="599" name="Shape 599"/>
+          <p:cNvPr id="602" name="Shape 602"/>
           <p:cNvSpPr/>
           <p:nvPr>
             <p:ph type="title"/>
@@ -24404,7 +24541,7 @@
       </p:sp>
       <p:sp>
         <p:nvSpPr>
-          <p:cNvPr id="600" name="Shape 600"/>
+          <p:cNvPr id="603" name="Shape 603"/>
           <p:cNvSpPr/>
           <p:nvPr>
             <p:ph type="body" idx="1"/>
@@ -24789,7 +24926,7 @@
       </p:sp>
       <p:sp>
         <p:nvSpPr>
-          <p:cNvPr id="601" name="Shape 601"/>
+          <p:cNvPr id="604" name="Shape 604"/>
           <p:cNvSpPr/>
           <p:nvPr>
             <p:ph type="sldNum" sz="quarter" idx="4294967295"/>
@@ -24816,7 +24953,7 @@
       </p:sp>
       <p:pic>
         <p:nvPicPr>
-          <p:cNvPr id="602" name="Screen Shot 2018-04-08 at 11.59.22 PM.png"/>
+          <p:cNvPr id="605" name="Screen Shot 2018-04-08 at 11.59.22 PM.png"/>
           <p:cNvPicPr>
             <a:picLocks noChangeAspect="1"/>
           </p:cNvPicPr>
@@ -24845,7 +24982,7 @@
       </p:pic>
       <p:pic>
         <p:nvPicPr>
-          <p:cNvPr id="603" name="Screen Shot 2018-04-08 at 11.55.30 PM.png"/>
+          <p:cNvPr id="606" name="Screen Shot 2018-04-08 at 11.55.30 PM.png"/>
           <p:cNvPicPr>
             <a:picLocks noChangeAspect="1"/>
           </p:cNvPicPr>
@@ -24907,7 +25044,7 @@
       </p:grpSpPr>
       <p:sp>
         <p:nvSpPr>
-          <p:cNvPr id="607" name="Shape 607"/>
+          <p:cNvPr id="610" name="Shape 610"/>
           <p:cNvSpPr/>
           <p:nvPr>
             <p:ph type="body" idx="13"/>
@@ -24931,7 +25068,7 @@
       </p:sp>
       <p:sp>
         <p:nvSpPr>
-          <p:cNvPr id="608" name="Shape 608"/>
+          <p:cNvPr id="611" name="Shape 611"/>
           <p:cNvSpPr/>
           <p:nvPr>
             <p:ph type="title"/>
@@ -24962,7 +25099,7 @@
       </p:sp>
       <p:sp>
         <p:nvSpPr>
-          <p:cNvPr id="609" name="Shape 609"/>
+          <p:cNvPr id="612" name="Shape 612"/>
           <p:cNvSpPr/>
           <p:nvPr>
             <p:ph type="body" idx="1"/>
@@ -25017,7 +25154,7 @@
       </p:sp>
       <p:sp>
         <p:nvSpPr>
-          <p:cNvPr id="610" name="Shape 610"/>
+          <p:cNvPr id="613" name="Shape 613"/>
           <p:cNvSpPr/>
           <p:nvPr>
             <p:ph type="sldNum" sz="quarter" idx="4294967295"/>
@@ -25077,7 +25214,7 @@
       </p:grpSpPr>
       <p:sp>
         <p:nvSpPr>
-          <p:cNvPr id="614" name="Shape 614"/>
+          <p:cNvPr id="617" name="Shape 617"/>
           <p:cNvSpPr/>
           <p:nvPr>
             <p:ph type="body" idx="13"/>
@@ -25101,7 +25238,7 @@
       </p:sp>
       <p:sp>
         <p:nvSpPr>
-          <p:cNvPr id="615" name="Shape 615"/>
+          <p:cNvPr id="618" name="Shape 618"/>
           <p:cNvSpPr/>
           <p:nvPr>
             <p:ph type="title"/>
@@ -25132,7 +25269,7 @@
       </p:sp>
       <p:sp>
         <p:nvSpPr>
-          <p:cNvPr id="616" name="Shape 616"/>
+          <p:cNvPr id="619" name="Shape 619"/>
           <p:cNvSpPr/>
           <p:nvPr>
             <p:ph type="body" idx="1"/>
@@ -25164,7 +25301,7 @@
       </p:sp>
       <p:sp>
         <p:nvSpPr>
-          <p:cNvPr id="617" name="Shape 617"/>
+          <p:cNvPr id="620" name="Shape 620"/>
           <p:cNvSpPr/>
           <p:nvPr>
             <p:ph type="sldNum" sz="quarter" idx="4294967295"/>
@@ -25191,7 +25328,7 @@
       </p:sp>
       <p:sp>
         <p:nvSpPr>
-          <p:cNvPr id="618" name="Shape 618"/>
+          <p:cNvPr id="621" name="Shape 621"/>
           <p:cNvSpPr/>
           <p:nvPr/>
         </p:nvSpPr>
@@ -25236,7 +25373,7 @@
       </p:sp>
       <p:pic>
         <p:nvPicPr>
-          <p:cNvPr id="619" name="post-overlay.png"/>
+          <p:cNvPr id="622" name="post-overlay.png"/>
           <p:cNvPicPr>
             <a:picLocks noChangeAspect="1"/>
           </p:cNvPicPr>
@@ -25252,7 +25389,7 @@
         </p:blipFill>
         <p:spPr>
           <a:xfrm>
-            <a:off x="0" y="4158301"/>
+            <a:off x="0" y="4060765"/>
             <a:ext cx="13004801" cy="6167719"/>
           </a:xfrm>
           <a:prstGeom prst="rect">
@@ -25298,7 +25435,7 @@
       </p:grpSpPr>
       <p:sp>
         <p:nvSpPr>
-          <p:cNvPr id="623" name="Shape 623"/>
+          <p:cNvPr id="626" name="Shape 626"/>
           <p:cNvSpPr/>
           <p:nvPr>
             <p:ph type="body" idx="13"/>
@@ -25322,7 +25459,7 @@
       </p:sp>
       <p:sp>
         <p:nvSpPr>
-          <p:cNvPr id="624" name="Shape 624"/>
+          <p:cNvPr id="627" name="Shape 627"/>
           <p:cNvSpPr/>
           <p:nvPr>
             <p:ph type="title"/>
@@ -25353,7 +25490,7 @@
       </p:sp>
       <p:sp>
         <p:nvSpPr>
-          <p:cNvPr id="625" name="Shape 625"/>
+          <p:cNvPr id="628" name="Shape 628"/>
           <p:cNvSpPr/>
           <p:nvPr>
             <p:ph type="body" idx="1"/>
@@ -25653,7 +25790,7 @@
       </p:sp>
       <p:sp>
         <p:nvSpPr>
-          <p:cNvPr id="626" name="Shape 626"/>
+          <p:cNvPr id="629" name="Shape 629"/>
           <p:cNvSpPr/>
           <p:nvPr>
             <p:ph type="sldNum" sz="quarter" idx="4294967295"/>
@@ -25680,7 +25817,7 @@
       </p:sp>
       <p:pic>
         <p:nvPicPr>
-          <p:cNvPr id="627" name="Screen Shot 2018-04-07 at 5.14.12 PM.png"/>
+          <p:cNvPr id="630" name="Screen Shot 2018-04-07 at 5.14.12 PM.png"/>
           <p:cNvPicPr>
             <a:picLocks noChangeAspect="1"/>
           </p:cNvPicPr>
@@ -25742,7 +25879,7 @@
       </p:grpSpPr>
       <p:sp>
         <p:nvSpPr>
-          <p:cNvPr id="631" name="Shape 631"/>
+          <p:cNvPr id="634" name="Shape 634"/>
           <p:cNvSpPr/>
           <p:nvPr>
             <p:ph type="body" idx="13"/>
@@ -25766,7 +25903,7 @@
       </p:sp>
       <p:sp>
         <p:nvSpPr>
-          <p:cNvPr id="632" name="Shape 632"/>
+          <p:cNvPr id="635" name="Shape 635"/>
           <p:cNvSpPr/>
           <p:nvPr>
             <p:ph type="title"/>
@@ -25797,7 +25934,7 @@
       </p:sp>
       <p:sp>
         <p:nvSpPr>
-          <p:cNvPr id="633" name="Shape 633"/>
+          <p:cNvPr id="636" name="Shape 636"/>
           <p:cNvSpPr/>
           <p:nvPr>
             <p:ph type="body" idx="1"/>
@@ -25843,7 +25980,7 @@
       </p:sp>
       <p:sp>
         <p:nvSpPr>
-          <p:cNvPr id="634" name="Shape 634"/>
+          <p:cNvPr id="637" name="Shape 637"/>
           <p:cNvSpPr/>
           <p:nvPr>
             <p:ph type="sldNum" sz="quarter" idx="4294967295"/>
@@ -25870,7 +26007,7 @@
       </p:sp>
       <p:pic>
         <p:nvPicPr>
-          <p:cNvPr id="635" name="Screen Shot 2018-04-07 at 5.16.01 PM.png"/>
+          <p:cNvPr id="638" name="Screen Shot 2018-04-07 at 5.16.01 PM.png"/>
           <p:cNvPicPr>
             <a:picLocks noChangeAspect="1"/>
           </p:cNvPicPr>
@@ -25932,7 +26069,7 @@
       </p:grpSpPr>
       <p:sp>
         <p:nvSpPr>
-          <p:cNvPr id="196" name="Shape 196"/>
+          <p:cNvPr id="198" name="Shape 198"/>
           <p:cNvSpPr/>
           <p:nvPr>
             <p:ph type="body" idx="13"/>
@@ -25956,7 +26093,7 @@
       </p:sp>
       <p:sp>
         <p:nvSpPr>
-          <p:cNvPr id="197" name="Shape 197"/>
+          <p:cNvPr id="199" name="Shape 199"/>
           <p:cNvSpPr/>
           <p:nvPr>
             <p:ph type="title"/>
@@ -25987,7 +26124,7 @@
       </p:sp>
       <p:sp>
         <p:nvSpPr>
-          <p:cNvPr id="198" name="Shape 198"/>
+          <p:cNvPr id="200" name="Shape 200"/>
           <p:cNvSpPr/>
           <p:nvPr>
             <p:ph type="body" idx="1"/>
@@ -26125,7 +26262,7 @@
       </p:sp>
       <p:sp>
         <p:nvSpPr>
-          <p:cNvPr id="199" name="Shape 199"/>
+          <p:cNvPr id="201" name="Shape 201"/>
           <p:cNvSpPr/>
           <p:nvPr>
             <p:ph type="sldNum" sz="quarter" idx="4294967295"/>
@@ -26189,7 +26326,7 @@
       </p:grpSpPr>
       <p:sp>
         <p:nvSpPr>
-          <p:cNvPr id="201" name="Shape 201"/>
+          <p:cNvPr id="203" name="Shape 203"/>
           <p:cNvSpPr/>
           <p:nvPr>
             <p:ph type="body" idx="13"/>
@@ -26213,7 +26350,7 @@
       </p:sp>
       <p:sp>
         <p:nvSpPr>
-          <p:cNvPr id="202" name="Shape 202"/>
+          <p:cNvPr id="204" name="Shape 204"/>
           <p:cNvSpPr/>
           <p:nvPr>
             <p:ph type="title"/>
@@ -26244,7 +26381,7 @@
       </p:sp>
       <p:sp>
         <p:nvSpPr>
-          <p:cNvPr id="203" name="Shape 203"/>
+          <p:cNvPr id="205" name="Shape 205"/>
           <p:cNvSpPr/>
           <p:nvPr>
             <p:ph type="body" idx="1"/>
@@ -26346,7 +26483,7 @@
       </p:sp>
       <p:sp>
         <p:nvSpPr>
-          <p:cNvPr id="204" name="Shape 204"/>
+          <p:cNvPr id="206" name="Shape 206"/>
           <p:cNvSpPr/>
           <p:nvPr>
             <p:ph type="sldNum" sz="quarter" idx="4294967295"/>
@@ -26377,7 +26514,7 @@
       </p:sp>
       <p:pic>
         <p:nvPicPr>
-          <p:cNvPr id="205" name="Screen Shot 2018-04-07 at 2.12.42 PM.png"/>
+          <p:cNvPr id="207" name="Screen Shot 2018-04-07 at 2.12.42 PM.png"/>
           <p:cNvPicPr>
             <a:picLocks noChangeAspect="1"/>
           </p:cNvPicPr>
@@ -26439,7 +26576,7 @@
       </p:grpSpPr>
       <p:sp>
         <p:nvSpPr>
-          <p:cNvPr id="207" name="Shape 207"/>
+          <p:cNvPr id="209" name="Shape 209"/>
           <p:cNvSpPr/>
           <p:nvPr>
             <p:ph type="body" idx="13"/>
@@ -26463,7 +26600,7 @@
       </p:sp>
       <p:sp>
         <p:nvSpPr>
-          <p:cNvPr id="208" name="Shape 208"/>
+          <p:cNvPr id="210" name="Shape 210"/>
           <p:cNvSpPr/>
           <p:nvPr>
             <p:ph type="title"/>
@@ -26494,7 +26631,7 @@
       </p:sp>
       <p:sp>
         <p:nvSpPr>
-          <p:cNvPr id="209" name="Shape 209"/>
+          <p:cNvPr id="211" name="Shape 211"/>
           <p:cNvSpPr/>
           <p:nvPr>
             <p:ph type="body" idx="1"/>
@@ -26596,7 +26733,7 @@
       </p:sp>
       <p:sp>
         <p:nvSpPr>
-          <p:cNvPr id="210" name="Shape 210"/>
+          <p:cNvPr id="212" name="Shape 212"/>
           <p:cNvSpPr/>
           <p:nvPr>
             <p:ph type="sldNum" sz="quarter" idx="4294967295"/>
@@ -26627,7 +26764,7 @@
       </p:sp>
       <p:pic>
         <p:nvPicPr>
-          <p:cNvPr id="211" name="Screen Shot 2018-04-07 at 2.12.53 PM.png"/>
+          <p:cNvPr id="213" name="Screen Shot 2018-04-07 at 2.12.53 PM.png"/>
           <p:cNvPicPr>
             <a:picLocks noChangeAspect="1"/>
           </p:cNvPicPr>

</xml_diff>